<commit_message>
DeveloperGuide: Update figure numbers and Model CD
</commit_message>
<xml_diff>
--- a/docs/diagrams/ModelComponentClassBetterOopDiagram.pptx
+++ b/docs/diagrams/ModelComponentClassBetterOopDiagram.pptx
@@ -208,7 +208,7 @@
           <a:p>
             <a:fld id="{F5CC4B3F-88C1-4FFA-B1B6-F41C21DC6924}" type="datetimeFigureOut">
               <a:rPr lang="en-US" smtClean="0"/>
-              <a:t>6/27/2018</a:t>
+              <a:t>10/24/2018</a:t>
             </a:fld>
             <a:endParaRPr lang="en-US"/>
           </a:p>
@@ -654,7 +654,7 @@
           <a:p>
             <a:fld id="{78C97017-6FC3-485B-9764-EAC9E56C1D49}" type="datetimeFigureOut">
               <a:rPr lang="en-US" smtClean="0"/>
-              <a:t>6/27/2018</a:t>
+              <a:t>10/24/2018</a:t>
             </a:fld>
             <a:endParaRPr lang="en-US"/>
           </a:p>
@@ -822,7 +822,7 @@
           <a:p>
             <a:fld id="{78C97017-6FC3-485B-9764-EAC9E56C1D49}" type="datetimeFigureOut">
               <a:rPr lang="en-US" smtClean="0"/>
-              <a:t>6/27/2018</a:t>
+              <a:t>10/24/2018</a:t>
             </a:fld>
             <a:endParaRPr lang="en-US"/>
           </a:p>
@@ -1000,7 +1000,7 @@
           <a:p>
             <a:fld id="{78C97017-6FC3-485B-9764-EAC9E56C1D49}" type="datetimeFigureOut">
               <a:rPr lang="en-US" smtClean="0"/>
-              <a:t>6/27/2018</a:t>
+              <a:t>10/24/2018</a:t>
             </a:fld>
             <a:endParaRPr lang="en-US"/>
           </a:p>
@@ -1168,7 +1168,7 @@
           <a:p>
             <a:fld id="{78C97017-6FC3-485B-9764-EAC9E56C1D49}" type="datetimeFigureOut">
               <a:rPr lang="en-US" smtClean="0"/>
-              <a:t>6/27/2018</a:t>
+              <a:t>10/24/2018</a:t>
             </a:fld>
             <a:endParaRPr lang="en-US"/>
           </a:p>
@@ -1413,7 +1413,7 @@
           <a:p>
             <a:fld id="{78C97017-6FC3-485B-9764-EAC9E56C1D49}" type="datetimeFigureOut">
               <a:rPr lang="en-US" smtClean="0"/>
-              <a:t>6/27/2018</a:t>
+              <a:t>10/24/2018</a:t>
             </a:fld>
             <a:endParaRPr lang="en-US"/>
           </a:p>
@@ -1698,7 +1698,7 @@
           <a:p>
             <a:fld id="{78C97017-6FC3-485B-9764-EAC9E56C1D49}" type="datetimeFigureOut">
               <a:rPr lang="en-US" smtClean="0"/>
-              <a:t>6/27/2018</a:t>
+              <a:t>10/24/2018</a:t>
             </a:fld>
             <a:endParaRPr lang="en-US"/>
           </a:p>
@@ -2117,7 +2117,7 @@
           <a:p>
             <a:fld id="{78C97017-6FC3-485B-9764-EAC9E56C1D49}" type="datetimeFigureOut">
               <a:rPr lang="en-US" smtClean="0"/>
-              <a:t>6/27/2018</a:t>
+              <a:t>10/24/2018</a:t>
             </a:fld>
             <a:endParaRPr lang="en-US"/>
           </a:p>
@@ -2234,7 +2234,7 @@
           <a:p>
             <a:fld id="{78C97017-6FC3-485B-9764-EAC9E56C1D49}" type="datetimeFigureOut">
               <a:rPr lang="en-US" smtClean="0"/>
-              <a:t>6/27/2018</a:t>
+              <a:t>10/24/2018</a:t>
             </a:fld>
             <a:endParaRPr lang="en-US"/>
           </a:p>
@@ -2329,7 +2329,7 @@
           <a:p>
             <a:fld id="{78C97017-6FC3-485B-9764-EAC9E56C1D49}" type="datetimeFigureOut">
               <a:rPr lang="en-US" smtClean="0"/>
-              <a:t>6/27/2018</a:t>
+              <a:t>10/24/2018</a:t>
             </a:fld>
             <a:endParaRPr lang="en-US"/>
           </a:p>
@@ -2604,7 +2604,7 @@
           <a:p>
             <a:fld id="{78C97017-6FC3-485B-9764-EAC9E56C1D49}" type="datetimeFigureOut">
               <a:rPr lang="en-US" smtClean="0"/>
-              <a:t>6/27/2018</a:t>
+              <a:t>10/24/2018</a:t>
             </a:fld>
             <a:endParaRPr lang="en-US"/>
           </a:p>
@@ -2856,7 +2856,7 @@
           <a:p>
             <a:fld id="{78C97017-6FC3-485B-9764-EAC9E56C1D49}" type="datetimeFigureOut">
               <a:rPr lang="en-US" smtClean="0"/>
-              <a:t>6/27/2018</a:t>
+              <a:t>10/24/2018</a:t>
             </a:fld>
             <a:endParaRPr lang="en-US"/>
           </a:p>
@@ -3067,7 +3067,7 @@
           <a:p>
             <a:fld id="{78C97017-6FC3-485B-9764-EAC9E56C1D49}" type="datetimeFigureOut">
               <a:rPr lang="en-US" smtClean="0"/>
-              <a:t>6/27/2018</a:t>
+              <a:t>10/24/2018</a:t>
             </a:fld>
             <a:endParaRPr lang="en-US"/>
           </a:p>
@@ -3450,8 +3450,8 @@
         </p:nvSpPr>
         <p:spPr>
           <a:xfrm>
-            <a:off x="1119865" y="1676400"/>
-            <a:ext cx="7490735" cy="3059747"/>
+            <a:off x="762000" y="1676400"/>
+            <a:ext cx="8305799" cy="3059747"/>
           </a:xfrm>
           <a:prstGeom prst="roundRect">
             <a:avLst>
@@ -3626,17 +3626,19 @@
           <p:cNvPr id="107" name="Elbow Connector 106"/>
           <p:cNvCxnSpPr>
             <a:cxnSpLocks/>
+            <a:stCxn id="9" idx="1"/>
+            <a:endCxn id="62" idx="2"/>
           </p:cNvCxnSpPr>
           <p:nvPr/>
         </p:nvCxnSpPr>
         <p:spPr>
           <a:xfrm rot="5400000" flipH="1" flipV="1">
-            <a:off x="4155901" y="1308943"/>
-            <a:ext cx="613122" cy="4459404"/>
+            <a:off x="4340815" y="1072376"/>
+            <a:ext cx="613122" cy="4878021"/>
           </a:xfrm>
           <a:prstGeom prst="bentConnector3">
             <a:avLst>
-              <a:gd name="adj1" fmla="val -26668"/>
+              <a:gd name="adj1" fmla="val -15472"/>
             </a:avLst>
           </a:prstGeom>
           <a:ln w="19050">
@@ -3959,8 +3961,8 @@
         </p:nvSpPr>
         <p:spPr>
           <a:xfrm>
-            <a:off x="2786406" y="2834911"/>
-            <a:ext cx="1447688" cy="346760"/>
+            <a:off x="2786405" y="2834911"/>
+            <a:ext cx="1798421" cy="346760"/>
           </a:xfrm>
           <a:prstGeom prst="rect">
             <a:avLst/>
@@ -3992,12 +3994,12 @@
           <a:p>
             <a:pPr algn="ctr"/>
             <a:r>
-              <a:rPr lang="en-US" sz="1050" dirty="0" err="1" smtClean="0">
+              <a:rPr lang="en-US" sz="1050" dirty="0" err="1">
                 <a:solidFill>
                   <a:srgbClr val="7030A0"/>
                 </a:solidFill>
               </a:rPr>
-              <a:t>VersionedAddressBook</a:t>
+              <a:t>VersionedRestaurantBook</a:t>
             </a:r>
             <a:endParaRPr lang="en-SG" sz="1050" dirty="0">
               <a:solidFill>
@@ -4011,6 +4013,7 @@
         <p:nvCxnSpPr>
           <p:cNvPr id="47" name="Straight Arrow Connector 46"/>
           <p:cNvCxnSpPr>
+            <a:cxnSpLocks/>
             <a:stCxn id="48" idx="3"/>
             <a:endCxn id="46" idx="1"/>
           </p:cNvCxnSpPr>
@@ -4019,7 +4022,7 @@
         <p:spPr>
           <a:xfrm>
             <a:off x="2624360" y="3003033"/>
-            <a:ext cx="162046" cy="5258"/>
+            <a:ext cx="162045" cy="5258"/>
           </a:xfrm>
           <a:prstGeom prst="straightConnector1">
             <a:avLst/>
@@ -4101,8 +4104,8 @@
         </p:nvSpPr>
         <p:spPr>
           <a:xfrm>
-            <a:off x="4762209" y="2863434"/>
-            <a:ext cx="1156969" cy="346760"/>
+            <a:off x="5104626" y="2863434"/>
+            <a:ext cx="1232451" cy="346760"/>
           </a:xfrm>
           <a:prstGeom prst="rect">
             <a:avLst/>
@@ -4139,7 +4142,7 @@
                   <a:srgbClr val="7030A0"/>
                 </a:solidFill>
               </a:rPr>
-              <a:t>UniquePersonList</a:t>
+              <a:t>UniqueAccountList</a:t>
             </a:r>
             <a:endParaRPr lang="en-SG" sz="1050" dirty="0">
               <a:solidFill>
@@ -4157,7 +4160,7 @@
         </p:nvSpPr>
         <p:spPr>
           <a:xfrm>
-            <a:off x="4233246" y="2948201"/>
+            <a:off x="4596126" y="2958385"/>
             <a:ext cx="236048" cy="173380"/>
           </a:xfrm>
           <a:prstGeom prst="flowChartDecision">
@@ -4200,17 +4203,18 @@
         <p:nvCxnSpPr>
           <p:cNvPr id="30" name="Elbow Connector 29"/>
           <p:cNvCxnSpPr>
-            <a:stCxn id="51" idx="3"/>
+            <a:cxnSpLocks/>
+            <a:stCxn id="54" idx="0"/>
             <a:endCxn id="49" idx="1"/>
           </p:cNvCxnSpPr>
           <p:nvPr/>
         </p:nvCxnSpPr>
         <p:spPr>
-          <a:xfrm>
-            <a:off x="4469294" y="3034891"/>
-            <a:ext cx="292915" cy="1923"/>
-          </a:xfrm>
-          <a:prstGeom prst="bentConnector3">
+          <a:xfrm rot="5400000" flipH="1" flipV="1">
+            <a:off x="4953714" y="2915275"/>
+            <a:ext cx="29373" cy="272452"/>
+          </a:xfrm>
+          <a:prstGeom prst="bentConnector2">
             <a:avLst/>
           </a:prstGeom>
           <a:ln w="19050">
@@ -4245,7 +4249,7 @@
         </p:nvSpPr>
         <p:spPr>
           <a:xfrm>
-            <a:off x="6313677" y="2858066"/>
+            <a:off x="6732294" y="2858066"/>
             <a:ext cx="708186" cy="346760"/>
           </a:xfrm>
           <a:prstGeom prst="rect">
@@ -4283,7 +4287,7 @@
                   <a:srgbClr val="7030A0"/>
                 </a:solidFill>
               </a:rPr>
-              <a:t>Person</a:t>
+              <a:t>Account</a:t>
             </a:r>
             <a:endParaRPr lang="en-SG" sz="1050" dirty="0">
               <a:solidFill>
@@ -4301,7 +4305,7 @@
         </p:nvSpPr>
         <p:spPr>
           <a:xfrm>
-            <a:off x="5918460" y="2941065"/>
+            <a:off x="6337077" y="2941065"/>
             <a:ext cx="236048" cy="173380"/>
           </a:xfrm>
           <a:prstGeom prst="flowChartDecision">
@@ -4350,7 +4354,7 @@
         </p:nvCxnSpPr>
         <p:spPr>
           <a:xfrm>
-            <a:off x="6154508" y="3027755"/>
+            <a:off x="6573125" y="3027755"/>
             <a:ext cx="159169" cy="3691"/>
           </a:xfrm>
           <a:prstGeom prst="bentConnector3">
@@ -4388,8 +4392,8 @@
         </p:nvSpPr>
         <p:spPr>
           <a:xfrm>
-            <a:off x="7712397" y="2564238"/>
-            <a:ext cx="708186" cy="285783"/>
+            <a:off x="8131013" y="2564238"/>
+            <a:ext cx="825927" cy="285783"/>
           </a:xfrm>
           <a:prstGeom prst="rect">
             <a:avLst/>
@@ -4426,7 +4430,7 @@
                   <a:srgbClr val="7030A0"/>
                 </a:solidFill>
               </a:rPr>
-              <a:t>Name</a:t>
+              <a:t>Username</a:t>
             </a:r>
             <a:endParaRPr lang="en-SG" sz="1050" dirty="0">
               <a:solidFill>
@@ -4444,7 +4448,7 @@
         </p:nvSpPr>
         <p:spPr>
           <a:xfrm>
-            <a:off x="7041947" y="2948201"/>
+            <a:off x="7460564" y="2948201"/>
             <a:ext cx="236048" cy="173380"/>
           </a:xfrm>
           <a:prstGeom prst="flowChartDecision">
@@ -4493,7 +4497,7 @@
         </p:nvCxnSpPr>
         <p:spPr>
           <a:xfrm flipV="1">
-            <a:off x="7277995" y="2706821"/>
+            <a:off x="7696612" y="2706821"/>
             <a:ext cx="434402" cy="327761"/>
           </a:xfrm>
           <a:prstGeom prst="bentConnector3">
@@ -4531,8 +4535,8 @@
         </p:nvSpPr>
         <p:spPr>
           <a:xfrm>
-            <a:off x="7712397" y="2887216"/>
-            <a:ext cx="708186" cy="285783"/>
+            <a:off x="8131013" y="2887216"/>
+            <a:ext cx="823381" cy="285783"/>
           </a:xfrm>
           <a:prstGeom prst="rect">
             <a:avLst/>
@@ -4569,7 +4573,7 @@
                   <a:srgbClr val="7030A0"/>
                 </a:solidFill>
               </a:rPr>
-              <a:t>Phone</a:t>
+              <a:t>Password</a:t>
             </a:r>
             <a:endParaRPr lang="en-SG" sz="1050" dirty="0">
               <a:solidFill>
@@ -4583,15 +4587,14 @@
         <p:nvCxnSpPr>
           <p:cNvPr id="81" name="Elbow Connector 80"/>
           <p:cNvCxnSpPr>
-            <a:stCxn id="78" idx="3"/>
-            <a:endCxn id="80" idx="1"/>
+            <a:cxnSpLocks/>
           </p:cNvCxnSpPr>
           <p:nvPr/>
         </p:nvCxnSpPr>
         <p:spPr>
           <a:xfrm flipV="1">
-            <a:off x="7277995" y="3030108"/>
-            <a:ext cx="434402" cy="4783"/>
+            <a:off x="7701314" y="3029799"/>
+            <a:ext cx="434401" cy="4783"/>
           </a:xfrm>
           <a:prstGeom prst="bentConnector3">
             <a:avLst/>
@@ -4622,14 +4625,53 @@
       </p:cxnSp>
       <p:sp>
         <p:nvSpPr>
-          <p:cNvPr id="83" name="Rectangle 8"/>
+          <p:cNvPr id="114" name="TextBox 113"/>
+          <p:cNvSpPr txBox="1"/>
+          <p:nvPr/>
+        </p:nvSpPr>
+        <p:spPr>
+          <a:xfrm rot="16200000">
+            <a:off x="6786891" y="3504290"/>
+            <a:ext cx="881018" cy="261610"/>
+          </a:xfrm>
+          <a:prstGeom prst="rect">
+            <a:avLst/>
+          </a:prstGeom>
+          <a:noFill/>
+        </p:spPr>
+        <p:txBody>
+          <a:bodyPr wrap="square" rtlCol="0">
+            <a:spAutoFit/>
+          </a:bodyPr>
+          <a:lstStyle/>
+          <a:p>
+            <a:pPr algn="r"/>
+            <a:r>
+              <a:rPr lang="en-US" sz="1100" dirty="0">
+                <a:solidFill>
+                  <a:srgbClr val="7030A0"/>
+                </a:solidFill>
+              </a:rPr>
+              <a:t>filtered list</a:t>
+            </a:r>
+            <a:endParaRPr lang="en-SG" sz="1100" dirty="0">
+              <a:solidFill>
+                <a:srgbClr val="7030A0"/>
+              </a:solidFill>
+            </a:endParaRPr>
+          </a:p>
+        </p:txBody>
+      </p:sp>
+      <p:sp>
+        <p:nvSpPr>
+          <p:cNvPr id="122" name="Rectangle 8"/>
           <p:cNvSpPr/>
           <p:nvPr/>
         </p:nvSpPr>
         <p:spPr>
           <a:xfrm>
-            <a:off x="7712397" y="3210194"/>
-            <a:ext cx="708186" cy="285783"/>
+            <a:off x="2057401" y="4239491"/>
+            <a:ext cx="1066800" cy="346760"/>
           </a:xfrm>
           <a:prstGeom prst="rect">
             <a:avLst/>
@@ -4666,7 +4708,22 @@
                   <a:srgbClr val="7030A0"/>
                 </a:solidFill>
               </a:rPr>
-              <a:t>Email</a:t>
+              <a:t>&lt;&lt;interface&gt;&gt;</a:t>
+            </a:r>
+            <a:br>
+              <a:rPr lang="en-US" sz="1050" dirty="0">
+                <a:solidFill>
+                  <a:srgbClr val="7030A0"/>
+                </a:solidFill>
+              </a:rPr>
+            </a:br>
+            <a:r>
+              <a:rPr lang="en-US" sz="1050" dirty="0" err="1">
+                <a:solidFill>
+                  <a:srgbClr val="7030A0"/>
+                </a:solidFill>
+              </a:rPr>
+              <a:t>ObservableList</a:t>
             </a:r>
             <a:endParaRPr lang="en-SG" sz="1050" dirty="0">
               <a:solidFill>
@@ -4678,25 +4735,26 @@
       </p:sp>
       <p:cxnSp>
         <p:nvCxnSpPr>
-          <p:cNvPr id="84" name="Elbow Connector 83"/>
+          <p:cNvPr id="124" name="Elbow Connector 122"/>
           <p:cNvCxnSpPr>
-            <a:stCxn id="78" idx="3"/>
-            <a:endCxn id="83" idx="1"/>
+            <a:stCxn id="119" idx="1"/>
+            <a:endCxn id="122" idx="1"/>
           </p:cNvCxnSpPr>
           <p:nvPr/>
         </p:nvCxnSpPr>
         <p:spPr>
-          <a:xfrm>
-            <a:off x="7277995" y="3034891"/>
-            <a:ext cx="434402" cy="318195"/>
-          </a:xfrm>
-          <a:prstGeom prst="bentConnector3">
+          <a:xfrm rot="16200000" flipH="1">
+            <a:off x="1364475" y="3719944"/>
+            <a:ext cx="831471" cy="554381"/>
+          </a:xfrm>
+          <a:prstGeom prst="bentConnector2">
             <a:avLst/>
           </a:prstGeom>
           <a:ln w="19050">
             <a:solidFill>
               <a:srgbClr val="7030A0"/>
             </a:solidFill>
+            <a:prstDash val="sysDot"/>
             <a:headEnd type="none" w="med" len="med"/>
             <a:tailEnd type="arrow" w="med" len="med"/>
           </a:ln>
@@ -4719,14 +4777,215 @@
       </p:cxnSp>
       <p:sp>
         <p:nvSpPr>
-          <p:cNvPr id="85" name="Rectangle 8"/>
+          <p:cNvPr id="54" name="TextBox 53"/>
+          <p:cNvSpPr txBox="1"/>
+          <p:nvPr/>
+        </p:nvSpPr>
+        <p:spPr>
+          <a:xfrm>
+            <a:off x="4737545" y="3066187"/>
+            <a:ext cx="189257" cy="178683"/>
+          </a:xfrm>
+          <a:prstGeom prst="rect">
+            <a:avLst/>
+          </a:prstGeom>
+          <a:noFill/>
+        </p:spPr>
+        <p:txBody>
+          <a:bodyPr wrap="square" lIns="0" tIns="0" rIns="0" bIns="0" rtlCol="0">
+            <a:noAutofit/>
+          </a:bodyPr>
+          <a:lstStyle/>
+          <a:p>
+            <a:pPr algn="ctr"/>
+            <a:r>
+              <a:rPr lang="en-US" sz="1100" dirty="0">
+                <a:solidFill>
+                  <a:srgbClr val="7030A0"/>
+                </a:solidFill>
+              </a:rPr>
+              <a:t>1</a:t>
+            </a:r>
+            <a:endParaRPr lang="en-SG" sz="1100" dirty="0">
+              <a:solidFill>
+                <a:srgbClr val="7030A0"/>
+              </a:solidFill>
+            </a:endParaRPr>
+          </a:p>
+        </p:txBody>
+      </p:sp>
+      <p:sp>
+        <p:nvSpPr>
+          <p:cNvPr id="61" name="TextBox 60"/>
+          <p:cNvSpPr txBox="1"/>
+          <p:nvPr/>
+        </p:nvSpPr>
+        <p:spPr>
+          <a:xfrm>
+            <a:off x="6553873" y="3097917"/>
+            <a:ext cx="189257" cy="178683"/>
+          </a:xfrm>
+          <a:prstGeom prst="rect">
+            <a:avLst/>
+          </a:prstGeom>
+          <a:noFill/>
+        </p:spPr>
+        <p:txBody>
+          <a:bodyPr wrap="square" lIns="0" tIns="0" rIns="0" bIns="0" rtlCol="0">
+            <a:noAutofit/>
+          </a:bodyPr>
+          <a:lstStyle/>
+          <a:p>
+            <a:pPr algn="ctr"/>
+            <a:r>
+              <a:rPr lang="en-US" sz="1100" dirty="0">
+                <a:solidFill>
+                  <a:srgbClr val="7030A0"/>
+                </a:solidFill>
+              </a:rPr>
+              <a:t>*</a:t>
+            </a:r>
+            <a:endParaRPr lang="en-SG" sz="1100" dirty="0">
+              <a:solidFill>
+                <a:srgbClr val="7030A0"/>
+              </a:solidFill>
+            </a:endParaRPr>
+          </a:p>
+        </p:txBody>
+      </p:sp>
+      <p:sp>
+        <p:nvSpPr>
+          <p:cNvPr id="65" name="TextBox 64"/>
+          <p:cNvSpPr txBox="1"/>
+          <p:nvPr/>
+        </p:nvSpPr>
+        <p:spPr>
+          <a:xfrm>
+            <a:off x="2560167" y="2753818"/>
+            <a:ext cx="78378" cy="193767"/>
+          </a:xfrm>
+          <a:prstGeom prst="rect">
+            <a:avLst/>
+          </a:prstGeom>
+          <a:noFill/>
+        </p:spPr>
+        <p:txBody>
+          <a:bodyPr wrap="square" lIns="0" tIns="0" rIns="0" bIns="0" rtlCol="0">
+            <a:noAutofit/>
+          </a:bodyPr>
+          <a:lstStyle/>
+          <a:p>
+            <a:pPr algn="ctr"/>
+            <a:r>
+              <a:rPr lang="en-US" sz="1100" dirty="0">
+                <a:solidFill>
+                  <a:srgbClr val="7030A0"/>
+                </a:solidFill>
+              </a:rPr>
+              <a:t>1</a:t>
+            </a:r>
+            <a:endParaRPr lang="en-SG" sz="1100" dirty="0">
+              <a:solidFill>
+                <a:srgbClr val="7030A0"/>
+              </a:solidFill>
+            </a:endParaRPr>
+          </a:p>
+        </p:txBody>
+      </p:sp>
+      <p:sp>
+        <p:nvSpPr>
+          <p:cNvPr id="66" name="TextBox 65"/>
+          <p:cNvSpPr txBox="1"/>
+          <p:nvPr/>
+        </p:nvSpPr>
+        <p:spPr>
+          <a:xfrm>
+            <a:off x="2707070" y="3667737"/>
+            <a:ext cx="189257" cy="178683"/>
+          </a:xfrm>
+          <a:prstGeom prst="rect">
+            <a:avLst/>
+          </a:prstGeom>
+          <a:noFill/>
+        </p:spPr>
+        <p:txBody>
+          <a:bodyPr wrap="square" lIns="0" tIns="0" rIns="0" bIns="0" rtlCol="0">
+            <a:noAutofit/>
+          </a:bodyPr>
+          <a:lstStyle/>
+          <a:p>
+            <a:pPr algn="ctr"/>
+            <a:r>
+              <a:rPr lang="en-US" sz="1100" dirty="0">
+                <a:solidFill>
+                  <a:srgbClr val="7030A0"/>
+                </a:solidFill>
+              </a:rPr>
+              <a:t>1</a:t>
+            </a:r>
+            <a:endParaRPr lang="en-SG" sz="1100" dirty="0">
+              <a:solidFill>
+                <a:srgbClr val="7030A0"/>
+              </a:solidFill>
+            </a:endParaRPr>
+          </a:p>
+        </p:txBody>
+      </p:sp>
+      <p:sp>
+        <p:nvSpPr>
+          <p:cNvPr id="70" name="TextBox 69"/>
+          <p:cNvSpPr txBox="1"/>
+          <p:nvPr/>
+        </p:nvSpPr>
+        <p:spPr>
+          <a:xfrm>
+            <a:off x="6868513" y="3204826"/>
+            <a:ext cx="189257" cy="178683"/>
+          </a:xfrm>
+          <a:prstGeom prst="rect">
+            <a:avLst/>
+          </a:prstGeom>
+          <a:noFill/>
+        </p:spPr>
+        <p:txBody>
+          <a:bodyPr wrap="square" lIns="0" tIns="0" rIns="0" bIns="0" rtlCol="0">
+            <a:noAutofit/>
+          </a:bodyPr>
+          <a:lstStyle/>
+          <a:p>
+            <a:pPr algn="ctr"/>
+            <a:r>
+              <a:rPr lang="en-US" sz="1100" dirty="0">
+                <a:solidFill>
+                  <a:srgbClr val="7030A0"/>
+                </a:solidFill>
+              </a:rPr>
+              <a:t>1</a:t>
+            </a:r>
+            <a:endParaRPr lang="en-SG" sz="1100" dirty="0">
+              <a:solidFill>
+                <a:srgbClr val="7030A0"/>
+              </a:solidFill>
+            </a:endParaRPr>
+          </a:p>
+        </p:txBody>
+      </p:sp>
+      <p:sp>
+        <p:nvSpPr>
+          <p:cNvPr id="52" name="Rectangle 8">
+            <a:extLst>
+              <a:ext uri="{FF2B5EF4-FFF2-40B4-BE49-F238E27FC236}">
+                <a16:creationId xmlns:a16="http://schemas.microsoft.com/office/drawing/2014/main" id="{ABDCDBD2-131A-4B66-A2F2-43BBEE82C773}"/>
+              </a:ext>
+            </a:extLst>
+          </p:cNvPr>
           <p:cNvSpPr/>
           <p:nvPr/>
         </p:nvSpPr>
         <p:spPr>
           <a:xfrm>
-            <a:off x="7712397" y="3533171"/>
-            <a:ext cx="708186" cy="285783"/>
+            <a:off x="5098289" y="2206861"/>
+            <a:ext cx="1204608" cy="285783"/>
           </a:xfrm>
           <a:prstGeom prst="rect">
             <a:avLst/>
@@ -4758,464 +5017,6 @@
           <a:p>
             <a:pPr algn="ctr"/>
             <a:r>
-              <a:rPr lang="en-US" sz="1050" dirty="0">
-                <a:solidFill>
-                  <a:srgbClr val="7030A0"/>
-                </a:solidFill>
-              </a:rPr>
-              <a:t>Address</a:t>
-            </a:r>
-            <a:endParaRPr lang="en-SG" sz="1050" dirty="0">
-              <a:solidFill>
-                <a:srgbClr val="7030A0"/>
-              </a:solidFill>
-            </a:endParaRPr>
-          </a:p>
-        </p:txBody>
-      </p:sp>
-      <p:cxnSp>
-        <p:nvCxnSpPr>
-          <p:cNvPr id="86" name="Elbow Connector 85"/>
-          <p:cNvCxnSpPr>
-            <a:stCxn id="78" idx="3"/>
-            <a:endCxn id="85" idx="1"/>
-          </p:cNvCxnSpPr>
-          <p:nvPr/>
-        </p:nvCxnSpPr>
-        <p:spPr>
-          <a:xfrm>
-            <a:off x="7277995" y="3034891"/>
-            <a:ext cx="434402" cy="641172"/>
-          </a:xfrm>
-          <a:prstGeom prst="bentConnector3">
-            <a:avLst/>
-          </a:prstGeom>
-          <a:ln w="19050">
-            <a:solidFill>
-              <a:srgbClr val="7030A0"/>
-            </a:solidFill>
-            <a:headEnd type="none" w="med" len="med"/>
-            <a:tailEnd type="arrow" w="med" len="med"/>
-          </a:ln>
-          <a:effectLst/>
-        </p:spPr>
-        <p:style>
-          <a:lnRef idx="1">
-            <a:schemeClr val="accent2"/>
-          </a:lnRef>
-          <a:fillRef idx="2">
-            <a:schemeClr val="accent2"/>
-          </a:fillRef>
-          <a:effectRef idx="1">
-            <a:schemeClr val="accent2"/>
-          </a:effectRef>
-          <a:fontRef idx="minor">
-            <a:schemeClr val="dk1"/>
-          </a:fontRef>
-        </p:style>
-      </p:cxnSp>
-      <p:sp>
-        <p:nvSpPr>
-          <p:cNvPr id="114" name="TextBox 113"/>
-          <p:cNvSpPr txBox="1"/>
-          <p:nvPr/>
-        </p:nvSpPr>
-        <p:spPr>
-          <a:xfrm rot="16200000">
-            <a:off x="6362886" y="3586305"/>
-            <a:ext cx="881018" cy="261610"/>
-          </a:xfrm>
-          <a:prstGeom prst="rect">
-            <a:avLst/>
-          </a:prstGeom>
-          <a:noFill/>
-        </p:spPr>
-        <p:txBody>
-          <a:bodyPr wrap="square" rtlCol="0">
-            <a:spAutoFit/>
-          </a:bodyPr>
-          <a:lstStyle/>
-          <a:p>
-            <a:pPr algn="r"/>
-            <a:r>
-              <a:rPr lang="en-US" sz="1100" dirty="0">
-                <a:solidFill>
-                  <a:srgbClr val="7030A0"/>
-                </a:solidFill>
-              </a:rPr>
-              <a:t>filtered list</a:t>
-            </a:r>
-            <a:endParaRPr lang="en-SG" sz="1100" dirty="0">
-              <a:solidFill>
-                <a:srgbClr val="7030A0"/>
-              </a:solidFill>
-            </a:endParaRPr>
-          </a:p>
-        </p:txBody>
-      </p:sp>
-      <p:sp>
-        <p:nvSpPr>
-          <p:cNvPr id="122" name="Rectangle 8"/>
-          <p:cNvSpPr/>
-          <p:nvPr/>
-        </p:nvSpPr>
-        <p:spPr>
-          <a:xfrm>
-            <a:off x="2057401" y="4239491"/>
-            <a:ext cx="1066800" cy="346760"/>
-          </a:xfrm>
-          <a:prstGeom prst="rect">
-            <a:avLst/>
-          </a:prstGeom>
-          <a:ln w="19050">
-            <a:solidFill>
-              <a:srgbClr val="7030A0"/>
-            </a:solidFill>
-          </a:ln>
-          <a:effectLst/>
-        </p:spPr>
-        <p:style>
-          <a:lnRef idx="1">
-            <a:schemeClr val="accent4"/>
-          </a:lnRef>
-          <a:fillRef idx="2">
-            <a:schemeClr val="accent4"/>
-          </a:fillRef>
-          <a:effectRef idx="1">
-            <a:schemeClr val="accent4"/>
-          </a:effectRef>
-          <a:fontRef idx="minor">
-            <a:schemeClr val="dk1"/>
-          </a:fontRef>
-        </p:style>
-        <p:txBody>
-          <a:bodyPr rtlCol="0" anchor="ctr"/>
-          <a:lstStyle/>
-          <a:p>
-            <a:pPr algn="ctr"/>
-            <a:r>
-              <a:rPr lang="en-US" sz="1050" dirty="0">
-                <a:solidFill>
-                  <a:srgbClr val="7030A0"/>
-                </a:solidFill>
-              </a:rPr>
-              <a:t>&lt;&lt;interface&gt;&gt;</a:t>
-            </a:r>
-            <a:r>
-              <a:rPr lang="en-US" sz="1050">
-                <a:solidFill>
-                  <a:srgbClr val="7030A0"/>
-                </a:solidFill>
-              </a:rPr>
-              <a:t/>
-            </a:r>
-            <a:br>
-              <a:rPr lang="en-US" sz="1050">
-                <a:solidFill>
-                  <a:srgbClr val="7030A0"/>
-                </a:solidFill>
-              </a:rPr>
-            </a:br>
-            <a:r>
-              <a:rPr lang="en-US" sz="1050" dirty="0" err="1">
-                <a:solidFill>
-                  <a:srgbClr val="7030A0"/>
-                </a:solidFill>
-              </a:rPr>
-              <a:t>ObservableList</a:t>
-            </a:r>
-            <a:endParaRPr lang="en-SG" sz="1050" dirty="0">
-              <a:solidFill>
-                <a:srgbClr val="7030A0"/>
-              </a:solidFill>
-            </a:endParaRPr>
-          </a:p>
-        </p:txBody>
-      </p:sp>
-      <p:cxnSp>
-        <p:nvCxnSpPr>
-          <p:cNvPr id="124" name="Elbow Connector 122"/>
-          <p:cNvCxnSpPr>
-            <a:stCxn id="119" idx="1"/>
-            <a:endCxn id="122" idx="1"/>
-          </p:cNvCxnSpPr>
-          <p:nvPr/>
-        </p:nvCxnSpPr>
-        <p:spPr>
-          <a:xfrm rot="16200000" flipH="1">
-            <a:off x="1364475" y="3719944"/>
-            <a:ext cx="831471" cy="554381"/>
-          </a:xfrm>
-          <a:prstGeom prst="bentConnector2">
-            <a:avLst/>
-          </a:prstGeom>
-          <a:ln w="19050">
-            <a:solidFill>
-              <a:srgbClr val="7030A0"/>
-            </a:solidFill>
-            <a:prstDash val="sysDot"/>
-            <a:headEnd type="none" w="med" len="med"/>
-            <a:tailEnd type="arrow" w="med" len="med"/>
-          </a:ln>
-          <a:effectLst/>
-        </p:spPr>
-        <p:style>
-          <a:lnRef idx="1">
-            <a:schemeClr val="accent2"/>
-          </a:lnRef>
-          <a:fillRef idx="2">
-            <a:schemeClr val="accent2"/>
-          </a:fillRef>
-          <a:effectRef idx="1">
-            <a:schemeClr val="accent2"/>
-          </a:effectRef>
-          <a:fontRef idx="minor">
-            <a:schemeClr val="dk1"/>
-          </a:fontRef>
-        </p:style>
-      </p:cxnSp>
-      <p:sp>
-        <p:nvSpPr>
-          <p:cNvPr id="54" name="TextBox 53"/>
-          <p:cNvSpPr txBox="1"/>
-          <p:nvPr/>
-        </p:nvSpPr>
-        <p:spPr>
-          <a:xfrm>
-            <a:off x="4324972" y="3058864"/>
-            <a:ext cx="189257" cy="178683"/>
-          </a:xfrm>
-          <a:prstGeom prst="rect">
-            <a:avLst/>
-          </a:prstGeom>
-          <a:noFill/>
-        </p:spPr>
-        <p:txBody>
-          <a:bodyPr wrap="square" lIns="0" tIns="0" rIns="0" bIns="0" rtlCol="0">
-            <a:noAutofit/>
-          </a:bodyPr>
-          <a:lstStyle/>
-          <a:p>
-            <a:pPr algn="ctr"/>
-            <a:r>
-              <a:rPr lang="en-US" sz="1100" dirty="0">
-                <a:solidFill>
-                  <a:srgbClr val="7030A0"/>
-                </a:solidFill>
-              </a:rPr>
-              <a:t>1</a:t>
-            </a:r>
-            <a:endParaRPr lang="en-SG" sz="1100" dirty="0">
-              <a:solidFill>
-                <a:srgbClr val="7030A0"/>
-              </a:solidFill>
-            </a:endParaRPr>
-          </a:p>
-        </p:txBody>
-      </p:sp>
-      <p:sp>
-        <p:nvSpPr>
-          <p:cNvPr id="61" name="TextBox 60"/>
-          <p:cNvSpPr txBox="1"/>
-          <p:nvPr/>
-        </p:nvSpPr>
-        <p:spPr>
-          <a:xfrm>
-            <a:off x="6135256" y="3097917"/>
-            <a:ext cx="189257" cy="178683"/>
-          </a:xfrm>
-          <a:prstGeom prst="rect">
-            <a:avLst/>
-          </a:prstGeom>
-          <a:noFill/>
-        </p:spPr>
-        <p:txBody>
-          <a:bodyPr wrap="square" lIns="0" tIns="0" rIns="0" bIns="0" rtlCol="0">
-            <a:noAutofit/>
-          </a:bodyPr>
-          <a:lstStyle/>
-          <a:p>
-            <a:pPr algn="ctr"/>
-            <a:r>
-              <a:rPr lang="en-US" sz="1100" dirty="0">
-                <a:solidFill>
-                  <a:srgbClr val="7030A0"/>
-                </a:solidFill>
-              </a:rPr>
-              <a:t>*</a:t>
-            </a:r>
-            <a:endParaRPr lang="en-SG" sz="1100" dirty="0">
-              <a:solidFill>
-                <a:srgbClr val="7030A0"/>
-              </a:solidFill>
-            </a:endParaRPr>
-          </a:p>
-        </p:txBody>
-      </p:sp>
-      <p:sp>
-        <p:nvSpPr>
-          <p:cNvPr id="65" name="TextBox 64"/>
-          <p:cNvSpPr txBox="1"/>
-          <p:nvPr/>
-        </p:nvSpPr>
-        <p:spPr>
-          <a:xfrm>
-            <a:off x="2560167" y="2753818"/>
-            <a:ext cx="78378" cy="193767"/>
-          </a:xfrm>
-          <a:prstGeom prst="rect">
-            <a:avLst/>
-          </a:prstGeom>
-          <a:noFill/>
-        </p:spPr>
-        <p:txBody>
-          <a:bodyPr wrap="square" lIns="0" tIns="0" rIns="0" bIns="0" rtlCol="0">
-            <a:noAutofit/>
-          </a:bodyPr>
-          <a:lstStyle/>
-          <a:p>
-            <a:pPr algn="ctr"/>
-            <a:r>
-              <a:rPr lang="en-US" sz="1100" dirty="0">
-                <a:solidFill>
-                  <a:srgbClr val="7030A0"/>
-                </a:solidFill>
-              </a:rPr>
-              <a:t>1</a:t>
-            </a:r>
-            <a:endParaRPr lang="en-SG" sz="1100" dirty="0">
-              <a:solidFill>
-                <a:srgbClr val="7030A0"/>
-              </a:solidFill>
-            </a:endParaRPr>
-          </a:p>
-        </p:txBody>
-      </p:sp>
-      <p:sp>
-        <p:nvSpPr>
-          <p:cNvPr id="66" name="TextBox 65"/>
-          <p:cNvSpPr txBox="1"/>
-          <p:nvPr/>
-        </p:nvSpPr>
-        <p:spPr>
-          <a:xfrm>
-            <a:off x="2707070" y="3667737"/>
-            <a:ext cx="189257" cy="178683"/>
-          </a:xfrm>
-          <a:prstGeom prst="rect">
-            <a:avLst/>
-          </a:prstGeom>
-          <a:noFill/>
-        </p:spPr>
-        <p:txBody>
-          <a:bodyPr wrap="square" lIns="0" tIns="0" rIns="0" bIns="0" rtlCol="0">
-            <a:noAutofit/>
-          </a:bodyPr>
-          <a:lstStyle/>
-          <a:p>
-            <a:pPr algn="ctr"/>
-            <a:r>
-              <a:rPr lang="en-US" sz="1100" dirty="0">
-                <a:solidFill>
-                  <a:srgbClr val="7030A0"/>
-                </a:solidFill>
-              </a:rPr>
-              <a:t>1</a:t>
-            </a:r>
-            <a:endParaRPr lang="en-SG" sz="1100" dirty="0">
-              <a:solidFill>
-                <a:srgbClr val="7030A0"/>
-              </a:solidFill>
-            </a:endParaRPr>
-          </a:p>
-        </p:txBody>
-      </p:sp>
-      <p:sp>
-        <p:nvSpPr>
-          <p:cNvPr id="70" name="TextBox 69"/>
-          <p:cNvSpPr txBox="1"/>
-          <p:nvPr/>
-        </p:nvSpPr>
-        <p:spPr>
-          <a:xfrm>
-            <a:off x="6449896" y="3204826"/>
-            <a:ext cx="189257" cy="178683"/>
-          </a:xfrm>
-          <a:prstGeom prst="rect">
-            <a:avLst/>
-          </a:prstGeom>
-          <a:noFill/>
-        </p:spPr>
-        <p:txBody>
-          <a:bodyPr wrap="square" lIns="0" tIns="0" rIns="0" bIns="0" rtlCol="0">
-            <a:noAutofit/>
-          </a:bodyPr>
-          <a:lstStyle/>
-          <a:p>
-            <a:pPr algn="ctr"/>
-            <a:r>
-              <a:rPr lang="en-US" sz="1100" dirty="0">
-                <a:solidFill>
-                  <a:srgbClr val="7030A0"/>
-                </a:solidFill>
-              </a:rPr>
-              <a:t>1</a:t>
-            </a:r>
-            <a:endParaRPr lang="en-SG" sz="1100" dirty="0">
-              <a:solidFill>
-                <a:srgbClr val="7030A0"/>
-              </a:solidFill>
-            </a:endParaRPr>
-          </a:p>
-        </p:txBody>
-      </p:sp>
-      <p:sp>
-        <p:nvSpPr>
-          <p:cNvPr id="52" name="Rectangle 8">
-            <a:extLst>
-              <a:ext uri="{FF2B5EF4-FFF2-40B4-BE49-F238E27FC236}">
-                <a16:creationId xmlns:a16="http://schemas.microsoft.com/office/drawing/2014/main" id="{ABDCDBD2-131A-4B66-A2F2-43BBEE82C773}"/>
-              </a:ext>
-            </a:extLst>
-          </p:cNvPr>
-          <p:cNvSpPr/>
-          <p:nvPr/>
-        </p:nvSpPr>
-        <p:spPr>
-          <a:xfrm>
-            <a:off x="4755872" y="2206861"/>
-            <a:ext cx="1156969" cy="285783"/>
-          </a:xfrm>
-          <a:prstGeom prst="rect">
-            <a:avLst/>
-          </a:prstGeom>
-          <a:ln w="19050">
-            <a:solidFill>
-              <a:srgbClr val="7030A0"/>
-            </a:solidFill>
-          </a:ln>
-          <a:effectLst/>
-        </p:spPr>
-        <p:style>
-          <a:lnRef idx="1">
-            <a:schemeClr val="accent4"/>
-          </a:lnRef>
-          <a:fillRef idx="2">
-            <a:schemeClr val="accent4"/>
-          </a:fillRef>
-          <a:effectRef idx="1">
-            <a:schemeClr val="accent4"/>
-          </a:effectRef>
-          <a:fontRef idx="minor">
-            <a:schemeClr val="dk1"/>
-          </a:fontRef>
-        </p:style>
-        <p:txBody>
-          <a:bodyPr rtlCol="0" anchor="ctr"/>
-          <a:lstStyle/>
-          <a:p>
-            <a:pPr algn="ctr"/>
-            <a:r>
               <a:rPr lang="en-US" sz="1050" dirty="0" err="1">
                 <a:solidFill>
                   <a:srgbClr val="7030A0"/>
@@ -5242,416 +5043,18 @@
           </p:cNvPr>
           <p:cNvCxnSpPr>
             <a:cxnSpLocks/>
-            <a:stCxn id="54" idx="0"/>
+            <a:stCxn id="51" idx="0"/>
             <a:endCxn id="52" idx="1"/>
           </p:cNvCxnSpPr>
           <p:nvPr/>
         </p:nvCxnSpPr>
         <p:spPr>
           <a:xfrm rot="5400000" flipH="1" flipV="1">
-            <a:off x="4233181" y="2536174"/>
-            <a:ext cx="709111" cy="336271"/>
+            <a:off x="4601903" y="2462000"/>
+            <a:ext cx="608632" cy="384139"/>
           </a:xfrm>
           <a:prstGeom prst="bentConnector2">
             <a:avLst/>
-          </a:prstGeom>
-          <a:ln w="19050">
-            <a:solidFill>
-              <a:srgbClr val="7030A0"/>
-            </a:solidFill>
-            <a:headEnd type="none" w="med" len="med"/>
-            <a:tailEnd type="arrow" w="med" len="med"/>
-          </a:ln>
-          <a:effectLst/>
-        </p:spPr>
-        <p:style>
-          <a:lnRef idx="1">
-            <a:schemeClr val="accent2"/>
-          </a:lnRef>
-          <a:fillRef idx="2">
-            <a:schemeClr val="accent2"/>
-          </a:fillRef>
-          <a:effectRef idx="1">
-            <a:schemeClr val="accent2"/>
-          </a:effectRef>
-          <a:fontRef idx="minor">
-            <a:schemeClr val="dk1"/>
-          </a:fontRef>
-        </p:style>
-      </p:cxnSp>
-      <p:sp>
-        <p:nvSpPr>
-          <p:cNvPr id="50" name="TextBox 49">
-            <a:extLst>
-              <a:ext uri="{FF2B5EF4-FFF2-40B4-BE49-F238E27FC236}">
-                <a16:creationId xmlns:a16="http://schemas.microsoft.com/office/drawing/2014/main" id="{B3FA9D57-880F-49C4-AD0B-A64E30D6F403}"/>
-              </a:ext>
-            </a:extLst>
-          </p:cNvPr>
-          <p:cNvSpPr txBox="1"/>
-          <p:nvPr/>
-        </p:nvSpPr>
-        <p:spPr>
-          <a:xfrm>
-            <a:off x="6714344" y="2430721"/>
-            <a:ext cx="189257" cy="178683"/>
-          </a:xfrm>
-          <a:prstGeom prst="rect">
-            <a:avLst/>
-          </a:prstGeom>
-          <a:noFill/>
-        </p:spPr>
-        <p:txBody>
-          <a:bodyPr wrap="square" lIns="0" tIns="0" rIns="0" bIns="0" rtlCol="0">
-            <a:noAutofit/>
-          </a:bodyPr>
-          <a:lstStyle/>
-          <a:p>
-            <a:pPr algn="ctr"/>
-            <a:r>
-              <a:rPr lang="en-US" sz="1100" dirty="0">
-                <a:solidFill>
-                  <a:srgbClr val="7030A0"/>
-                </a:solidFill>
-              </a:rPr>
-              <a:t>*</a:t>
-            </a:r>
-            <a:endParaRPr lang="en-SG" sz="1100" dirty="0">
-              <a:solidFill>
-                <a:srgbClr val="7030A0"/>
-              </a:solidFill>
-            </a:endParaRPr>
-          </a:p>
-        </p:txBody>
-      </p:sp>
-      <p:sp>
-        <p:nvSpPr>
-          <p:cNvPr id="55" name="Flowchart: Decision 96">
-            <a:extLst>
-              <a:ext uri="{FF2B5EF4-FFF2-40B4-BE49-F238E27FC236}">
-                <a16:creationId xmlns:a16="http://schemas.microsoft.com/office/drawing/2014/main" id="{B9F96195-942D-4692-91B7-CF34229E7461}"/>
-              </a:ext>
-            </a:extLst>
-          </p:cNvPr>
-          <p:cNvSpPr/>
-          <p:nvPr/>
-        </p:nvSpPr>
-        <p:spPr>
-          <a:xfrm rot="16200000">
-            <a:off x="6553482" y="2664721"/>
-            <a:ext cx="236048" cy="173380"/>
-          </a:xfrm>
-          <a:prstGeom prst="flowChartDecision">
-            <a:avLst/>
-          </a:prstGeom>
-          <a:noFill/>
-          <a:ln w="19050">
-            <a:solidFill>
-              <a:srgbClr val="7030A0"/>
-            </a:solidFill>
-          </a:ln>
-          <a:effectLst/>
-        </p:spPr>
-        <p:style>
-          <a:lnRef idx="1">
-            <a:schemeClr val="accent6"/>
-          </a:lnRef>
-          <a:fillRef idx="2">
-            <a:schemeClr val="accent6"/>
-          </a:fillRef>
-          <a:effectRef idx="1">
-            <a:schemeClr val="accent6"/>
-          </a:effectRef>
-          <a:fontRef idx="minor">
-            <a:schemeClr val="dk1"/>
-          </a:fontRef>
-        </p:style>
-        <p:txBody>
-          <a:bodyPr rtlCol="0" anchor="ctr"/>
-          <a:lstStyle/>
-          <a:p>
-            <a:pPr algn="ctr"/>
-            <a:endParaRPr lang="en-US" sz="1050"/>
-          </a:p>
-        </p:txBody>
-      </p:sp>
-      <p:cxnSp>
-        <p:nvCxnSpPr>
-          <p:cNvPr id="59" name="Elbow Connector 63">
-            <a:extLst>
-              <a:ext uri="{FF2B5EF4-FFF2-40B4-BE49-F238E27FC236}">
-                <a16:creationId xmlns:a16="http://schemas.microsoft.com/office/drawing/2014/main" id="{E2D6A56C-A223-4236-A1F0-7EFEBA2FC940}"/>
-              </a:ext>
-            </a:extLst>
-          </p:cNvPr>
-          <p:cNvCxnSpPr>
-            <a:cxnSpLocks/>
-            <a:endCxn id="67" idx="1"/>
-          </p:cNvCxnSpPr>
-          <p:nvPr/>
-        </p:nvCxnSpPr>
-        <p:spPr>
-          <a:xfrm flipV="1">
-            <a:off x="5884280" y="2233006"/>
-            <a:ext cx="432916" cy="111294"/>
-          </a:xfrm>
-          <a:prstGeom prst="bentConnector3">
-            <a:avLst/>
-          </a:prstGeom>
-          <a:ln w="19050">
-            <a:solidFill>
-              <a:srgbClr val="7030A0"/>
-            </a:solidFill>
-            <a:headEnd type="none" w="med" len="med"/>
-            <a:tailEnd type="arrow" w="med" len="med"/>
-          </a:ln>
-          <a:effectLst/>
-        </p:spPr>
-        <p:style>
-          <a:lnRef idx="1">
-            <a:schemeClr val="accent2"/>
-          </a:lnRef>
-          <a:fillRef idx="2">
-            <a:schemeClr val="accent2"/>
-          </a:fillRef>
-          <a:effectRef idx="1">
-            <a:schemeClr val="accent2"/>
-          </a:effectRef>
-          <a:fontRef idx="minor">
-            <a:schemeClr val="dk1"/>
-          </a:fontRef>
-        </p:style>
-      </p:cxnSp>
-      <p:sp>
-        <p:nvSpPr>
-          <p:cNvPr id="67" name="Rectangle 8">
-            <a:extLst>
-              <a:ext uri="{FF2B5EF4-FFF2-40B4-BE49-F238E27FC236}">
-                <a16:creationId xmlns:a16="http://schemas.microsoft.com/office/drawing/2014/main" id="{36D68104-33BB-4C8F-B764-F3F0B25E592B}"/>
-              </a:ext>
-            </a:extLst>
-          </p:cNvPr>
-          <p:cNvSpPr/>
-          <p:nvPr/>
-        </p:nvSpPr>
-        <p:spPr>
-          <a:xfrm>
-            <a:off x="6317196" y="2059626"/>
-            <a:ext cx="708186" cy="346760"/>
-          </a:xfrm>
-          <a:prstGeom prst="rect">
-            <a:avLst/>
-          </a:prstGeom>
-          <a:ln w="19050">
-            <a:solidFill>
-              <a:srgbClr val="7030A0"/>
-            </a:solidFill>
-          </a:ln>
-          <a:effectLst/>
-        </p:spPr>
-        <p:style>
-          <a:lnRef idx="1">
-            <a:schemeClr val="accent4"/>
-          </a:lnRef>
-          <a:fillRef idx="2">
-            <a:schemeClr val="accent4"/>
-          </a:fillRef>
-          <a:effectRef idx="1">
-            <a:schemeClr val="accent4"/>
-          </a:effectRef>
-          <a:fontRef idx="minor">
-            <a:schemeClr val="dk1"/>
-          </a:fontRef>
-        </p:style>
-        <p:txBody>
-          <a:bodyPr rtlCol="0" anchor="ctr"/>
-          <a:lstStyle/>
-          <a:p>
-            <a:pPr algn="ctr"/>
-            <a:r>
-              <a:rPr lang="en-US" sz="1050" dirty="0">
-                <a:solidFill>
-                  <a:srgbClr val="7030A0"/>
-                </a:solidFill>
-              </a:rPr>
-              <a:t>Tag</a:t>
-            </a:r>
-            <a:endParaRPr lang="en-SG" sz="1050" dirty="0">
-              <a:solidFill>
-                <a:srgbClr val="7030A0"/>
-              </a:solidFill>
-            </a:endParaRPr>
-          </a:p>
-        </p:txBody>
-      </p:sp>
-      <p:sp>
-        <p:nvSpPr>
-          <p:cNvPr id="68" name="TextBox 67">
-            <a:extLst>
-              <a:ext uri="{FF2B5EF4-FFF2-40B4-BE49-F238E27FC236}">
-                <a16:creationId xmlns:a16="http://schemas.microsoft.com/office/drawing/2014/main" id="{18A2ABF0-4DA8-43EE-BACE-A737C4E4CFEC}"/>
-              </a:ext>
-            </a:extLst>
-          </p:cNvPr>
-          <p:cNvSpPr txBox="1"/>
-          <p:nvPr/>
-        </p:nvSpPr>
-        <p:spPr>
-          <a:xfrm>
-            <a:off x="6135256" y="2278014"/>
-            <a:ext cx="189257" cy="178683"/>
-          </a:xfrm>
-          <a:prstGeom prst="rect">
-            <a:avLst/>
-          </a:prstGeom>
-          <a:noFill/>
-        </p:spPr>
-        <p:txBody>
-          <a:bodyPr wrap="square" lIns="0" tIns="0" rIns="0" bIns="0" rtlCol="0">
-            <a:noAutofit/>
-          </a:bodyPr>
-          <a:lstStyle/>
-          <a:p>
-            <a:pPr algn="ctr"/>
-            <a:r>
-              <a:rPr lang="en-US" sz="1100" dirty="0">
-                <a:solidFill>
-                  <a:srgbClr val="7030A0"/>
-                </a:solidFill>
-              </a:rPr>
-              <a:t>*</a:t>
-            </a:r>
-            <a:endParaRPr lang="en-SG" sz="1100" dirty="0">
-              <a:solidFill>
-                <a:srgbClr val="7030A0"/>
-              </a:solidFill>
-            </a:endParaRPr>
-          </a:p>
-        </p:txBody>
-      </p:sp>
-      <p:sp>
-        <p:nvSpPr>
-          <p:cNvPr id="69" name="TextBox 68">
-            <a:extLst>
-              <a:ext uri="{FF2B5EF4-FFF2-40B4-BE49-F238E27FC236}">
-                <a16:creationId xmlns:a16="http://schemas.microsoft.com/office/drawing/2014/main" id="{8CF9406A-39C7-4163-8880-BB65541FC08E}"/>
-              </a:ext>
-            </a:extLst>
-          </p:cNvPr>
-          <p:cNvSpPr txBox="1"/>
-          <p:nvPr/>
-        </p:nvSpPr>
-        <p:spPr>
-          <a:xfrm>
-            <a:off x="4367100" y="2172972"/>
-            <a:ext cx="189257" cy="178683"/>
-          </a:xfrm>
-          <a:prstGeom prst="rect">
-            <a:avLst/>
-          </a:prstGeom>
-          <a:noFill/>
-        </p:spPr>
-        <p:txBody>
-          <a:bodyPr wrap="square" lIns="0" tIns="0" rIns="0" bIns="0" rtlCol="0">
-            <a:noAutofit/>
-          </a:bodyPr>
-          <a:lstStyle/>
-          <a:p>
-            <a:pPr algn="ctr"/>
-            <a:r>
-              <a:rPr lang="en-US" sz="1100" dirty="0">
-                <a:solidFill>
-                  <a:srgbClr val="7030A0"/>
-                </a:solidFill>
-              </a:rPr>
-              <a:t>1</a:t>
-            </a:r>
-            <a:endParaRPr lang="en-SG" sz="1100" dirty="0">
-              <a:solidFill>
-                <a:srgbClr val="7030A0"/>
-              </a:solidFill>
-            </a:endParaRPr>
-          </a:p>
-        </p:txBody>
-      </p:sp>
-      <p:sp>
-        <p:nvSpPr>
-          <p:cNvPr id="71" name="Flowchart: Decision 96">
-            <a:extLst>
-              <a:ext uri="{FF2B5EF4-FFF2-40B4-BE49-F238E27FC236}">
-                <a16:creationId xmlns:a16="http://schemas.microsoft.com/office/drawing/2014/main" id="{233007D4-EEA2-4CA6-ACFE-1517B654224E}"/>
-              </a:ext>
-            </a:extLst>
-          </p:cNvPr>
-          <p:cNvSpPr/>
-          <p:nvPr/>
-        </p:nvSpPr>
-        <p:spPr>
-          <a:xfrm>
-            <a:off x="5911329" y="2262081"/>
-            <a:ext cx="236048" cy="173380"/>
-          </a:xfrm>
-          <a:prstGeom prst="flowChartDecision">
-            <a:avLst/>
-          </a:prstGeom>
-          <a:solidFill>
-            <a:srgbClr val="7030A0"/>
-          </a:solidFill>
-          <a:ln w="19050">
-            <a:solidFill>
-              <a:srgbClr val="7030A0"/>
-            </a:solidFill>
-          </a:ln>
-          <a:effectLst/>
-        </p:spPr>
-        <p:style>
-          <a:lnRef idx="1">
-            <a:schemeClr val="accent6"/>
-          </a:lnRef>
-          <a:fillRef idx="2">
-            <a:schemeClr val="accent6"/>
-          </a:fillRef>
-          <a:effectRef idx="1">
-            <a:schemeClr val="accent6"/>
-          </a:effectRef>
-          <a:fontRef idx="minor">
-            <a:schemeClr val="dk1"/>
-          </a:fontRef>
-        </p:style>
-        <p:txBody>
-          <a:bodyPr rtlCol="0" anchor="ctr"/>
-          <a:lstStyle/>
-          <a:p>
-            <a:pPr algn="ctr"/>
-            <a:endParaRPr lang="en-US" sz="1050"/>
-          </a:p>
-        </p:txBody>
-      </p:sp>
-      <p:cxnSp>
-        <p:nvCxnSpPr>
-          <p:cNvPr id="72" name="Elbow Connector 78">
-            <a:extLst>
-              <a:ext uri="{FF2B5EF4-FFF2-40B4-BE49-F238E27FC236}">
-                <a16:creationId xmlns:a16="http://schemas.microsoft.com/office/drawing/2014/main" id="{D5DFB8C5-B0B0-46C1-967B-4449112ABD6F}"/>
-              </a:ext>
-            </a:extLst>
-          </p:cNvPr>
-          <p:cNvCxnSpPr>
-            <a:cxnSpLocks/>
-            <a:stCxn id="55" idx="3"/>
-            <a:endCxn id="67" idx="2"/>
-          </p:cNvCxnSpPr>
-          <p:nvPr/>
-        </p:nvCxnSpPr>
-        <p:spPr>
-          <a:xfrm rot="16200000" flipV="1">
-            <a:off x="6557898" y="2519778"/>
-            <a:ext cx="227001" cy="217"/>
-          </a:xfrm>
-          <a:prstGeom prst="bentConnector3">
-            <a:avLst>
-              <a:gd name="adj1" fmla="val 50000"/>
-            </a:avLst>
           </a:prstGeom>
           <a:ln w="19050">
             <a:solidFill>
@@ -5679,29 +5082,34 @@
       </p:cxnSp>
       <p:cxnSp>
         <p:nvCxnSpPr>
-          <p:cNvPr id="90" name="Elbow Connector 63"/>
+          <p:cNvPr id="59" name="Elbow Connector 63">
+            <a:extLst>
+              <a:ext uri="{FF2B5EF4-FFF2-40B4-BE49-F238E27FC236}">
+                <a16:creationId xmlns:a16="http://schemas.microsoft.com/office/drawing/2014/main" id="{E2D6A56C-A223-4236-A1F0-7EFEBA2FC940}"/>
+              </a:ext>
+            </a:extLst>
+          </p:cNvPr>
           <p:cNvCxnSpPr>
-            <a:stCxn id="91" idx="3"/>
+            <a:cxnSpLocks/>
+            <a:stCxn id="71" idx="3"/>
+            <a:endCxn id="67" idx="1"/>
           </p:cNvCxnSpPr>
           <p:nvPr/>
         </p:nvCxnSpPr>
         <p:spPr>
-          <a:xfrm rot="5400000">
-            <a:off x="3470636" y="2687353"/>
-            <a:ext cx="293825" cy="5938"/>
+          <a:xfrm>
+            <a:off x="6565994" y="2348771"/>
+            <a:ext cx="166300" cy="73"/>
           </a:xfrm>
           <a:prstGeom prst="bentConnector3">
-            <a:avLst>
-              <a:gd name="adj1" fmla="val 50000"/>
-            </a:avLst>
+            <a:avLst/>
           </a:prstGeom>
           <a:ln w="19050">
             <a:solidFill>
               <a:srgbClr val="7030A0"/>
             </a:solidFill>
-            <a:prstDash val="sysDot"/>
             <a:headEnd type="none" w="med" len="med"/>
-            <a:tailEnd type="none" w="med" len="med"/>
+            <a:tailEnd type="arrow" w="med" len="med"/>
           </a:ln>
           <a:effectLst/>
         </p:spPr>
@@ -5722,16 +5130,22 @@
       </p:cxnSp>
       <p:sp>
         <p:nvSpPr>
-          <p:cNvPr id="91" name="Isosceles Triangle 102"/>
+          <p:cNvPr id="67" name="Rectangle 8">
+            <a:extLst>
+              <a:ext uri="{FF2B5EF4-FFF2-40B4-BE49-F238E27FC236}">
+                <a16:creationId xmlns:a16="http://schemas.microsoft.com/office/drawing/2014/main" id="{36D68104-33BB-4C8F-B764-F3F0B25E592B}"/>
+              </a:ext>
+            </a:extLst>
+          </p:cNvPr>
           <p:cNvSpPr/>
           <p:nvPr/>
         </p:nvSpPr>
         <p:spPr>
-          <a:xfrm rot="10800000" flipV="1">
-            <a:off x="3479324" y="2386348"/>
-            <a:ext cx="282387" cy="157062"/>
-          </a:xfrm>
-          <a:prstGeom prst="triangle">
+          <a:xfrm>
+            <a:off x="6732294" y="2175464"/>
+            <a:ext cx="708186" cy="346760"/>
+          </a:xfrm>
+          <a:prstGeom prst="rect">
             <a:avLst/>
           </a:prstGeom>
           <a:ln w="19050">
@@ -5760,9 +5174,17 @@
           <a:lstStyle/>
           <a:p>
             <a:pPr algn="ctr"/>
-            <a:endParaRPr lang="en-SG" sz="1050" b="1">
+            <a:r>
+              <a:rPr lang="en-US" sz="1050" dirty="0">
+                <a:solidFill>
+                  <a:srgbClr val="7030A0"/>
+                </a:solidFill>
+              </a:rPr>
+              <a:t>Tag</a:t>
+            </a:r>
+            <a:endParaRPr lang="en-SG" sz="1050" dirty="0">
               <a:solidFill>
-                <a:srgbClr val="92D050"/>
+                <a:srgbClr val="7030A0"/>
               </a:solidFill>
             </a:endParaRPr>
           </a:p>
@@ -5770,16 +5192,202 @@
       </p:sp>
       <p:sp>
         <p:nvSpPr>
-          <p:cNvPr id="92" name="Rectangle 8"/>
+          <p:cNvPr id="68" name="TextBox 67">
+            <a:extLst>
+              <a:ext uri="{FF2B5EF4-FFF2-40B4-BE49-F238E27FC236}">
+                <a16:creationId xmlns:a16="http://schemas.microsoft.com/office/drawing/2014/main" id="{18A2ABF0-4DA8-43EE-BACE-A737C4E4CFEC}"/>
+              </a:ext>
+            </a:extLst>
+          </p:cNvPr>
+          <p:cNvSpPr txBox="1"/>
+          <p:nvPr/>
+        </p:nvSpPr>
+        <p:spPr>
+          <a:xfrm>
+            <a:off x="6489577" y="2155021"/>
+            <a:ext cx="232097" cy="188684"/>
+          </a:xfrm>
+          <a:prstGeom prst="rect">
+            <a:avLst/>
+          </a:prstGeom>
+          <a:noFill/>
+        </p:spPr>
+        <p:txBody>
+          <a:bodyPr wrap="square" lIns="0" tIns="0" rIns="0" bIns="0" rtlCol="0">
+            <a:noAutofit/>
+          </a:bodyPr>
+          <a:lstStyle/>
+          <a:p>
+            <a:pPr algn="ctr"/>
+            <a:r>
+              <a:rPr lang="en-US" sz="1100" dirty="0">
+                <a:solidFill>
+                  <a:srgbClr val="7030A0"/>
+                </a:solidFill>
+              </a:rPr>
+              <a:t>*</a:t>
+            </a:r>
+            <a:endParaRPr lang="en-SG" sz="1100" dirty="0">
+              <a:solidFill>
+                <a:srgbClr val="7030A0"/>
+              </a:solidFill>
+            </a:endParaRPr>
+          </a:p>
+        </p:txBody>
+      </p:sp>
+      <p:sp>
+        <p:nvSpPr>
+          <p:cNvPr id="69" name="TextBox 68">
+            <a:extLst>
+              <a:ext uri="{FF2B5EF4-FFF2-40B4-BE49-F238E27FC236}">
+                <a16:creationId xmlns:a16="http://schemas.microsoft.com/office/drawing/2014/main" id="{8CF9406A-39C7-4163-8880-BB65541FC08E}"/>
+              </a:ext>
+            </a:extLst>
+          </p:cNvPr>
+          <p:cNvSpPr txBox="1"/>
+          <p:nvPr/>
+        </p:nvSpPr>
+        <p:spPr>
+          <a:xfrm>
+            <a:off x="4709517" y="2172972"/>
+            <a:ext cx="189257" cy="178683"/>
+          </a:xfrm>
+          <a:prstGeom prst="rect">
+            <a:avLst/>
+          </a:prstGeom>
+          <a:noFill/>
+        </p:spPr>
+        <p:txBody>
+          <a:bodyPr wrap="square" lIns="0" tIns="0" rIns="0" bIns="0" rtlCol="0">
+            <a:noAutofit/>
+          </a:bodyPr>
+          <a:lstStyle/>
+          <a:p>
+            <a:pPr algn="ctr"/>
+            <a:r>
+              <a:rPr lang="en-US" sz="1100" dirty="0">
+                <a:solidFill>
+                  <a:srgbClr val="7030A0"/>
+                </a:solidFill>
+              </a:rPr>
+              <a:t>1</a:t>
+            </a:r>
+            <a:endParaRPr lang="en-SG" sz="1100" dirty="0">
+              <a:solidFill>
+                <a:srgbClr val="7030A0"/>
+              </a:solidFill>
+            </a:endParaRPr>
+          </a:p>
+        </p:txBody>
+      </p:sp>
+      <p:sp>
+        <p:nvSpPr>
+          <p:cNvPr id="71" name="Flowchart: Decision 96">
+            <a:extLst>
+              <a:ext uri="{FF2B5EF4-FFF2-40B4-BE49-F238E27FC236}">
+                <a16:creationId xmlns:a16="http://schemas.microsoft.com/office/drawing/2014/main" id="{233007D4-EEA2-4CA6-ACFE-1517B654224E}"/>
+              </a:ext>
+            </a:extLst>
+          </p:cNvPr>
           <p:cNvSpPr/>
           <p:nvPr/>
         </p:nvSpPr>
         <p:spPr>
           <a:xfrm>
-            <a:off x="1177947" y="1998144"/>
-            <a:ext cx="1443661" cy="364396"/>
-          </a:xfrm>
-          <a:prstGeom prst="rect">
+            <a:off x="6329946" y="2262081"/>
+            <a:ext cx="236048" cy="173380"/>
+          </a:xfrm>
+          <a:prstGeom prst="flowChartDecision">
+            <a:avLst/>
+          </a:prstGeom>
+          <a:solidFill>
+            <a:srgbClr val="7030A0"/>
+          </a:solidFill>
+          <a:ln w="19050">
+            <a:solidFill>
+              <a:srgbClr val="7030A0"/>
+            </a:solidFill>
+          </a:ln>
+          <a:effectLst/>
+        </p:spPr>
+        <p:style>
+          <a:lnRef idx="1">
+            <a:schemeClr val="accent6"/>
+          </a:lnRef>
+          <a:fillRef idx="2">
+            <a:schemeClr val="accent6"/>
+          </a:fillRef>
+          <a:effectRef idx="1">
+            <a:schemeClr val="accent6"/>
+          </a:effectRef>
+          <a:fontRef idx="minor">
+            <a:schemeClr val="dk1"/>
+          </a:fontRef>
+        </p:style>
+        <p:txBody>
+          <a:bodyPr rtlCol="0" anchor="ctr"/>
+          <a:lstStyle/>
+          <a:p>
+            <a:pPr algn="ctr"/>
+            <a:endParaRPr lang="en-US" sz="1050"/>
+          </a:p>
+        </p:txBody>
+      </p:sp>
+      <p:cxnSp>
+        <p:nvCxnSpPr>
+          <p:cNvPr id="90" name="Elbow Connector 63"/>
+          <p:cNvCxnSpPr>
+            <a:stCxn id="91" idx="3"/>
+          </p:cNvCxnSpPr>
+          <p:nvPr/>
+        </p:nvCxnSpPr>
+        <p:spPr>
+          <a:xfrm rot="5400000">
+            <a:off x="3470636" y="2687353"/>
+            <a:ext cx="293825" cy="5938"/>
+          </a:xfrm>
+          <a:prstGeom prst="bentConnector3">
+            <a:avLst>
+              <a:gd name="adj1" fmla="val 50000"/>
+            </a:avLst>
+          </a:prstGeom>
+          <a:ln w="19050">
+            <a:solidFill>
+              <a:srgbClr val="7030A0"/>
+            </a:solidFill>
+            <a:prstDash val="sysDot"/>
+            <a:headEnd type="none" w="med" len="med"/>
+            <a:tailEnd type="none" w="med" len="med"/>
+          </a:ln>
+          <a:effectLst/>
+        </p:spPr>
+        <p:style>
+          <a:lnRef idx="1">
+            <a:schemeClr val="accent2"/>
+          </a:lnRef>
+          <a:fillRef idx="2">
+            <a:schemeClr val="accent2"/>
+          </a:fillRef>
+          <a:effectRef idx="1">
+            <a:schemeClr val="accent2"/>
+          </a:effectRef>
+          <a:fontRef idx="minor">
+            <a:schemeClr val="dk1"/>
+          </a:fontRef>
+        </p:style>
+      </p:cxnSp>
+      <p:sp>
+        <p:nvSpPr>
+          <p:cNvPr id="91" name="Isosceles Triangle 102"/>
+          <p:cNvSpPr/>
+          <p:nvPr/>
+        </p:nvSpPr>
+        <p:spPr>
+          <a:xfrm rot="10800000" flipV="1">
+            <a:off x="3479324" y="2386348"/>
+            <a:ext cx="282387" cy="157062"/>
+          </a:xfrm>
+          <a:prstGeom prst="triangle">
             <a:avLst/>
           </a:prstGeom>
           <a:ln w="19050">
@@ -5808,32 +5416,9 @@
           <a:lstStyle/>
           <a:p>
             <a:pPr algn="ctr"/>
-            <a:r>
-              <a:rPr lang="en-US" sz="1050" dirty="0">
-                <a:solidFill>
-                  <a:srgbClr val="7030A0"/>
-                </a:solidFill>
-              </a:rPr>
-              <a:t>&lt;&lt;interface&gt;&gt;</a:t>
-            </a:r>
-            <a:br>
-              <a:rPr lang="en-US" sz="1050" dirty="0">
-                <a:solidFill>
-                  <a:srgbClr val="7030A0"/>
-                </a:solidFill>
-              </a:rPr>
-            </a:br>
-            <a:r>
-              <a:rPr lang="en-US" sz="1050" dirty="0" err="1">
-                <a:solidFill>
-                  <a:srgbClr val="7030A0"/>
-                </a:solidFill>
-              </a:rPr>
-              <a:t>ReadOnlyAddressBook</a:t>
-            </a:r>
-            <a:endParaRPr lang="en-SG" sz="1050" dirty="0">
+            <a:endParaRPr lang="en-SG" sz="1050" b="1">
               <a:solidFill>
-                <a:srgbClr val="7030A0"/>
+                <a:srgbClr val="92D050"/>
               </a:solidFill>
             </a:endParaRPr>
           </a:p>
@@ -5841,14 +5426,14 @@
       </p:sp>
       <p:sp>
         <p:nvSpPr>
-          <p:cNvPr id="93" name="Rectangle 8"/>
+          <p:cNvPr id="92" name="Rectangle 8"/>
           <p:cNvSpPr/>
           <p:nvPr/>
         </p:nvSpPr>
         <p:spPr>
           <a:xfrm>
-            <a:off x="3087206" y="1998144"/>
-            <a:ext cx="1060683" cy="364396"/>
+            <a:off x="993891" y="1998143"/>
+            <a:ext cx="1627717" cy="376853"/>
           </a:xfrm>
           <a:prstGeom prst="rect">
             <a:avLst/>
@@ -5880,12 +5465,83 @@
           <a:p>
             <a:pPr algn="ctr"/>
             <a:r>
+              <a:rPr lang="en-US" sz="1050" dirty="0">
+                <a:solidFill>
+                  <a:srgbClr val="7030A0"/>
+                </a:solidFill>
+              </a:rPr>
+              <a:t>&lt;&lt;interface&gt;&gt;</a:t>
+            </a:r>
+            <a:br>
+              <a:rPr lang="en-US" sz="1050" dirty="0">
+                <a:solidFill>
+                  <a:srgbClr val="7030A0"/>
+                </a:solidFill>
+              </a:rPr>
+            </a:br>
+            <a:r>
               <a:rPr lang="en-US" sz="1050" dirty="0" err="1">
                 <a:solidFill>
                   <a:srgbClr val="7030A0"/>
                 </a:solidFill>
               </a:rPr>
-              <a:t>AddressBook</a:t>
+              <a:t>ReadOnlyRestaurantBook</a:t>
+            </a:r>
+            <a:endParaRPr lang="en-SG" sz="1050" dirty="0">
+              <a:solidFill>
+                <a:srgbClr val="7030A0"/>
+              </a:solidFill>
+            </a:endParaRPr>
+          </a:p>
+        </p:txBody>
+      </p:sp>
+      <p:sp>
+        <p:nvSpPr>
+          <p:cNvPr id="93" name="Rectangle 8"/>
+          <p:cNvSpPr/>
+          <p:nvPr/>
+        </p:nvSpPr>
+        <p:spPr>
+          <a:xfrm>
+            <a:off x="3087206" y="1998144"/>
+            <a:ext cx="1060683" cy="364396"/>
+          </a:xfrm>
+          <a:prstGeom prst="rect">
+            <a:avLst/>
+          </a:prstGeom>
+          <a:ln w="19050">
+            <a:solidFill>
+              <a:srgbClr val="7030A0"/>
+            </a:solidFill>
+          </a:ln>
+          <a:effectLst/>
+        </p:spPr>
+        <p:style>
+          <a:lnRef idx="1">
+            <a:schemeClr val="accent4"/>
+          </a:lnRef>
+          <a:fillRef idx="2">
+            <a:schemeClr val="accent4"/>
+          </a:fillRef>
+          <a:effectRef idx="1">
+            <a:schemeClr val="accent4"/>
+          </a:effectRef>
+          <a:fontRef idx="minor">
+            <a:schemeClr val="dk1"/>
+          </a:fontRef>
+        </p:style>
+        <p:txBody>
+          <a:bodyPr rtlCol="0" anchor="ctr"/>
+          <a:lstStyle/>
+          <a:p>
+            <a:pPr algn="ctr"/>
+            <a:r>
+              <a:rPr lang="en-US" sz="1050" dirty="0" err="1">
+                <a:solidFill>
+                  <a:srgbClr val="7030A0"/>
+                </a:solidFill>
+              </a:rPr>
+              <a:t>RestaurantBook</a:t>
             </a:r>
             <a:endParaRPr lang="en-SG" sz="1050" dirty="0">
               <a:solidFill>

</xml_diff>

<commit_message>
Update model class OOP diagrams
</commit_message>
<xml_diff>
--- a/docs/diagrams/ModelComponentClassBetterOopDiagram.pptx
+++ b/docs/diagrams/ModelComponentClassBetterOopDiagram.pptx
@@ -208,7 +208,7 @@
           <a:p>
             <a:fld id="{F5CC4B3F-88C1-4FFA-B1B6-F41C21DC6924}" type="datetimeFigureOut">
               <a:rPr lang="en-US" smtClean="0"/>
-              <a:t>10/24/2018</a:t>
+              <a:t>10/30/2018</a:t>
             </a:fld>
             <a:endParaRPr lang="en-US"/>
           </a:p>
@@ -654,7 +654,7 @@
           <a:p>
             <a:fld id="{78C97017-6FC3-485B-9764-EAC9E56C1D49}" type="datetimeFigureOut">
               <a:rPr lang="en-US" smtClean="0"/>
-              <a:t>10/24/2018</a:t>
+              <a:t>10/30/2018</a:t>
             </a:fld>
             <a:endParaRPr lang="en-US"/>
           </a:p>
@@ -822,7 +822,7 @@
           <a:p>
             <a:fld id="{78C97017-6FC3-485B-9764-EAC9E56C1D49}" type="datetimeFigureOut">
               <a:rPr lang="en-US" smtClean="0"/>
-              <a:t>10/24/2018</a:t>
+              <a:t>10/30/2018</a:t>
             </a:fld>
             <a:endParaRPr lang="en-US"/>
           </a:p>
@@ -1000,7 +1000,7 @@
           <a:p>
             <a:fld id="{78C97017-6FC3-485B-9764-EAC9E56C1D49}" type="datetimeFigureOut">
               <a:rPr lang="en-US" smtClean="0"/>
-              <a:t>10/24/2018</a:t>
+              <a:t>10/30/2018</a:t>
             </a:fld>
             <a:endParaRPr lang="en-US"/>
           </a:p>
@@ -1168,7 +1168,7 @@
           <a:p>
             <a:fld id="{78C97017-6FC3-485B-9764-EAC9E56C1D49}" type="datetimeFigureOut">
               <a:rPr lang="en-US" smtClean="0"/>
-              <a:t>10/24/2018</a:t>
+              <a:t>10/30/2018</a:t>
             </a:fld>
             <a:endParaRPr lang="en-US"/>
           </a:p>
@@ -1413,7 +1413,7 @@
           <a:p>
             <a:fld id="{78C97017-6FC3-485B-9764-EAC9E56C1D49}" type="datetimeFigureOut">
               <a:rPr lang="en-US" smtClean="0"/>
-              <a:t>10/24/2018</a:t>
+              <a:t>10/30/2018</a:t>
             </a:fld>
             <a:endParaRPr lang="en-US"/>
           </a:p>
@@ -1698,7 +1698,7 @@
           <a:p>
             <a:fld id="{78C97017-6FC3-485B-9764-EAC9E56C1D49}" type="datetimeFigureOut">
               <a:rPr lang="en-US" smtClean="0"/>
-              <a:t>10/24/2018</a:t>
+              <a:t>10/30/2018</a:t>
             </a:fld>
             <a:endParaRPr lang="en-US"/>
           </a:p>
@@ -2117,7 +2117,7 @@
           <a:p>
             <a:fld id="{78C97017-6FC3-485B-9764-EAC9E56C1D49}" type="datetimeFigureOut">
               <a:rPr lang="en-US" smtClean="0"/>
-              <a:t>10/24/2018</a:t>
+              <a:t>10/30/2018</a:t>
             </a:fld>
             <a:endParaRPr lang="en-US"/>
           </a:p>
@@ -2234,7 +2234,7 @@
           <a:p>
             <a:fld id="{78C97017-6FC3-485B-9764-EAC9E56C1D49}" type="datetimeFigureOut">
               <a:rPr lang="en-US" smtClean="0"/>
-              <a:t>10/24/2018</a:t>
+              <a:t>10/30/2018</a:t>
             </a:fld>
             <a:endParaRPr lang="en-US"/>
           </a:p>
@@ -2329,7 +2329,7 @@
           <a:p>
             <a:fld id="{78C97017-6FC3-485B-9764-EAC9E56C1D49}" type="datetimeFigureOut">
               <a:rPr lang="en-US" smtClean="0"/>
-              <a:t>10/24/2018</a:t>
+              <a:t>10/30/2018</a:t>
             </a:fld>
             <a:endParaRPr lang="en-US"/>
           </a:p>
@@ -2604,7 +2604,7 @@
           <a:p>
             <a:fld id="{78C97017-6FC3-485B-9764-EAC9E56C1D49}" type="datetimeFigureOut">
               <a:rPr lang="en-US" smtClean="0"/>
-              <a:t>10/24/2018</a:t>
+              <a:t>10/30/2018</a:t>
             </a:fld>
             <a:endParaRPr lang="en-US"/>
           </a:p>
@@ -2856,7 +2856,7 @@
           <a:p>
             <a:fld id="{78C97017-6FC3-485B-9764-EAC9E56C1D49}" type="datetimeFigureOut">
               <a:rPr lang="en-US" smtClean="0"/>
-              <a:t>10/24/2018</a:t>
+              <a:t>10/30/2018</a:t>
             </a:fld>
             <a:endParaRPr lang="en-US"/>
           </a:p>
@@ -3067,7 +3067,7 @@
           <a:p>
             <a:fld id="{78C97017-6FC3-485B-9764-EAC9E56C1D49}" type="datetimeFigureOut">
               <a:rPr lang="en-US" smtClean="0"/>
-              <a:t>10/24/2018</a:t>
+              <a:t>10/30/2018</a:t>
             </a:fld>
             <a:endParaRPr lang="en-US"/>
           </a:p>
@@ -3450,8 +3450,8 @@
         </p:nvSpPr>
         <p:spPr>
           <a:xfrm>
-            <a:off x="762000" y="1676400"/>
-            <a:ext cx="8305799" cy="3059747"/>
+            <a:off x="539529" y="1293270"/>
+            <a:ext cx="9595071" cy="8688929"/>
           </a:xfrm>
           <a:prstGeom prst="roundRect">
             <a:avLst>
@@ -3632,13 +3632,13 @@
           <p:nvPr/>
         </p:nvCxnSpPr>
         <p:spPr>
-          <a:xfrm rot="5400000" flipH="1" flipV="1">
-            <a:off x="4340815" y="1072376"/>
-            <a:ext cx="613122" cy="4878021"/>
+          <a:xfrm rot="16200000" flipH="1">
+            <a:off x="4348386" y="1677927"/>
+            <a:ext cx="632640" cy="4912681"/>
           </a:xfrm>
           <a:prstGeom prst="bentConnector3">
             <a:avLst>
-              <a:gd name="adj1" fmla="val -15472"/>
+              <a:gd name="adj1" fmla="val 135257"/>
             </a:avLst>
           </a:prstGeom>
           <a:ln w="19050">
@@ -3827,7 +3827,9 @@
       <p:cxnSp>
         <p:nvCxnSpPr>
           <p:cNvPr id="75" name="Elbow Connector 122"/>
-          <p:cNvCxnSpPr/>
+          <p:cNvCxnSpPr>
+            <a:cxnSpLocks/>
+          </p:cNvCxnSpPr>
           <p:nvPr/>
         </p:nvCxnSpPr>
         <p:spPr>
@@ -4104,7 +4106,7 @@
         </p:nvSpPr>
         <p:spPr>
           <a:xfrm>
-            <a:off x="5104626" y="2863434"/>
+            <a:off x="5139286" y="4109196"/>
             <a:ext cx="1232451" cy="346760"/>
           </a:xfrm>
           <a:prstGeom prst="rect">
@@ -4204,15 +4206,15 @@
           <p:cNvPr id="30" name="Elbow Connector 29"/>
           <p:cNvCxnSpPr>
             <a:cxnSpLocks/>
-            <a:stCxn id="54" idx="0"/>
+            <a:stCxn id="51" idx="2"/>
             <a:endCxn id="49" idx="1"/>
           </p:cNvCxnSpPr>
           <p:nvPr/>
         </p:nvCxnSpPr>
         <p:spPr>
-          <a:xfrm rot="5400000" flipH="1" flipV="1">
-            <a:off x="4953714" y="2915275"/>
-            <a:ext cx="29373" cy="272452"/>
+          <a:xfrm rot="16200000" flipH="1">
+            <a:off x="4351313" y="3494602"/>
+            <a:ext cx="1150811" cy="425136"/>
           </a:xfrm>
           <a:prstGeom prst="bentConnector2">
             <a:avLst/>
@@ -4249,7 +4251,7 @@
         </p:nvSpPr>
         <p:spPr>
           <a:xfrm>
-            <a:off x="6732294" y="2858066"/>
+            <a:off x="6766954" y="4103828"/>
             <a:ext cx="708186" cy="346760"/>
           </a:xfrm>
           <a:prstGeom prst="rect">
@@ -4305,7 +4307,7 @@
         </p:nvSpPr>
         <p:spPr>
           <a:xfrm>
-            <a:off x="6337077" y="2941065"/>
+            <a:off x="6371737" y="4186827"/>
             <a:ext cx="236048" cy="173380"/>
           </a:xfrm>
           <a:prstGeom prst="flowChartDecision">
@@ -4354,7 +4356,7 @@
         </p:nvCxnSpPr>
         <p:spPr>
           <a:xfrm>
-            <a:off x="6573125" y="3027755"/>
+            <a:off x="6607785" y="4273517"/>
             <a:ext cx="159169" cy="3691"/>
           </a:xfrm>
           <a:prstGeom prst="bentConnector3">
@@ -4392,8 +4394,8 @@
         </p:nvSpPr>
         <p:spPr>
           <a:xfrm>
-            <a:off x="8131013" y="2564238"/>
-            <a:ext cx="825927" cy="285783"/>
+            <a:off x="8232145" y="3962400"/>
+            <a:ext cx="911855" cy="285783"/>
           </a:xfrm>
           <a:prstGeom prst="rect">
             <a:avLst/>
@@ -4448,7 +4450,7 @@
         </p:nvSpPr>
         <p:spPr>
           <a:xfrm>
-            <a:off x="7460564" y="2948201"/>
+            <a:off x="7495224" y="4193963"/>
             <a:ext cx="236048" cy="173380"/>
           </a:xfrm>
           <a:prstGeom prst="flowChartDecision">
@@ -4492,13 +4494,15 @@
           <p:cNvPr id="79" name="Elbow Connector 78"/>
           <p:cNvCxnSpPr>
             <a:cxnSpLocks/>
+            <a:stCxn id="78" idx="3"/>
+            <a:endCxn id="76" idx="1"/>
           </p:cNvCxnSpPr>
           <p:nvPr/>
         </p:nvCxnSpPr>
         <p:spPr>
           <a:xfrm flipV="1">
-            <a:off x="7696612" y="2706821"/>
-            <a:ext cx="434402" cy="327761"/>
+            <a:off x="7731272" y="4105292"/>
+            <a:ext cx="500873" cy="175361"/>
           </a:xfrm>
           <a:prstGeom prst="bentConnector3">
             <a:avLst/>
@@ -4535,8 +4539,8 @@
         </p:nvSpPr>
         <p:spPr>
           <a:xfrm>
-            <a:off x="8131013" y="2887216"/>
-            <a:ext cx="823381" cy="285783"/>
+            <a:off x="8232145" y="4332428"/>
+            <a:ext cx="911855" cy="285783"/>
           </a:xfrm>
           <a:prstGeom prst="rect">
             <a:avLst/>
@@ -4588,16 +4592,20 @@
           <p:cNvPr id="81" name="Elbow Connector 80"/>
           <p:cNvCxnSpPr>
             <a:cxnSpLocks/>
+            <a:stCxn id="78" idx="3"/>
+            <a:endCxn id="80" idx="1"/>
           </p:cNvCxnSpPr>
           <p:nvPr/>
         </p:nvCxnSpPr>
         <p:spPr>
-          <a:xfrm flipV="1">
-            <a:off x="7701314" y="3029799"/>
-            <a:ext cx="434401" cy="4783"/>
+          <a:xfrm>
+            <a:off x="7731272" y="4280653"/>
+            <a:ext cx="500873" cy="194667"/>
           </a:xfrm>
           <a:prstGeom prst="bentConnector3">
-            <a:avLst/>
+            <a:avLst>
+              <a:gd name="adj1" fmla="val 50000"/>
+            </a:avLst>
           </a:prstGeom>
           <a:ln w="19050">
             <a:solidFill>
@@ -4625,52 +4633,13 @@
       </p:cxnSp>
       <p:sp>
         <p:nvSpPr>
-          <p:cNvPr id="114" name="TextBox 113"/>
-          <p:cNvSpPr txBox="1"/>
-          <p:nvPr/>
-        </p:nvSpPr>
-        <p:spPr>
-          <a:xfrm rot="16200000">
-            <a:off x="6786891" y="3504290"/>
-            <a:ext cx="881018" cy="261610"/>
-          </a:xfrm>
-          <a:prstGeom prst="rect">
-            <a:avLst/>
-          </a:prstGeom>
-          <a:noFill/>
-        </p:spPr>
-        <p:txBody>
-          <a:bodyPr wrap="square" rtlCol="0">
-            <a:spAutoFit/>
-          </a:bodyPr>
-          <a:lstStyle/>
-          <a:p>
-            <a:pPr algn="r"/>
-            <a:r>
-              <a:rPr lang="en-US" sz="1100" dirty="0">
-                <a:solidFill>
-                  <a:srgbClr val="7030A0"/>
-                </a:solidFill>
-              </a:rPr>
-              <a:t>filtered list</a:t>
-            </a:r>
-            <a:endParaRPr lang="en-SG" sz="1100" dirty="0">
-              <a:solidFill>
-                <a:srgbClr val="7030A0"/>
-              </a:solidFill>
-            </a:endParaRPr>
-          </a:p>
-        </p:txBody>
-      </p:sp>
-      <p:sp>
-        <p:nvSpPr>
           <p:cNvPr id="122" name="Rectangle 8"/>
           <p:cNvSpPr/>
           <p:nvPr/>
         </p:nvSpPr>
         <p:spPr>
           <a:xfrm>
-            <a:off x="2057401" y="4239491"/>
+            <a:off x="969619" y="4358115"/>
             <a:ext cx="1066800" cy="346760"/>
           </a:xfrm>
           <a:prstGeom prst="rect">
@@ -4737,18 +4706,21 @@
         <p:nvCxnSpPr>
           <p:cNvPr id="124" name="Elbow Connector 122"/>
           <p:cNvCxnSpPr>
+            <a:cxnSpLocks/>
             <a:stCxn id="119" idx="1"/>
-            <a:endCxn id="122" idx="1"/>
+            <a:endCxn id="122" idx="0"/>
           </p:cNvCxnSpPr>
           <p:nvPr/>
         </p:nvCxnSpPr>
         <p:spPr>
-          <a:xfrm rot="16200000" flipH="1">
-            <a:off x="1364475" y="3719944"/>
-            <a:ext cx="831471" cy="554381"/>
-          </a:xfrm>
-          <a:prstGeom prst="bentConnector2">
-            <a:avLst/>
+          <a:xfrm rot="5400000">
+            <a:off x="1114663" y="3969757"/>
+            <a:ext cx="776715" cy="1"/>
+          </a:xfrm>
+          <a:prstGeom prst="bentConnector3">
+            <a:avLst>
+              <a:gd name="adj1" fmla="val 50000"/>
+            </a:avLst>
           </a:prstGeom>
           <a:ln w="19050">
             <a:solidFill>
@@ -4783,7 +4755,7 @@
         </p:nvSpPr>
         <p:spPr>
           <a:xfrm>
-            <a:off x="4737545" y="3066187"/>
+            <a:off x="4870444" y="4006441"/>
             <a:ext cx="189257" cy="178683"/>
           </a:xfrm>
           <a:prstGeom prst="rect">
@@ -4822,7 +4794,7 @@
         </p:nvSpPr>
         <p:spPr>
           <a:xfrm>
-            <a:off x="6553873" y="3097917"/>
+            <a:off x="6588533" y="4343679"/>
             <a:ext cx="189257" cy="178683"/>
           </a:xfrm>
           <a:prstGeom prst="rect">
@@ -4939,7 +4911,7 @@
         </p:nvSpPr>
         <p:spPr>
           <a:xfrm>
-            <a:off x="6868513" y="3204826"/>
+            <a:off x="6903173" y="4450588"/>
             <a:ext cx="189257" cy="178683"/>
           </a:xfrm>
           <a:prstGeom prst="rect">
@@ -4984,7 +4956,7 @@
         </p:nvSpPr>
         <p:spPr>
           <a:xfrm>
-            <a:off x="5098289" y="2206861"/>
+            <a:off x="5098289" y="1956840"/>
             <a:ext cx="1204608" cy="285783"/>
           </a:xfrm>
           <a:prstGeom prst="rect">
@@ -5050,8 +5022,8 @@
         </p:nvCxnSpPr>
         <p:spPr>
           <a:xfrm rot="5400000" flipH="1" flipV="1">
-            <a:off x="4601903" y="2462000"/>
-            <a:ext cx="608632" cy="384139"/>
+            <a:off x="4476893" y="2336990"/>
+            <a:ext cx="858653" cy="384139"/>
           </a:xfrm>
           <a:prstGeom prst="bentConnector2">
             <a:avLst/>
@@ -5098,8 +5070,8 @@
         </p:nvCxnSpPr>
         <p:spPr>
           <a:xfrm>
-            <a:off x="6565994" y="2348771"/>
-            <a:ext cx="166300" cy="73"/>
+            <a:off x="6565994" y="2098750"/>
+            <a:ext cx="455368" cy="73"/>
           </a:xfrm>
           <a:prstGeom prst="bentConnector3">
             <a:avLst/>
@@ -5142,7 +5114,7 @@
         </p:nvSpPr>
         <p:spPr>
           <a:xfrm>
-            <a:off x="6732294" y="2175464"/>
+            <a:off x="7021362" y="1925443"/>
             <a:ext cx="708186" cy="346760"/>
           </a:xfrm>
           <a:prstGeom prst="rect">
@@ -5204,7 +5176,7 @@
         </p:nvSpPr>
         <p:spPr>
           <a:xfrm>
-            <a:off x="6489577" y="2155021"/>
+            <a:off x="6604331" y="1932811"/>
             <a:ext cx="232097" cy="188684"/>
           </a:xfrm>
           <a:prstGeom prst="rect">
@@ -5249,7 +5221,7 @@
         </p:nvSpPr>
         <p:spPr>
           <a:xfrm>
-            <a:off x="4709517" y="2172972"/>
+            <a:off x="4771059" y="2174550"/>
             <a:ext cx="189257" cy="178683"/>
           </a:xfrm>
           <a:prstGeom prst="rect">
@@ -5294,7 +5266,7 @@
         </p:nvSpPr>
         <p:spPr>
           <a:xfrm>
-            <a:off x="6329946" y="2262081"/>
+            <a:off x="6329946" y="2012060"/>
             <a:ext cx="236048" cy="173380"/>
           </a:xfrm>
           <a:prstGeom prst="flowChartDecision">
@@ -5647,6 +5619,3926 @@
           </a:fontRef>
         </p:style>
       </p:cxnSp>
+      <p:cxnSp>
+        <p:nvCxnSpPr>
+          <p:cNvPr id="97" name="Elbow Connector 29">
+            <a:extLst>
+              <a:ext uri="{FF2B5EF4-FFF2-40B4-BE49-F238E27FC236}">
+                <a16:creationId xmlns:a16="http://schemas.microsoft.com/office/drawing/2014/main" id="{0CD47463-7800-49D6-B64C-D018AFC08728}"/>
+              </a:ext>
+            </a:extLst>
+          </p:cNvPr>
+          <p:cNvCxnSpPr>
+            <a:cxnSpLocks/>
+            <a:endCxn id="98" idx="1"/>
+          </p:cNvCxnSpPr>
+          <p:nvPr/>
+        </p:nvCxnSpPr>
+        <p:spPr>
+          <a:xfrm>
+            <a:off x="4805374" y="3044718"/>
+            <a:ext cx="340264" cy="3010"/>
+          </a:xfrm>
+          <a:prstGeom prst="bentConnector3">
+            <a:avLst/>
+          </a:prstGeom>
+          <a:ln w="19050">
+            <a:solidFill>
+              <a:srgbClr val="7030A0"/>
+            </a:solidFill>
+            <a:headEnd type="none" w="med" len="med"/>
+            <a:tailEnd type="arrow" w="med" len="med"/>
+          </a:ln>
+          <a:effectLst/>
+        </p:spPr>
+        <p:style>
+          <a:lnRef idx="1">
+            <a:schemeClr val="accent2"/>
+          </a:lnRef>
+          <a:fillRef idx="2">
+            <a:schemeClr val="accent2"/>
+          </a:fillRef>
+          <a:effectRef idx="1">
+            <a:schemeClr val="accent2"/>
+          </a:effectRef>
+          <a:fontRef idx="minor">
+            <a:schemeClr val="dk1"/>
+          </a:fontRef>
+        </p:style>
+      </p:cxnSp>
+      <p:sp>
+        <p:nvSpPr>
+          <p:cNvPr id="98" name="Rectangle 8">
+            <a:extLst>
+              <a:ext uri="{FF2B5EF4-FFF2-40B4-BE49-F238E27FC236}">
+                <a16:creationId xmlns:a16="http://schemas.microsoft.com/office/drawing/2014/main" id="{99CADC52-CEEB-4E83-B009-82EA36CD9C88}"/>
+              </a:ext>
+            </a:extLst>
+          </p:cNvPr>
+          <p:cNvSpPr/>
+          <p:nvPr/>
+        </p:nvSpPr>
+        <p:spPr>
+          <a:xfrm>
+            <a:off x="5145638" y="2874348"/>
+            <a:ext cx="1105840" cy="346760"/>
+          </a:xfrm>
+          <a:prstGeom prst="rect">
+            <a:avLst/>
+          </a:prstGeom>
+          <a:ln w="19050">
+            <a:solidFill>
+              <a:srgbClr val="7030A0"/>
+            </a:solidFill>
+          </a:ln>
+          <a:effectLst/>
+        </p:spPr>
+        <p:style>
+          <a:lnRef idx="1">
+            <a:schemeClr val="accent4"/>
+          </a:lnRef>
+          <a:fillRef idx="2">
+            <a:schemeClr val="accent4"/>
+          </a:fillRef>
+          <a:effectRef idx="1">
+            <a:schemeClr val="accent4"/>
+          </a:effectRef>
+          <a:fontRef idx="minor">
+            <a:schemeClr val="dk1"/>
+          </a:fontRef>
+        </p:style>
+        <p:txBody>
+          <a:bodyPr rtlCol="0" anchor="ctr"/>
+          <a:lstStyle/>
+          <a:p>
+            <a:pPr algn="ctr"/>
+            <a:r>
+              <a:rPr lang="en-US" sz="1050" dirty="0" err="1">
+                <a:solidFill>
+                  <a:srgbClr val="7030A0"/>
+                </a:solidFill>
+              </a:rPr>
+              <a:t>UniqueItemList</a:t>
+            </a:r>
+            <a:endParaRPr lang="en-SG" sz="1050" dirty="0">
+              <a:solidFill>
+                <a:srgbClr val="7030A0"/>
+              </a:solidFill>
+            </a:endParaRPr>
+          </a:p>
+        </p:txBody>
+      </p:sp>
+      <p:sp>
+        <p:nvSpPr>
+          <p:cNvPr id="101" name="Flowchart: Decision 96">
+            <a:extLst>
+              <a:ext uri="{FF2B5EF4-FFF2-40B4-BE49-F238E27FC236}">
+                <a16:creationId xmlns:a16="http://schemas.microsoft.com/office/drawing/2014/main" id="{DBBBB042-7B03-4CD1-AC3F-74CB62EED2DC}"/>
+              </a:ext>
+            </a:extLst>
+          </p:cNvPr>
+          <p:cNvSpPr/>
+          <p:nvPr/>
+        </p:nvSpPr>
+        <p:spPr>
+          <a:xfrm>
+            <a:off x="6248400" y="2941065"/>
+            <a:ext cx="236048" cy="173380"/>
+          </a:xfrm>
+          <a:prstGeom prst="flowChartDecision">
+            <a:avLst/>
+          </a:prstGeom>
+          <a:noFill/>
+          <a:ln w="19050">
+            <a:solidFill>
+              <a:srgbClr val="7030A0"/>
+            </a:solidFill>
+          </a:ln>
+          <a:effectLst/>
+        </p:spPr>
+        <p:style>
+          <a:lnRef idx="1">
+            <a:schemeClr val="accent6"/>
+          </a:lnRef>
+          <a:fillRef idx="2">
+            <a:schemeClr val="accent6"/>
+          </a:fillRef>
+          <a:effectRef idx="1">
+            <a:schemeClr val="accent6"/>
+          </a:effectRef>
+          <a:fontRef idx="minor">
+            <a:schemeClr val="dk1"/>
+          </a:fontRef>
+        </p:style>
+        <p:txBody>
+          <a:bodyPr rtlCol="0" anchor="ctr"/>
+          <a:lstStyle/>
+          <a:p>
+            <a:pPr algn="ctr"/>
+            <a:endParaRPr lang="en-US" sz="1050"/>
+          </a:p>
+        </p:txBody>
+      </p:sp>
+      <p:sp>
+        <p:nvSpPr>
+          <p:cNvPr id="102" name="TextBox 101">
+            <a:extLst>
+              <a:ext uri="{FF2B5EF4-FFF2-40B4-BE49-F238E27FC236}">
+                <a16:creationId xmlns:a16="http://schemas.microsoft.com/office/drawing/2014/main" id="{7BC0C562-7AE8-468F-B529-859A84E9D90D}"/>
+              </a:ext>
+            </a:extLst>
+          </p:cNvPr>
+          <p:cNvSpPr txBox="1"/>
+          <p:nvPr/>
+        </p:nvSpPr>
+        <p:spPr>
+          <a:xfrm>
+            <a:off x="6465196" y="3097917"/>
+            <a:ext cx="189257" cy="178683"/>
+          </a:xfrm>
+          <a:prstGeom prst="rect">
+            <a:avLst/>
+          </a:prstGeom>
+          <a:noFill/>
+        </p:spPr>
+        <p:txBody>
+          <a:bodyPr wrap="square" lIns="0" tIns="0" rIns="0" bIns="0" rtlCol="0">
+            <a:noAutofit/>
+          </a:bodyPr>
+          <a:lstStyle/>
+          <a:p>
+            <a:pPr algn="ctr"/>
+            <a:r>
+              <a:rPr lang="en-US" sz="1100" dirty="0">
+                <a:solidFill>
+                  <a:srgbClr val="7030A0"/>
+                </a:solidFill>
+              </a:rPr>
+              <a:t>*</a:t>
+            </a:r>
+            <a:endParaRPr lang="en-SG" sz="1100" dirty="0">
+              <a:solidFill>
+                <a:srgbClr val="7030A0"/>
+              </a:solidFill>
+            </a:endParaRPr>
+          </a:p>
+        </p:txBody>
+      </p:sp>
+      <p:cxnSp>
+        <p:nvCxnSpPr>
+          <p:cNvPr id="103" name="Elbow Connector 63">
+            <a:extLst>
+              <a:ext uri="{FF2B5EF4-FFF2-40B4-BE49-F238E27FC236}">
+                <a16:creationId xmlns:a16="http://schemas.microsoft.com/office/drawing/2014/main" id="{5B09AC77-5AD5-4D25-B313-807331ED0769}"/>
+              </a:ext>
+            </a:extLst>
+          </p:cNvPr>
+          <p:cNvCxnSpPr>
+            <a:cxnSpLocks/>
+          </p:cNvCxnSpPr>
+          <p:nvPr/>
+        </p:nvCxnSpPr>
+        <p:spPr>
+          <a:xfrm>
+            <a:off x="6470231" y="3027755"/>
+            <a:ext cx="159169" cy="3691"/>
+          </a:xfrm>
+          <a:prstGeom prst="bentConnector3">
+            <a:avLst/>
+          </a:prstGeom>
+          <a:ln w="19050">
+            <a:solidFill>
+              <a:srgbClr val="7030A0"/>
+            </a:solidFill>
+            <a:headEnd type="none" w="med" len="med"/>
+            <a:tailEnd type="arrow" w="med" len="med"/>
+          </a:ln>
+          <a:effectLst/>
+        </p:spPr>
+        <p:style>
+          <a:lnRef idx="1">
+            <a:schemeClr val="accent2"/>
+          </a:lnRef>
+          <a:fillRef idx="2">
+            <a:schemeClr val="accent2"/>
+          </a:fillRef>
+          <a:effectRef idx="1">
+            <a:schemeClr val="accent2"/>
+          </a:effectRef>
+          <a:fontRef idx="minor">
+            <a:schemeClr val="dk1"/>
+          </a:fontRef>
+        </p:style>
+      </p:cxnSp>
+      <p:sp>
+        <p:nvSpPr>
+          <p:cNvPr id="104" name="Rectangle 8">
+            <a:extLst>
+              <a:ext uri="{FF2B5EF4-FFF2-40B4-BE49-F238E27FC236}">
+                <a16:creationId xmlns:a16="http://schemas.microsoft.com/office/drawing/2014/main" id="{518C4135-3F61-482B-A84A-E0B22054CCB6}"/>
+              </a:ext>
+            </a:extLst>
+          </p:cNvPr>
+          <p:cNvSpPr/>
+          <p:nvPr/>
+        </p:nvSpPr>
+        <p:spPr>
+          <a:xfrm>
+            <a:off x="6637793" y="2868600"/>
+            <a:ext cx="708186" cy="346760"/>
+          </a:xfrm>
+          <a:prstGeom prst="rect">
+            <a:avLst/>
+          </a:prstGeom>
+          <a:ln w="19050">
+            <a:solidFill>
+              <a:srgbClr val="7030A0"/>
+            </a:solidFill>
+          </a:ln>
+          <a:effectLst/>
+        </p:spPr>
+        <p:style>
+          <a:lnRef idx="1">
+            <a:schemeClr val="accent4"/>
+          </a:lnRef>
+          <a:fillRef idx="2">
+            <a:schemeClr val="accent4"/>
+          </a:fillRef>
+          <a:effectRef idx="1">
+            <a:schemeClr val="accent4"/>
+          </a:effectRef>
+          <a:fontRef idx="minor">
+            <a:schemeClr val="dk1"/>
+          </a:fontRef>
+        </p:style>
+        <p:txBody>
+          <a:bodyPr rtlCol="0" anchor="ctr"/>
+          <a:lstStyle/>
+          <a:p>
+            <a:pPr algn="ctr"/>
+            <a:r>
+              <a:rPr lang="en-US" sz="1050" dirty="0">
+                <a:solidFill>
+                  <a:srgbClr val="7030A0"/>
+                </a:solidFill>
+              </a:rPr>
+              <a:t>Item</a:t>
+            </a:r>
+            <a:endParaRPr lang="en-SG" sz="1050" dirty="0">
+              <a:solidFill>
+                <a:srgbClr val="7030A0"/>
+              </a:solidFill>
+            </a:endParaRPr>
+          </a:p>
+        </p:txBody>
+      </p:sp>
+      <p:sp>
+        <p:nvSpPr>
+          <p:cNvPr id="105" name="TextBox 104">
+            <a:extLst>
+              <a:ext uri="{FF2B5EF4-FFF2-40B4-BE49-F238E27FC236}">
+                <a16:creationId xmlns:a16="http://schemas.microsoft.com/office/drawing/2014/main" id="{E9AFB592-949D-4167-AA85-DF7F4F360D6A}"/>
+              </a:ext>
+            </a:extLst>
+          </p:cNvPr>
+          <p:cNvSpPr txBox="1"/>
+          <p:nvPr/>
+        </p:nvSpPr>
+        <p:spPr>
+          <a:xfrm>
+            <a:off x="7026079" y="2200459"/>
+            <a:ext cx="189257" cy="178683"/>
+          </a:xfrm>
+          <a:prstGeom prst="rect">
+            <a:avLst/>
+          </a:prstGeom>
+          <a:noFill/>
+        </p:spPr>
+        <p:txBody>
+          <a:bodyPr wrap="square" lIns="0" tIns="0" rIns="0" bIns="0" rtlCol="0">
+            <a:noAutofit/>
+          </a:bodyPr>
+          <a:lstStyle/>
+          <a:p>
+            <a:pPr algn="ctr"/>
+            <a:r>
+              <a:rPr lang="en-US" sz="1100" dirty="0">
+                <a:solidFill>
+                  <a:srgbClr val="7030A0"/>
+                </a:solidFill>
+              </a:rPr>
+              <a:t>*</a:t>
+            </a:r>
+            <a:endParaRPr lang="en-SG" sz="1100" dirty="0">
+              <a:solidFill>
+                <a:srgbClr val="7030A0"/>
+              </a:solidFill>
+            </a:endParaRPr>
+          </a:p>
+        </p:txBody>
+      </p:sp>
+      <p:sp>
+        <p:nvSpPr>
+          <p:cNvPr id="106" name="Flowchart: Decision 96">
+            <a:extLst>
+              <a:ext uri="{FF2B5EF4-FFF2-40B4-BE49-F238E27FC236}">
+                <a16:creationId xmlns:a16="http://schemas.microsoft.com/office/drawing/2014/main" id="{32D79EEE-EEC8-4235-BF86-CA70742E3E08}"/>
+              </a:ext>
+            </a:extLst>
+          </p:cNvPr>
+          <p:cNvSpPr/>
+          <p:nvPr/>
+        </p:nvSpPr>
+        <p:spPr>
+          <a:xfrm rot="16200000">
+            <a:off x="6865001" y="2639993"/>
+            <a:ext cx="236048" cy="173380"/>
+          </a:xfrm>
+          <a:prstGeom prst="flowChartDecision">
+            <a:avLst/>
+          </a:prstGeom>
+          <a:noFill/>
+          <a:ln w="19050">
+            <a:solidFill>
+              <a:srgbClr val="7030A0"/>
+            </a:solidFill>
+          </a:ln>
+          <a:effectLst/>
+        </p:spPr>
+        <p:style>
+          <a:lnRef idx="1">
+            <a:schemeClr val="accent6"/>
+          </a:lnRef>
+          <a:fillRef idx="2">
+            <a:schemeClr val="accent6"/>
+          </a:fillRef>
+          <a:effectRef idx="1">
+            <a:schemeClr val="accent6"/>
+          </a:effectRef>
+          <a:fontRef idx="minor">
+            <a:schemeClr val="dk1"/>
+          </a:fontRef>
+        </p:style>
+        <p:txBody>
+          <a:bodyPr rtlCol="0" anchor="ctr"/>
+          <a:lstStyle/>
+          <a:p>
+            <a:pPr algn="ctr"/>
+            <a:endParaRPr lang="en-US" sz="1050"/>
+          </a:p>
+        </p:txBody>
+      </p:sp>
+      <p:cxnSp>
+        <p:nvCxnSpPr>
+          <p:cNvPr id="108" name="Elbow Connector 78">
+            <a:extLst>
+              <a:ext uri="{FF2B5EF4-FFF2-40B4-BE49-F238E27FC236}">
+                <a16:creationId xmlns:a16="http://schemas.microsoft.com/office/drawing/2014/main" id="{F5FA200F-240F-4C93-B7F0-B8C9F787D2B4}"/>
+              </a:ext>
+            </a:extLst>
+          </p:cNvPr>
+          <p:cNvCxnSpPr>
+            <a:cxnSpLocks/>
+            <a:stCxn id="106" idx="3"/>
+            <a:endCxn id="67" idx="2"/>
+          </p:cNvCxnSpPr>
+          <p:nvPr/>
+        </p:nvCxnSpPr>
+        <p:spPr>
+          <a:xfrm rot="5400000" flipH="1" flipV="1">
+            <a:off x="7011012" y="2244216"/>
+            <a:ext cx="336456" cy="392430"/>
+          </a:xfrm>
+          <a:prstGeom prst="bentConnector3">
+            <a:avLst>
+              <a:gd name="adj1" fmla="val 50000"/>
+            </a:avLst>
+          </a:prstGeom>
+          <a:ln w="19050">
+            <a:solidFill>
+              <a:srgbClr val="7030A0"/>
+            </a:solidFill>
+            <a:headEnd type="none" w="med" len="med"/>
+            <a:tailEnd type="arrow" w="med" len="med"/>
+          </a:ln>
+          <a:effectLst/>
+        </p:spPr>
+        <p:style>
+          <a:lnRef idx="1">
+            <a:schemeClr val="accent2"/>
+          </a:lnRef>
+          <a:fillRef idx="2">
+            <a:schemeClr val="accent2"/>
+          </a:fillRef>
+          <a:effectRef idx="1">
+            <a:schemeClr val="accent2"/>
+          </a:effectRef>
+          <a:fontRef idx="minor">
+            <a:schemeClr val="dk1"/>
+          </a:fontRef>
+        </p:style>
+      </p:cxnSp>
+      <p:sp>
+        <p:nvSpPr>
+          <p:cNvPr id="109" name="Flowchart: Decision 96">
+            <a:extLst>
+              <a:ext uri="{FF2B5EF4-FFF2-40B4-BE49-F238E27FC236}">
+                <a16:creationId xmlns:a16="http://schemas.microsoft.com/office/drawing/2014/main" id="{35A07907-B046-4315-B72E-EF51E4EA398E}"/>
+              </a:ext>
+            </a:extLst>
+          </p:cNvPr>
+          <p:cNvSpPr/>
+          <p:nvPr/>
+        </p:nvSpPr>
+        <p:spPr>
+          <a:xfrm>
+            <a:off x="7351576" y="2975664"/>
+            <a:ext cx="236048" cy="173380"/>
+          </a:xfrm>
+          <a:prstGeom prst="flowChartDecision">
+            <a:avLst/>
+          </a:prstGeom>
+          <a:solidFill>
+            <a:srgbClr val="7030A0"/>
+          </a:solidFill>
+          <a:ln w="19050">
+            <a:solidFill>
+              <a:srgbClr val="7030A0"/>
+            </a:solidFill>
+          </a:ln>
+          <a:effectLst/>
+        </p:spPr>
+        <p:style>
+          <a:lnRef idx="1">
+            <a:schemeClr val="accent6"/>
+          </a:lnRef>
+          <a:fillRef idx="2">
+            <a:schemeClr val="accent6"/>
+          </a:fillRef>
+          <a:effectRef idx="1">
+            <a:schemeClr val="accent6"/>
+          </a:effectRef>
+          <a:fontRef idx="minor">
+            <a:schemeClr val="dk1"/>
+          </a:fontRef>
+        </p:style>
+        <p:txBody>
+          <a:bodyPr rtlCol="0" anchor="ctr"/>
+          <a:lstStyle/>
+          <a:p>
+            <a:pPr algn="ctr"/>
+            <a:endParaRPr lang="en-US" sz="1050"/>
+          </a:p>
+        </p:txBody>
+      </p:sp>
+      <p:cxnSp>
+        <p:nvCxnSpPr>
+          <p:cNvPr id="110" name="Elbow Connector 78">
+            <a:extLst>
+              <a:ext uri="{FF2B5EF4-FFF2-40B4-BE49-F238E27FC236}">
+                <a16:creationId xmlns:a16="http://schemas.microsoft.com/office/drawing/2014/main" id="{A087A695-DAB3-4BAF-8CD8-A05F27CA3C1E}"/>
+              </a:ext>
+            </a:extLst>
+          </p:cNvPr>
+          <p:cNvCxnSpPr>
+            <a:cxnSpLocks/>
+            <a:stCxn id="109" idx="3"/>
+            <a:endCxn id="116" idx="1"/>
+          </p:cNvCxnSpPr>
+          <p:nvPr/>
+        </p:nvCxnSpPr>
+        <p:spPr>
+          <a:xfrm flipV="1">
+            <a:off x="7587624" y="2353233"/>
+            <a:ext cx="644521" cy="709121"/>
+          </a:xfrm>
+          <a:prstGeom prst="bentConnector3">
+            <a:avLst>
+              <a:gd name="adj1" fmla="val 50000"/>
+            </a:avLst>
+          </a:prstGeom>
+          <a:ln w="19050">
+            <a:solidFill>
+              <a:srgbClr val="7030A0"/>
+            </a:solidFill>
+            <a:headEnd type="none" w="med" len="med"/>
+            <a:tailEnd type="arrow" w="med" len="med"/>
+          </a:ln>
+          <a:effectLst/>
+        </p:spPr>
+        <p:style>
+          <a:lnRef idx="1">
+            <a:schemeClr val="accent2"/>
+          </a:lnRef>
+          <a:fillRef idx="2">
+            <a:schemeClr val="accent2"/>
+          </a:fillRef>
+          <a:effectRef idx="1">
+            <a:schemeClr val="accent2"/>
+          </a:effectRef>
+          <a:fontRef idx="minor">
+            <a:schemeClr val="dk1"/>
+          </a:fontRef>
+        </p:style>
+      </p:cxnSp>
+      <p:cxnSp>
+        <p:nvCxnSpPr>
+          <p:cNvPr id="111" name="Elbow Connector 80">
+            <a:extLst>
+              <a:ext uri="{FF2B5EF4-FFF2-40B4-BE49-F238E27FC236}">
+                <a16:creationId xmlns:a16="http://schemas.microsoft.com/office/drawing/2014/main" id="{17563622-C113-4694-9F4D-95D1803E43A4}"/>
+              </a:ext>
+            </a:extLst>
+          </p:cNvPr>
+          <p:cNvCxnSpPr>
+            <a:cxnSpLocks/>
+            <a:stCxn id="109" idx="3"/>
+            <a:endCxn id="117" idx="1"/>
+          </p:cNvCxnSpPr>
+          <p:nvPr/>
+        </p:nvCxnSpPr>
+        <p:spPr>
+          <a:xfrm flipV="1">
+            <a:off x="7587624" y="2687841"/>
+            <a:ext cx="644521" cy="374513"/>
+          </a:xfrm>
+          <a:prstGeom prst="bentConnector3">
+            <a:avLst/>
+          </a:prstGeom>
+          <a:ln w="19050">
+            <a:solidFill>
+              <a:srgbClr val="7030A0"/>
+            </a:solidFill>
+            <a:headEnd type="none" w="med" len="med"/>
+            <a:tailEnd type="arrow" w="med" len="med"/>
+          </a:ln>
+          <a:effectLst/>
+        </p:spPr>
+        <p:style>
+          <a:lnRef idx="1">
+            <a:schemeClr val="accent2"/>
+          </a:lnRef>
+          <a:fillRef idx="2">
+            <a:schemeClr val="accent2"/>
+          </a:fillRef>
+          <a:effectRef idx="1">
+            <a:schemeClr val="accent2"/>
+          </a:effectRef>
+          <a:fontRef idx="minor">
+            <a:schemeClr val="dk1"/>
+          </a:fontRef>
+        </p:style>
+      </p:cxnSp>
+      <p:cxnSp>
+        <p:nvCxnSpPr>
+          <p:cNvPr id="112" name="Elbow Connector 83">
+            <a:extLst>
+              <a:ext uri="{FF2B5EF4-FFF2-40B4-BE49-F238E27FC236}">
+                <a16:creationId xmlns:a16="http://schemas.microsoft.com/office/drawing/2014/main" id="{10A3E88F-EDFF-4103-AC6E-07EEDC7D7502}"/>
+              </a:ext>
+            </a:extLst>
+          </p:cNvPr>
+          <p:cNvCxnSpPr>
+            <a:cxnSpLocks/>
+            <a:stCxn id="109" idx="3"/>
+            <a:endCxn id="121" idx="1"/>
+          </p:cNvCxnSpPr>
+          <p:nvPr/>
+        </p:nvCxnSpPr>
+        <p:spPr>
+          <a:xfrm flipV="1">
+            <a:off x="7587624" y="3056454"/>
+            <a:ext cx="644521" cy="5900"/>
+          </a:xfrm>
+          <a:prstGeom prst="bentConnector3">
+            <a:avLst/>
+          </a:prstGeom>
+          <a:ln w="19050">
+            <a:solidFill>
+              <a:srgbClr val="7030A0"/>
+            </a:solidFill>
+            <a:headEnd type="none" w="med" len="med"/>
+            <a:tailEnd type="arrow" w="med" len="med"/>
+          </a:ln>
+          <a:effectLst/>
+        </p:spPr>
+        <p:style>
+          <a:lnRef idx="1">
+            <a:schemeClr val="accent2"/>
+          </a:lnRef>
+          <a:fillRef idx="2">
+            <a:schemeClr val="accent2"/>
+          </a:fillRef>
+          <a:effectRef idx="1">
+            <a:schemeClr val="accent2"/>
+          </a:effectRef>
+          <a:fontRef idx="minor">
+            <a:schemeClr val="dk1"/>
+          </a:fontRef>
+        </p:style>
+      </p:cxnSp>
+      <p:cxnSp>
+        <p:nvCxnSpPr>
+          <p:cNvPr id="113" name="Elbow Connector 83">
+            <a:extLst>
+              <a:ext uri="{FF2B5EF4-FFF2-40B4-BE49-F238E27FC236}">
+                <a16:creationId xmlns:a16="http://schemas.microsoft.com/office/drawing/2014/main" id="{8D64D27C-F6B2-49B5-B397-3E2EFD8693D9}"/>
+              </a:ext>
+            </a:extLst>
+          </p:cNvPr>
+          <p:cNvCxnSpPr>
+            <a:cxnSpLocks/>
+            <a:stCxn id="109" idx="3"/>
+            <a:endCxn id="123" idx="1"/>
+          </p:cNvCxnSpPr>
+          <p:nvPr/>
+        </p:nvCxnSpPr>
+        <p:spPr>
+          <a:xfrm>
+            <a:off x="7587624" y="3062354"/>
+            <a:ext cx="643195" cy="410776"/>
+          </a:xfrm>
+          <a:prstGeom prst="bentConnector3">
+            <a:avLst>
+              <a:gd name="adj1" fmla="val 50000"/>
+            </a:avLst>
+          </a:prstGeom>
+          <a:ln w="19050">
+            <a:solidFill>
+              <a:srgbClr val="7030A0"/>
+            </a:solidFill>
+            <a:headEnd type="none" w="med" len="med"/>
+            <a:tailEnd type="arrow" w="med" len="med"/>
+          </a:ln>
+          <a:effectLst/>
+        </p:spPr>
+        <p:style>
+          <a:lnRef idx="1">
+            <a:schemeClr val="accent2"/>
+          </a:lnRef>
+          <a:fillRef idx="2">
+            <a:schemeClr val="accent2"/>
+          </a:fillRef>
+          <a:effectRef idx="1">
+            <a:schemeClr val="accent2"/>
+          </a:effectRef>
+          <a:fontRef idx="minor">
+            <a:schemeClr val="dk1"/>
+          </a:fontRef>
+        </p:style>
+      </p:cxnSp>
+      <p:sp>
+        <p:nvSpPr>
+          <p:cNvPr id="115" name="TextBox 114">
+            <a:extLst>
+              <a:ext uri="{FF2B5EF4-FFF2-40B4-BE49-F238E27FC236}">
+                <a16:creationId xmlns:a16="http://schemas.microsoft.com/office/drawing/2014/main" id="{8F33B5A1-216B-448F-B0ED-4F82EE3F992F}"/>
+              </a:ext>
+            </a:extLst>
+          </p:cNvPr>
+          <p:cNvSpPr txBox="1"/>
+          <p:nvPr/>
+        </p:nvSpPr>
+        <p:spPr>
+          <a:xfrm>
+            <a:off x="4828579" y="3092329"/>
+            <a:ext cx="189257" cy="178683"/>
+          </a:xfrm>
+          <a:prstGeom prst="rect">
+            <a:avLst/>
+          </a:prstGeom>
+          <a:noFill/>
+        </p:spPr>
+        <p:txBody>
+          <a:bodyPr wrap="square" lIns="0" tIns="0" rIns="0" bIns="0" rtlCol="0">
+            <a:noAutofit/>
+          </a:bodyPr>
+          <a:lstStyle/>
+          <a:p>
+            <a:pPr algn="ctr"/>
+            <a:r>
+              <a:rPr lang="en-US" sz="1100" dirty="0">
+                <a:solidFill>
+                  <a:srgbClr val="7030A0"/>
+                </a:solidFill>
+              </a:rPr>
+              <a:t>1</a:t>
+            </a:r>
+            <a:endParaRPr lang="en-SG" sz="1100" dirty="0">
+              <a:solidFill>
+                <a:srgbClr val="7030A0"/>
+              </a:solidFill>
+            </a:endParaRPr>
+          </a:p>
+        </p:txBody>
+      </p:sp>
+      <p:sp>
+        <p:nvSpPr>
+          <p:cNvPr id="116" name="Rectangle 8">
+            <a:extLst>
+              <a:ext uri="{FF2B5EF4-FFF2-40B4-BE49-F238E27FC236}">
+                <a16:creationId xmlns:a16="http://schemas.microsoft.com/office/drawing/2014/main" id="{F8C389B8-40B0-4E54-A630-98B0ACEAF85C}"/>
+              </a:ext>
+            </a:extLst>
+          </p:cNvPr>
+          <p:cNvSpPr/>
+          <p:nvPr/>
+        </p:nvSpPr>
+        <p:spPr>
+          <a:xfrm>
+            <a:off x="8232145" y="2217469"/>
+            <a:ext cx="1284214" cy="271528"/>
+          </a:xfrm>
+          <a:prstGeom prst="rect">
+            <a:avLst/>
+          </a:prstGeom>
+          <a:ln w="19050">
+            <a:solidFill>
+              <a:srgbClr val="7030A0"/>
+            </a:solidFill>
+          </a:ln>
+          <a:effectLst/>
+        </p:spPr>
+        <p:style>
+          <a:lnRef idx="1">
+            <a:schemeClr val="accent4"/>
+          </a:lnRef>
+          <a:fillRef idx="2">
+            <a:schemeClr val="accent4"/>
+          </a:fillRef>
+          <a:effectRef idx="1">
+            <a:schemeClr val="accent4"/>
+          </a:effectRef>
+          <a:fontRef idx="minor">
+            <a:schemeClr val="dk1"/>
+          </a:fontRef>
+        </p:style>
+        <p:txBody>
+          <a:bodyPr rtlCol="0" anchor="ctr"/>
+          <a:lstStyle/>
+          <a:p>
+            <a:pPr algn="ctr"/>
+            <a:r>
+              <a:rPr lang="en-US" sz="1050" dirty="0">
+                <a:solidFill>
+                  <a:srgbClr val="7030A0"/>
+                </a:solidFill>
+              </a:rPr>
+              <a:t>Name</a:t>
+            </a:r>
+            <a:endParaRPr lang="en-SG" sz="1050" dirty="0">
+              <a:solidFill>
+                <a:srgbClr val="7030A0"/>
+              </a:solidFill>
+            </a:endParaRPr>
+          </a:p>
+        </p:txBody>
+      </p:sp>
+      <p:sp>
+        <p:nvSpPr>
+          <p:cNvPr id="117" name="Rectangle 8">
+            <a:extLst>
+              <a:ext uri="{FF2B5EF4-FFF2-40B4-BE49-F238E27FC236}">
+                <a16:creationId xmlns:a16="http://schemas.microsoft.com/office/drawing/2014/main" id="{0135D803-EA92-412A-A4F6-556A8001B76B}"/>
+              </a:ext>
+            </a:extLst>
+          </p:cNvPr>
+          <p:cNvSpPr/>
+          <p:nvPr/>
+        </p:nvSpPr>
+        <p:spPr>
+          <a:xfrm>
+            <a:off x="8232145" y="2559513"/>
+            <a:ext cx="1284214" cy="256656"/>
+          </a:xfrm>
+          <a:prstGeom prst="rect">
+            <a:avLst/>
+          </a:prstGeom>
+          <a:ln w="19050">
+            <a:solidFill>
+              <a:srgbClr val="7030A0"/>
+            </a:solidFill>
+          </a:ln>
+          <a:effectLst/>
+        </p:spPr>
+        <p:style>
+          <a:lnRef idx="1">
+            <a:schemeClr val="accent4"/>
+          </a:lnRef>
+          <a:fillRef idx="2">
+            <a:schemeClr val="accent4"/>
+          </a:fillRef>
+          <a:effectRef idx="1">
+            <a:schemeClr val="accent4"/>
+          </a:effectRef>
+          <a:fontRef idx="minor">
+            <a:schemeClr val="dk1"/>
+          </a:fontRef>
+        </p:style>
+        <p:txBody>
+          <a:bodyPr rtlCol="0" anchor="ctr"/>
+          <a:lstStyle/>
+          <a:p>
+            <a:pPr algn="ctr"/>
+            <a:r>
+              <a:rPr lang="en-US" sz="1050" dirty="0">
+                <a:solidFill>
+                  <a:srgbClr val="7030A0"/>
+                </a:solidFill>
+              </a:rPr>
+              <a:t>Price</a:t>
+            </a:r>
+            <a:endParaRPr lang="en-SG" sz="1050" dirty="0">
+              <a:solidFill>
+                <a:srgbClr val="7030A0"/>
+              </a:solidFill>
+            </a:endParaRPr>
+          </a:p>
+        </p:txBody>
+      </p:sp>
+      <p:sp>
+        <p:nvSpPr>
+          <p:cNvPr id="121" name="Rectangle 8">
+            <a:extLst>
+              <a:ext uri="{FF2B5EF4-FFF2-40B4-BE49-F238E27FC236}">
+                <a16:creationId xmlns:a16="http://schemas.microsoft.com/office/drawing/2014/main" id="{86234854-5D77-47F5-9CC6-3B8B82459830}"/>
+              </a:ext>
+            </a:extLst>
+          </p:cNvPr>
+          <p:cNvSpPr/>
+          <p:nvPr/>
+        </p:nvSpPr>
+        <p:spPr>
+          <a:xfrm>
+            <a:off x="8232145" y="2896721"/>
+            <a:ext cx="1284215" cy="319466"/>
+          </a:xfrm>
+          <a:prstGeom prst="rect">
+            <a:avLst/>
+          </a:prstGeom>
+          <a:ln w="19050">
+            <a:solidFill>
+              <a:srgbClr val="7030A0"/>
+            </a:solidFill>
+          </a:ln>
+          <a:effectLst/>
+        </p:spPr>
+        <p:style>
+          <a:lnRef idx="1">
+            <a:schemeClr val="accent4"/>
+          </a:lnRef>
+          <a:fillRef idx="2">
+            <a:schemeClr val="accent4"/>
+          </a:fillRef>
+          <a:effectRef idx="1">
+            <a:schemeClr val="accent4"/>
+          </a:effectRef>
+          <a:fontRef idx="minor">
+            <a:schemeClr val="dk1"/>
+          </a:fontRef>
+        </p:style>
+        <p:txBody>
+          <a:bodyPr rtlCol="0" anchor="ctr"/>
+          <a:lstStyle/>
+          <a:p>
+            <a:pPr algn="ctr"/>
+            <a:r>
+              <a:rPr lang="en-US" sz="1050" dirty="0">
+                <a:solidFill>
+                  <a:srgbClr val="7030A0"/>
+                </a:solidFill>
+              </a:rPr>
+              <a:t>Recipe</a:t>
+            </a:r>
+            <a:endParaRPr lang="en-SG" sz="1050" dirty="0">
+              <a:solidFill>
+                <a:srgbClr val="7030A0"/>
+              </a:solidFill>
+            </a:endParaRPr>
+          </a:p>
+        </p:txBody>
+      </p:sp>
+      <p:sp>
+        <p:nvSpPr>
+          <p:cNvPr id="123" name="Rectangle 8">
+            <a:extLst>
+              <a:ext uri="{FF2B5EF4-FFF2-40B4-BE49-F238E27FC236}">
+                <a16:creationId xmlns:a16="http://schemas.microsoft.com/office/drawing/2014/main" id="{284BBD6B-353F-45A4-8FCE-7F9E930EA835}"/>
+              </a:ext>
+            </a:extLst>
+          </p:cNvPr>
+          <p:cNvSpPr/>
+          <p:nvPr/>
+        </p:nvSpPr>
+        <p:spPr>
+          <a:xfrm>
+            <a:off x="8230819" y="3300367"/>
+            <a:ext cx="1294181" cy="345526"/>
+          </a:xfrm>
+          <a:prstGeom prst="rect">
+            <a:avLst/>
+          </a:prstGeom>
+          <a:ln w="19050">
+            <a:solidFill>
+              <a:srgbClr val="7030A0"/>
+            </a:solidFill>
+          </a:ln>
+          <a:effectLst/>
+        </p:spPr>
+        <p:style>
+          <a:lnRef idx="1">
+            <a:schemeClr val="accent4"/>
+          </a:lnRef>
+          <a:fillRef idx="2">
+            <a:schemeClr val="accent4"/>
+          </a:fillRef>
+          <a:effectRef idx="1">
+            <a:schemeClr val="accent4"/>
+          </a:effectRef>
+          <a:fontRef idx="minor">
+            <a:schemeClr val="dk1"/>
+          </a:fontRef>
+        </p:style>
+        <p:txBody>
+          <a:bodyPr rtlCol="0" anchor="ctr"/>
+          <a:lstStyle/>
+          <a:p>
+            <a:pPr algn="ctr"/>
+            <a:r>
+              <a:rPr lang="en-US" sz="1050" dirty="0" err="1">
+                <a:solidFill>
+                  <a:srgbClr val="7030A0"/>
+                </a:solidFill>
+              </a:rPr>
+              <a:t>RequiredIngredients</a:t>
+            </a:r>
+            <a:endParaRPr lang="en-SG" sz="1050" dirty="0">
+              <a:solidFill>
+                <a:srgbClr val="7030A0"/>
+              </a:solidFill>
+            </a:endParaRPr>
+          </a:p>
+        </p:txBody>
+      </p:sp>
+      <p:cxnSp>
+        <p:nvCxnSpPr>
+          <p:cNvPr id="125" name="Elbow Connector 106">
+            <a:extLst>
+              <a:ext uri="{FF2B5EF4-FFF2-40B4-BE49-F238E27FC236}">
+                <a16:creationId xmlns:a16="http://schemas.microsoft.com/office/drawing/2014/main" id="{C61670FA-4E22-473E-9D65-287FDD05FB55}"/>
+              </a:ext>
+            </a:extLst>
+          </p:cNvPr>
+          <p:cNvCxnSpPr>
+            <a:cxnSpLocks/>
+            <a:stCxn id="9" idx="1"/>
+            <a:endCxn id="104" idx="2"/>
+          </p:cNvCxnSpPr>
+          <p:nvPr/>
+        </p:nvCxnSpPr>
+        <p:spPr>
+          <a:xfrm rot="5400000" flipH="1" flipV="1">
+            <a:off x="4298832" y="1124894"/>
+            <a:ext cx="602588" cy="4783520"/>
+          </a:xfrm>
+          <a:prstGeom prst="bentConnector3">
+            <a:avLst>
+              <a:gd name="adj1" fmla="val -19320"/>
+            </a:avLst>
+          </a:prstGeom>
+          <a:ln w="19050">
+            <a:solidFill>
+              <a:srgbClr val="7030A0"/>
+            </a:solidFill>
+            <a:prstDash val="solid"/>
+            <a:headEnd type="none" w="med" len="med"/>
+            <a:tailEnd type="arrow" w="med" len="med"/>
+          </a:ln>
+          <a:effectLst/>
+        </p:spPr>
+        <p:style>
+          <a:lnRef idx="1">
+            <a:schemeClr val="accent2"/>
+          </a:lnRef>
+          <a:fillRef idx="2">
+            <a:schemeClr val="accent2"/>
+          </a:fillRef>
+          <a:effectRef idx="1">
+            <a:schemeClr val="accent2"/>
+          </a:effectRef>
+          <a:fontRef idx="minor">
+            <a:schemeClr val="dk1"/>
+          </a:fontRef>
+        </p:style>
+      </p:cxnSp>
+      <p:sp>
+        <p:nvSpPr>
+          <p:cNvPr id="127" name="Rectangle 8">
+            <a:extLst>
+              <a:ext uri="{FF2B5EF4-FFF2-40B4-BE49-F238E27FC236}">
+                <a16:creationId xmlns:a16="http://schemas.microsoft.com/office/drawing/2014/main" id="{8E51FEC5-042A-453C-9802-A628A2B11AD4}"/>
+              </a:ext>
+            </a:extLst>
+          </p:cNvPr>
+          <p:cNvSpPr/>
+          <p:nvPr/>
+        </p:nvSpPr>
+        <p:spPr>
+          <a:xfrm>
+            <a:off x="5125058" y="5217969"/>
+            <a:ext cx="1404468" cy="346760"/>
+          </a:xfrm>
+          <a:prstGeom prst="rect">
+            <a:avLst/>
+          </a:prstGeom>
+          <a:ln w="19050">
+            <a:solidFill>
+              <a:srgbClr val="7030A0"/>
+            </a:solidFill>
+          </a:ln>
+          <a:effectLst/>
+        </p:spPr>
+        <p:style>
+          <a:lnRef idx="1">
+            <a:schemeClr val="accent4"/>
+          </a:lnRef>
+          <a:fillRef idx="2">
+            <a:schemeClr val="accent4"/>
+          </a:fillRef>
+          <a:effectRef idx="1">
+            <a:schemeClr val="accent4"/>
+          </a:effectRef>
+          <a:fontRef idx="minor">
+            <a:schemeClr val="dk1"/>
+          </a:fontRef>
+        </p:style>
+        <p:txBody>
+          <a:bodyPr rtlCol="0" anchor="ctr"/>
+          <a:lstStyle/>
+          <a:p>
+            <a:pPr algn="ctr"/>
+            <a:r>
+              <a:rPr lang="en-US" sz="1050" dirty="0" err="1">
+                <a:solidFill>
+                  <a:srgbClr val="7030A0"/>
+                </a:solidFill>
+              </a:rPr>
+              <a:t>UniqueReservationList</a:t>
+            </a:r>
+            <a:endParaRPr lang="en-SG" sz="1050" dirty="0">
+              <a:solidFill>
+                <a:srgbClr val="7030A0"/>
+              </a:solidFill>
+            </a:endParaRPr>
+          </a:p>
+        </p:txBody>
+      </p:sp>
+      <p:sp>
+        <p:nvSpPr>
+          <p:cNvPr id="128" name="Flowchart: Decision 96">
+            <a:extLst>
+              <a:ext uri="{FF2B5EF4-FFF2-40B4-BE49-F238E27FC236}">
+                <a16:creationId xmlns:a16="http://schemas.microsoft.com/office/drawing/2014/main" id="{3C16F000-DE6D-4432-BC70-EBA5B789F1CC}"/>
+              </a:ext>
+            </a:extLst>
+          </p:cNvPr>
+          <p:cNvSpPr/>
+          <p:nvPr/>
+        </p:nvSpPr>
+        <p:spPr>
+          <a:xfrm>
+            <a:off x="6532701" y="5288551"/>
+            <a:ext cx="236048" cy="173380"/>
+          </a:xfrm>
+          <a:prstGeom prst="flowChartDecision">
+            <a:avLst/>
+          </a:prstGeom>
+          <a:noFill/>
+          <a:ln w="19050">
+            <a:solidFill>
+              <a:srgbClr val="7030A0"/>
+            </a:solidFill>
+          </a:ln>
+          <a:effectLst/>
+        </p:spPr>
+        <p:style>
+          <a:lnRef idx="1">
+            <a:schemeClr val="accent6"/>
+          </a:lnRef>
+          <a:fillRef idx="2">
+            <a:schemeClr val="accent6"/>
+          </a:fillRef>
+          <a:effectRef idx="1">
+            <a:schemeClr val="accent6"/>
+          </a:effectRef>
+          <a:fontRef idx="minor">
+            <a:schemeClr val="dk1"/>
+          </a:fontRef>
+        </p:style>
+        <p:txBody>
+          <a:bodyPr rtlCol="0" anchor="ctr"/>
+          <a:lstStyle/>
+          <a:p>
+            <a:pPr algn="ctr"/>
+            <a:endParaRPr lang="en-US" sz="1050"/>
+          </a:p>
+        </p:txBody>
+      </p:sp>
+      <p:cxnSp>
+        <p:nvCxnSpPr>
+          <p:cNvPr id="129" name="Elbow Connector 63">
+            <a:extLst>
+              <a:ext uri="{FF2B5EF4-FFF2-40B4-BE49-F238E27FC236}">
+                <a16:creationId xmlns:a16="http://schemas.microsoft.com/office/drawing/2014/main" id="{0EF32D21-8553-4300-ABE6-37E789DC9EDF}"/>
+              </a:ext>
+            </a:extLst>
+          </p:cNvPr>
+          <p:cNvCxnSpPr>
+            <a:cxnSpLocks/>
+            <a:stCxn id="128" idx="3"/>
+            <a:endCxn id="133" idx="1"/>
+          </p:cNvCxnSpPr>
+          <p:nvPr/>
+        </p:nvCxnSpPr>
+        <p:spPr>
+          <a:xfrm flipV="1">
+            <a:off x="6768749" y="5373867"/>
+            <a:ext cx="236048" cy="1374"/>
+          </a:xfrm>
+          <a:prstGeom prst="bentConnector3">
+            <a:avLst>
+              <a:gd name="adj1" fmla="val 50000"/>
+            </a:avLst>
+          </a:prstGeom>
+          <a:ln w="19050">
+            <a:solidFill>
+              <a:srgbClr val="7030A0"/>
+            </a:solidFill>
+            <a:headEnd type="none" w="med" len="med"/>
+            <a:tailEnd type="arrow" w="med" len="med"/>
+          </a:ln>
+          <a:effectLst/>
+        </p:spPr>
+        <p:style>
+          <a:lnRef idx="1">
+            <a:schemeClr val="accent2"/>
+          </a:lnRef>
+          <a:fillRef idx="2">
+            <a:schemeClr val="accent2"/>
+          </a:fillRef>
+          <a:effectRef idx="1">
+            <a:schemeClr val="accent2"/>
+          </a:effectRef>
+          <a:fontRef idx="minor">
+            <a:schemeClr val="dk1"/>
+          </a:fontRef>
+        </p:style>
+      </p:cxnSp>
+      <p:sp>
+        <p:nvSpPr>
+          <p:cNvPr id="130" name="TextBox 129">
+            <a:extLst>
+              <a:ext uri="{FF2B5EF4-FFF2-40B4-BE49-F238E27FC236}">
+                <a16:creationId xmlns:a16="http://schemas.microsoft.com/office/drawing/2014/main" id="{CEA1942C-11D0-4965-A6C7-113E691CA934}"/>
+              </a:ext>
+            </a:extLst>
+          </p:cNvPr>
+          <p:cNvSpPr txBox="1"/>
+          <p:nvPr/>
+        </p:nvSpPr>
+        <p:spPr>
+          <a:xfrm>
+            <a:off x="6833968" y="5440413"/>
+            <a:ext cx="189257" cy="178683"/>
+          </a:xfrm>
+          <a:prstGeom prst="rect">
+            <a:avLst/>
+          </a:prstGeom>
+          <a:noFill/>
+        </p:spPr>
+        <p:txBody>
+          <a:bodyPr wrap="square" lIns="0" tIns="0" rIns="0" bIns="0" rtlCol="0">
+            <a:noAutofit/>
+          </a:bodyPr>
+          <a:lstStyle/>
+          <a:p>
+            <a:pPr algn="ctr"/>
+            <a:r>
+              <a:rPr lang="en-US" sz="1100" dirty="0">
+                <a:solidFill>
+                  <a:srgbClr val="7030A0"/>
+                </a:solidFill>
+              </a:rPr>
+              <a:t>*</a:t>
+            </a:r>
+            <a:endParaRPr lang="en-SG" sz="1100" dirty="0">
+              <a:solidFill>
+                <a:srgbClr val="7030A0"/>
+              </a:solidFill>
+            </a:endParaRPr>
+          </a:p>
+        </p:txBody>
+      </p:sp>
+      <p:cxnSp>
+        <p:nvCxnSpPr>
+          <p:cNvPr id="131" name="Elbow Connector 29">
+            <a:extLst>
+              <a:ext uri="{FF2B5EF4-FFF2-40B4-BE49-F238E27FC236}">
+                <a16:creationId xmlns:a16="http://schemas.microsoft.com/office/drawing/2014/main" id="{292AB436-FDAD-4D5C-B979-2A9345B64512}"/>
+              </a:ext>
+            </a:extLst>
+          </p:cNvPr>
+          <p:cNvCxnSpPr>
+            <a:cxnSpLocks/>
+            <a:stCxn id="51" idx="2"/>
+            <a:endCxn id="127" idx="1"/>
+          </p:cNvCxnSpPr>
+          <p:nvPr/>
+        </p:nvCxnSpPr>
+        <p:spPr>
+          <a:xfrm rot="16200000" flipH="1">
+            <a:off x="3789812" y="4056103"/>
+            <a:ext cx="2259584" cy="410908"/>
+          </a:xfrm>
+          <a:prstGeom prst="bentConnector2">
+            <a:avLst/>
+          </a:prstGeom>
+          <a:ln w="19050">
+            <a:solidFill>
+              <a:srgbClr val="7030A0"/>
+            </a:solidFill>
+            <a:headEnd type="none" w="med" len="med"/>
+            <a:tailEnd type="arrow" w="med" len="med"/>
+          </a:ln>
+          <a:effectLst/>
+        </p:spPr>
+        <p:style>
+          <a:lnRef idx="1">
+            <a:schemeClr val="accent2"/>
+          </a:lnRef>
+          <a:fillRef idx="2">
+            <a:schemeClr val="accent2"/>
+          </a:fillRef>
+          <a:effectRef idx="1">
+            <a:schemeClr val="accent2"/>
+          </a:effectRef>
+          <a:fontRef idx="minor">
+            <a:schemeClr val="dk1"/>
+          </a:fontRef>
+        </p:style>
+      </p:cxnSp>
+      <p:sp>
+        <p:nvSpPr>
+          <p:cNvPr id="132" name="TextBox 131">
+            <a:extLst>
+              <a:ext uri="{FF2B5EF4-FFF2-40B4-BE49-F238E27FC236}">
+                <a16:creationId xmlns:a16="http://schemas.microsoft.com/office/drawing/2014/main" id="{70E392C6-1A0A-481E-97BD-A6DE49904734}"/>
+              </a:ext>
+            </a:extLst>
+          </p:cNvPr>
+          <p:cNvSpPr txBox="1"/>
+          <p:nvPr/>
+        </p:nvSpPr>
+        <p:spPr>
+          <a:xfrm>
+            <a:off x="4855312" y="5181600"/>
+            <a:ext cx="189257" cy="178683"/>
+          </a:xfrm>
+          <a:prstGeom prst="rect">
+            <a:avLst/>
+          </a:prstGeom>
+          <a:noFill/>
+        </p:spPr>
+        <p:txBody>
+          <a:bodyPr wrap="square" lIns="0" tIns="0" rIns="0" bIns="0" rtlCol="0">
+            <a:noAutofit/>
+          </a:bodyPr>
+          <a:lstStyle/>
+          <a:p>
+            <a:pPr algn="ctr"/>
+            <a:r>
+              <a:rPr lang="en-US" sz="1100" dirty="0">
+                <a:solidFill>
+                  <a:srgbClr val="7030A0"/>
+                </a:solidFill>
+              </a:rPr>
+              <a:t>1</a:t>
+            </a:r>
+            <a:endParaRPr lang="en-SG" sz="1100" dirty="0">
+              <a:solidFill>
+                <a:srgbClr val="7030A0"/>
+              </a:solidFill>
+            </a:endParaRPr>
+          </a:p>
+        </p:txBody>
+      </p:sp>
+      <p:sp>
+        <p:nvSpPr>
+          <p:cNvPr id="133" name="Rectangle 8">
+            <a:extLst>
+              <a:ext uri="{FF2B5EF4-FFF2-40B4-BE49-F238E27FC236}">
+                <a16:creationId xmlns:a16="http://schemas.microsoft.com/office/drawing/2014/main" id="{5B9A0DCE-35FE-406B-8FFC-B7E509BDF8FB}"/>
+              </a:ext>
+            </a:extLst>
+          </p:cNvPr>
+          <p:cNvSpPr/>
+          <p:nvPr/>
+        </p:nvSpPr>
+        <p:spPr>
+          <a:xfrm>
+            <a:off x="7004797" y="5200487"/>
+            <a:ext cx="850913" cy="346760"/>
+          </a:xfrm>
+          <a:prstGeom prst="rect">
+            <a:avLst/>
+          </a:prstGeom>
+          <a:ln w="19050">
+            <a:solidFill>
+              <a:srgbClr val="7030A0"/>
+            </a:solidFill>
+          </a:ln>
+          <a:effectLst/>
+        </p:spPr>
+        <p:style>
+          <a:lnRef idx="1">
+            <a:schemeClr val="accent4"/>
+          </a:lnRef>
+          <a:fillRef idx="2">
+            <a:schemeClr val="accent4"/>
+          </a:fillRef>
+          <a:effectRef idx="1">
+            <a:schemeClr val="accent4"/>
+          </a:effectRef>
+          <a:fontRef idx="minor">
+            <a:schemeClr val="dk1"/>
+          </a:fontRef>
+        </p:style>
+        <p:txBody>
+          <a:bodyPr rtlCol="0" anchor="ctr"/>
+          <a:lstStyle/>
+          <a:p>
+            <a:pPr algn="ctr"/>
+            <a:r>
+              <a:rPr lang="en-US" sz="1050" dirty="0">
+                <a:solidFill>
+                  <a:srgbClr val="7030A0"/>
+                </a:solidFill>
+              </a:rPr>
+              <a:t>Reservation</a:t>
+            </a:r>
+            <a:endParaRPr lang="en-SG" sz="1050" dirty="0">
+              <a:solidFill>
+                <a:srgbClr val="7030A0"/>
+              </a:solidFill>
+            </a:endParaRPr>
+          </a:p>
+        </p:txBody>
+      </p:sp>
+      <p:sp>
+        <p:nvSpPr>
+          <p:cNvPr id="134" name="Rectangle 8">
+            <a:extLst>
+              <a:ext uri="{FF2B5EF4-FFF2-40B4-BE49-F238E27FC236}">
+                <a16:creationId xmlns:a16="http://schemas.microsoft.com/office/drawing/2014/main" id="{08D124F1-534E-430A-818E-D30ABA5365D5}"/>
+              </a:ext>
+            </a:extLst>
+          </p:cNvPr>
+          <p:cNvSpPr/>
+          <p:nvPr/>
+        </p:nvSpPr>
+        <p:spPr>
+          <a:xfrm>
+            <a:off x="8622069" y="4876800"/>
+            <a:ext cx="1030278" cy="259803"/>
+          </a:xfrm>
+          <a:prstGeom prst="rect">
+            <a:avLst/>
+          </a:prstGeom>
+          <a:ln w="19050">
+            <a:solidFill>
+              <a:srgbClr val="7030A0"/>
+            </a:solidFill>
+          </a:ln>
+          <a:effectLst/>
+        </p:spPr>
+        <p:style>
+          <a:lnRef idx="1">
+            <a:schemeClr val="accent4"/>
+          </a:lnRef>
+          <a:fillRef idx="2">
+            <a:schemeClr val="accent4"/>
+          </a:fillRef>
+          <a:effectRef idx="1">
+            <a:schemeClr val="accent4"/>
+          </a:effectRef>
+          <a:fontRef idx="minor">
+            <a:schemeClr val="dk1"/>
+          </a:fontRef>
+        </p:style>
+        <p:txBody>
+          <a:bodyPr rtlCol="0" anchor="ctr"/>
+          <a:lstStyle/>
+          <a:p>
+            <a:pPr algn="ctr"/>
+            <a:r>
+              <a:rPr lang="en-SG" sz="1050" dirty="0">
+                <a:solidFill>
+                  <a:srgbClr val="7030A0"/>
+                </a:solidFill>
+              </a:rPr>
+              <a:t>Name</a:t>
+            </a:r>
+          </a:p>
+        </p:txBody>
+      </p:sp>
+      <p:sp>
+        <p:nvSpPr>
+          <p:cNvPr id="135" name="Flowchart: Decision 96">
+            <a:extLst>
+              <a:ext uri="{FF2B5EF4-FFF2-40B4-BE49-F238E27FC236}">
+                <a16:creationId xmlns:a16="http://schemas.microsoft.com/office/drawing/2014/main" id="{4F2A25B6-438D-4FD4-B140-758217461C5D}"/>
+              </a:ext>
+            </a:extLst>
+          </p:cNvPr>
+          <p:cNvSpPr/>
+          <p:nvPr/>
+        </p:nvSpPr>
+        <p:spPr>
+          <a:xfrm>
+            <a:off x="7865364" y="5264111"/>
+            <a:ext cx="236048" cy="173380"/>
+          </a:xfrm>
+          <a:prstGeom prst="flowChartDecision">
+            <a:avLst/>
+          </a:prstGeom>
+          <a:solidFill>
+            <a:srgbClr val="7030A0"/>
+          </a:solidFill>
+          <a:ln w="19050">
+            <a:solidFill>
+              <a:srgbClr val="7030A0"/>
+            </a:solidFill>
+          </a:ln>
+          <a:effectLst/>
+        </p:spPr>
+        <p:style>
+          <a:lnRef idx="1">
+            <a:schemeClr val="accent6"/>
+          </a:lnRef>
+          <a:fillRef idx="2">
+            <a:schemeClr val="accent6"/>
+          </a:fillRef>
+          <a:effectRef idx="1">
+            <a:schemeClr val="accent6"/>
+          </a:effectRef>
+          <a:fontRef idx="minor">
+            <a:schemeClr val="dk1"/>
+          </a:fontRef>
+        </p:style>
+        <p:txBody>
+          <a:bodyPr rtlCol="0" anchor="ctr"/>
+          <a:lstStyle/>
+          <a:p>
+            <a:pPr algn="ctr"/>
+            <a:endParaRPr lang="en-US" sz="1050"/>
+          </a:p>
+        </p:txBody>
+      </p:sp>
+      <p:cxnSp>
+        <p:nvCxnSpPr>
+          <p:cNvPr id="136" name="Elbow Connector 78">
+            <a:extLst>
+              <a:ext uri="{FF2B5EF4-FFF2-40B4-BE49-F238E27FC236}">
+                <a16:creationId xmlns:a16="http://schemas.microsoft.com/office/drawing/2014/main" id="{EE8279D2-EC3E-4AFC-AA24-B356F0094D1D}"/>
+              </a:ext>
+            </a:extLst>
+          </p:cNvPr>
+          <p:cNvCxnSpPr>
+            <a:cxnSpLocks/>
+            <a:stCxn id="135" idx="3"/>
+            <a:endCxn id="134" idx="1"/>
+          </p:cNvCxnSpPr>
+          <p:nvPr/>
+        </p:nvCxnSpPr>
+        <p:spPr>
+          <a:xfrm flipV="1">
+            <a:off x="8101412" y="5006702"/>
+            <a:ext cx="520657" cy="344099"/>
+          </a:xfrm>
+          <a:prstGeom prst="bentConnector3">
+            <a:avLst>
+              <a:gd name="adj1" fmla="val 50000"/>
+            </a:avLst>
+          </a:prstGeom>
+          <a:ln w="19050">
+            <a:solidFill>
+              <a:srgbClr val="7030A0"/>
+            </a:solidFill>
+            <a:headEnd type="none" w="med" len="med"/>
+            <a:tailEnd type="arrow" w="med" len="med"/>
+          </a:ln>
+          <a:effectLst/>
+        </p:spPr>
+        <p:style>
+          <a:lnRef idx="1">
+            <a:schemeClr val="accent2"/>
+          </a:lnRef>
+          <a:fillRef idx="2">
+            <a:schemeClr val="accent2"/>
+          </a:fillRef>
+          <a:effectRef idx="1">
+            <a:schemeClr val="accent2"/>
+          </a:effectRef>
+          <a:fontRef idx="minor">
+            <a:schemeClr val="dk1"/>
+          </a:fontRef>
+        </p:style>
+      </p:cxnSp>
+      <p:sp>
+        <p:nvSpPr>
+          <p:cNvPr id="137" name="Rectangle 8">
+            <a:extLst>
+              <a:ext uri="{FF2B5EF4-FFF2-40B4-BE49-F238E27FC236}">
+                <a16:creationId xmlns:a16="http://schemas.microsoft.com/office/drawing/2014/main" id="{F8ACBBBA-03AF-4B5A-A027-B19FA5F6DDA0}"/>
+              </a:ext>
+            </a:extLst>
+          </p:cNvPr>
+          <p:cNvSpPr/>
+          <p:nvPr/>
+        </p:nvSpPr>
+        <p:spPr>
+          <a:xfrm>
+            <a:off x="8630448" y="5221364"/>
+            <a:ext cx="1027103" cy="259803"/>
+          </a:xfrm>
+          <a:prstGeom prst="rect">
+            <a:avLst/>
+          </a:prstGeom>
+          <a:ln w="19050">
+            <a:solidFill>
+              <a:srgbClr val="7030A0"/>
+            </a:solidFill>
+          </a:ln>
+          <a:effectLst/>
+        </p:spPr>
+        <p:style>
+          <a:lnRef idx="1">
+            <a:schemeClr val="accent4"/>
+          </a:lnRef>
+          <a:fillRef idx="2">
+            <a:schemeClr val="accent4"/>
+          </a:fillRef>
+          <a:effectRef idx="1">
+            <a:schemeClr val="accent4"/>
+          </a:effectRef>
+          <a:fontRef idx="minor">
+            <a:schemeClr val="dk1"/>
+          </a:fontRef>
+        </p:style>
+        <p:txBody>
+          <a:bodyPr rtlCol="0" anchor="ctr"/>
+          <a:lstStyle/>
+          <a:p>
+            <a:pPr algn="ctr"/>
+            <a:r>
+              <a:rPr lang="en-US" sz="1050" dirty="0">
+                <a:solidFill>
+                  <a:srgbClr val="7030A0"/>
+                </a:solidFill>
+              </a:rPr>
+              <a:t>Pax</a:t>
+            </a:r>
+            <a:endParaRPr lang="en-SG" sz="1050" dirty="0">
+              <a:solidFill>
+                <a:srgbClr val="7030A0"/>
+              </a:solidFill>
+            </a:endParaRPr>
+          </a:p>
+        </p:txBody>
+      </p:sp>
+      <p:cxnSp>
+        <p:nvCxnSpPr>
+          <p:cNvPr id="138" name="Elbow Connector 80">
+            <a:extLst>
+              <a:ext uri="{FF2B5EF4-FFF2-40B4-BE49-F238E27FC236}">
+                <a16:creationId xmlns:a16="http://schemas.microsoft.com/office/drawing/2014/main" id="{DE654905-3321-4A33-AF5D-45C408522507}"/>
+              </a:ext>
+            </a:extLst>
+          </p:cNvPr>
+          <p:cNvCxnSpPr>
+            <a:cxnSpLocks/>
+            <a:stCxn id="135" idx="3"/>
+            <a:endCxn id="137" idx="1"/>
+          </p:cNvCxnSpPr>
+          <p:nvPr/>
+        </p:nvCxnSpPr>
+        <p:spPr>
+          <a:xfrm>
+            <a:off x="8101412" y="5350801"/>
+            <a:ext cx="529036" cy="465"/>
+          </a:xfrm>
+          <a:prstGeom prst="bentConnector3">
+            <a:avLst>
+              <a:gd name="adj1" fmla="val 50000"/>
+            </a:avLst>
+          </a:prstGeom>
+          <a:ln w="19050">
+            <a:solidFill>
+              <a:srgbClr val="7030A0"/>
+            </a:solidFill>
+            <a:headEnd type="none" w="med" len="med"/>
+            <a:tailEnd type="arrow" w="med" len="med"/>
+          </a:ln>
+          <a:effectLst/>
+        </p:spPr>
+        <p:style>
+          <a:lnRef idx="1">
+            <a:schemeClr val="accent2"/>
+          </a:lnRef>
+          <a:fillRef idx="2">
+            <a:schemeClr val="accent2"/>
+          </a:fillRef>
+          <a:effectRef idx="1">
+            <a:schemeClr val="accent2"/>
+          </a:effectRef>
+          <a:fontRef idx="minor">
+            <a:schemeClr val="dk1"/>
+          </a:fontRef>
+        </p:style>
+      </p:cxnSp>
+      <p:sp>
+        <p:nvSpPr>
+          <p:cNvPr id="139" name="Rectangle 8">
+            <a:extLst>
+              <a:ext uri="{FF2B5EF4-FFF2-40B4-BE49-F238E27FC236}">
+                <a16:creationId xmlns:a16="http://schemas.microsoft.com/office/drawing/2014/main" id="{6C27C669-1337-4CFB-AA11-625ED7C10A72}"/>
+              </a:ext>
+            </a:extLst>
+          </p:cNvPr>
+          <p:cNvSpPr/>
+          <p:nvPr/>
+        </p:nvSpPr>
+        <p:spPr>
+          <a:xfrm>
+            <a:off x="8633623" y="5568002"/>
+            <a:ext cx="1027103" cy="259803"/>
+          </a:xfrm>
+          <a:prstGeom prst="rect">
+            <a:avLst/>
+          </a:prstGeom>
+          <a:ln w="19050">
+            <a:solidFill>
+              <a:srgbClr val="7030A0"/>
+            </a:solidFill>
+          </a:ln>
+          <a:effectLst/>
+        </p:spPr>
+        <p:style>
+          <a:lnRef idx="1">
+            <a:schemeClr val="accent4"/>
+          </a:lnRef>
+          <a:fillRef idx="2">
+            <a:schemeClr val="accent4"/>
+          </a:fillRef>
+          <a:effectRef idx="1">
+            <a:schemeClr val="accent4"/>
+          </a:effectRef>
+          <a:fontRef idx="minor">
+            <a:schemeClr val="dk1"/>
+          </a:fontRef>
+        </p:style>
+        <p:txBody>
+          <a:bodyPr rtlCol="0" anchor="ctr"/>
+          <a:lstStyle/>
+          <a:p>
+            <a:pPr algn="ctr"/>
+            <a:r>
+              <a:rPr lang="en-US" sz="1050" dirty="0" err="1">
+                <a:solidFill>
+                  <a:srgbClr val="7030A0"/>
+                </a:solidFill>
+              </a:rPr>
+              <a:t>LocalDateTime</a:t>
+            </a:r>
+            <a:endParaRPr lang="en-SG" sz="1050" dirty="0">
+              <a:solidFill>
+                <a:srgbClr val="7030A0"/>
+              </a:solidFill>
+            </a:endParaRPr>
+          </a:p>
+        </p:txBody>
+      </p:sp>
+      <p:cxnSp>
+        <p:nvCxnSpPr>
+          <p:cNvPr id="140" name="Elbow Connector 78">
+            <a:extLst>
+              <a:ext uri="{FF2B5EF4-FFF2-40B4-BE49-F238E27FC236}">
+                <a16:creationId xmlns:a16="http://schemas.microsoft.com/office/drawing/2014/main" id="{88BC6651-B444-46C7-A165-C873A944C506}"/>
+              </a:ext>
+            </a:extLst>
+          </p:cNvPr>
+          <p:cNvCxnSpPr>
+            <a:cxnSpLocks/>
+            <a:stCxn id="135" idx="3"/>
+            <a:endCxn id="139" idx="1"/>
+          </p:cNvCxnSpPr>
+          <p:nvPr/>
+        </p:nvCxnSpPr>
+        <p:spPr>
+          <a:xfrm>
+            <a:off x="8101412" y="5350801"/>
+            <a:ext cx="532211" cy="347103"/>
+          </a:xfrm>
+          <a:prstGeom prst="bentConnector3">
+            <a:avLst>
+              <a:gd name="adj1" fmla="val 50000"/>
+            </a:avLst>
+          </a:prstGeom>
+          <a:ln w="19050">
+            <a:solidFill>
+              <a:srgbClr val="7030A0"/>
+            </a:solidFill>
+            <a:headEnd type="none" w="med" len="med"/>
+            <a:tailEnd type="arrow" w="med" len="med"/>
+          </a:ln>
+          <a:effectLst/>
+        </p:spPr>
+        <p:style>
+          <a:lnRef idx="1">
+            <a:schemeClr val="accent2"/>
+          </a:lnRef>
+          <a:fillRef idx="2">
+            <a:schemeClr val="accent2"/>
+          </a:fillRef>
+          <a:effectRef idx="1">
+            <a:schemeClr val="accent2"/>
+          </a:effectRef>
+          <a:fontRef idx="minor">
+            <a:schemeClr val="dk1"/>
+          </a:fontRef>
+        </p:style>
+      </p:cxnSp>
+      <p:cxnSp>
+        <p:nvCxnSpPr>
+          <p:cNvPr id="160" name="Elbow Connector 106">
+            <a:extLst>
+              <a:ext uri="{FF2B5EF4-FFF2-40B4-BE49-F238E27FC236}">
+                <a16:creationId xmlns:a16="http://schemas.microsoft.com/office/drawing/2014/main" id="{EE2007F0-323E-4FDE-9BD2-6BFCBDC08FE7}"/>
+              </a:ext>
+            </a:extLst>
+          </p:cNvPr>
+          <p:cNvCxnSpPr>
+            <a:cxnSpLocks/>
+            <a:stCxn id="9" idx="1"/>
+            <a:endCxn id="133" idx="2"/>
+          </p:cNvCxnSpPr>
+          <p:nvPr/>
+        </p:nvCxnSpPr>
+        <p:spPr>
+          <a:xfrm rot="16200000" flipH="1">
+            <a:off x="3954661" y="2071653"/>
+            <a:ext cx="1729299" cy="5221888"/>
+          </a:xfrm>
+          <a:prstGeom prst="bentConnector3">
+            <a:avLst>
+              <a:gd name="adj1" fmla="val 113219"/>
+            </a:avLst>
+          </a:prstGeom>
+          <a:ln w="19050">
+            <a:solidFill>
+              <a:srgbClr val="7030A0"/>
+            </a:solidFill>
+            <a:prstDash val="solid"/>
+            <a:headEnd type="none" w="med" len="med"/>
+            <a:tailEnd type="arrow" w="med" len="med"/>
+          </a:ln>
+          <a:effectLst/>
+        </p:spPr>
+        <p:style>
+          <a:lnRef idx="1">
+            <a:schemeClr val="accent2"/>
+          </a:lnRef>
+          <a:fillRef idx="2">
+            <a:schemeClr val="accent2"/>
+          </a:fillRef>
+          <a:effectRef idx="1">
+            <a:schemeClr val="accent2"/>
+          </a:effectRef>
+          <a:fontRef idx="minor">
+            <a:schemeClr val="dk1"/>
+          </a:fontRef>
+        </p:style>
+      </p:cxnSp>
+      <p:sp>
+        <p:nvSpPr>
+          <p:cNvPr id="96" name="Rectangle 8">
+            <a:extLst>
+              <a:ext uri="{FF2B5EF4-FFF2-40B4-BE49-F238E27FC236}">
+                <a16:creationId xmlns:a16="http://schemas.microsoft.com/office/drawing/2014/main" id="{43650A4F-5460-436D-8AB0-AC5B1B26943D}"/>
+              </a:ext>
+            </a:extLst>
+          </p:cNvPr>
+          <p:cNvSpPr/>
+          <p:nvPr/>
+        </p:nvSpPr>
+        <p:spPr>
+          <a:xfrm>
+            <a:off x="5125058" y="6198483"/>
+            <a:ext cx="1407643" cy="346760"/>
+          </a:xfrm>
+          <a:prstGeom prst="rect">
+            <a:avLst/>
+          </a:prstGeom>
+          <a:ln w="19050">
+            <a:solidFill>
+              <a:srgbClr val="7030A0"/>
+            </a:solidFill>
+          </a:ln>
+          <a:effectLst/>
+        </p:spPr>
+        <p:style>
+          <a:lnRef idx="1">
+            <a:schemeClr val="accent4"/>
+          </a:lnRef>
+          <a:fillRef idx="2">
+            <a:schemeClr val="accent4"/>
+          </a:fillRef>
+          <a:effectRef idx="1">
+            <a:schemeClr val="accent4"/>
+          </a:effectRef>
+          <a:fontRef idx="minor">
+            <a:schemeClr val="dk1"/>
+          </a:fontRef>
+        </p:style>
+        <p:txBody>
+          <a:bodyPr rtlCol="0" anchor="ctr"/>
+          <a:lstStyle/>
+          <a:p>
+            <a:pPr algn="ctr"/>
+            <a:r>
+              <a:rPr lang="en-US" sz="1050" dirty="0" err="1">
+                <a:solidFill>
+                  <a:srgbClr val="7030A0"/>
+                </a:solidFill>
+              </a:rPr>
+              <a:t>UniqueRecordList</a:t>
+            </a:r>
+            <a:endParaRPr lang="en-SG" sz="1050" dirty="0">
+              <a:solidFill>
+                <a:srgbClr val="7030A0"/>
+              </a:solidFill>
+            </a:endParaRPr>
+          </a:p>
+        </p:txBody>
+      </p:sp>
+      <p:sp>
+        <p:nvSpPr>
+          <p:cNvPr id="99" name="Flowchart: Decision 96">
+            <a:extLst>
+              <a:ext uri="{FF2B5EF4-FFF2-40B4-BE49-F238E27FC236}">
+                <a16:creationId xmlns:a16="http://schemas.microsoft.com/office/drawing/2014/main" id="{40008E06-7B74-4A07-9C07-02CD8E6E9904}"/>
+              </a:ext>
+            </a:extLst>
+          </p:cNvPr>
+          <p:cNvSpPr/>
+          <p:nvPr/>
+        </p:nvSpPr>
+        <p:spPr>
+          <a:xfrm>
+            <a:off x="6541742" y="6274683"/>
+            <a:ext cx="236048" cy="173380"/>
+          </a:xfrm>
+          <a:prstGeom prst="flowChartDecision">
+            <a:avLst/>
+          </a:prstGeom>
+          <a:noFill/>
+          <a:ln w="19050">
+            <a:solidFill>
+              <a:srgbClr val="7030A0"/>
+            </a:solidFill>
+          </a:ln>
+          <a:effectLst/>
+        </p:spPr>
+        <p:style>
+          <a:lnRef idx="1">
+            <a:schemeClr val="accent6"/>
+          </a:lnRef>
+          <a:fillRef idx="2">
+            <a:schemeClr val="accent6"/>
+          </a:fillRef>
+          <a:effectRef idx="1">
+            <a:schemeClr val="accent6"/>
+          </a:effectRef>
+          <a:fontRef idx="minor">
+            <a:schemeClr val="dk1"/>
+          </a:fontRef>
+        </p:style>
+        <p:txBody>
+          <a:bodyPr rtlCol="0" anchor="ctr"/>
+          <a:lstStyle/>
+          <a:p>
+            <a:pPr algn="ctr"/>
+            <a:endParaRPr lang="en-US" sz="1050"/>
+          </a:p>
+        </p:txBody>
+      </p:sp>
+      <p:cxnSp>
+        <p:nvCxnSpPr>
+          <p:cNvPr id="100" name="Elbow Connector 63">
+            <a:extLst>
+              <a:ext uri="{FF2B5EF4-FFF2-40B4-BE49-F238E27FC236}">
+                <a16:creationId xmlns:a16="http://schemas.microsoft.com/office/drawing/2014/main" id="{D40006A0-5C36-4899-ACE5-0FC11D90CE89}"/>
+              </a:ext>
+            </a:extLst>
+          </p:cNvPr>
+          <p:cNvCxnSpPr>
+            <a:cxnSpLocks/>
+            <a:stCxn id="99" idx="3"/>
+            <a:endCxn id="144" idx="1"/>
+          </p:cNvCxnSpPr>
+          <p:nvPr/>
+        </p:nvCxnSpPr>
+        <p:spPr>
+          <a:xfrm flipV="1">
+            <a:off x="6777790" y="6360891"/>
+            <a:ext cx="227935" cy="482"/>
+          </a:xfrm>
+          <a:prstGeom prst="bentConnector3">
+            <a:avLst/>
+          </a:prstGeom>
+          <a:ln w="19050">
+            <a:solidFill>
+              <a:srgbClr val="7030A0"/>
+            </a:solidFill>
+            <a:headEnd type="none" w="med" len="med"/>
+            <a:tailEnd type="arrow" w="med" len="med"/>
+          </a:ln>
+          <a:effectLst/>
+        </p:spPr>
+        <p:style>
+          <a:lnRef idx="1">
+            <a:schemeClr val="accent2"/>
+          </a:lnRef>
+          <a:fillRef idx="2">
+            <a:schemeClr val="accent2"/>
+          </a:fillRef>
+          <a:effectRef idx="1">
+            <a:schemeClr val="accent2"/>
+          </a:effectRef>
+          <a:fontRef idx="minor">
+            <a:schemeClr val="dk1"/>
+          </a:fontRef>
+        </p:style>
+      </p:cxnSp>
+      <p:sp>
+        <p:nvSpPr>
+          <p:cNvPr id="141" name="TextBox 140">
+            <a:extLst>
+              <a:ext uri="{FF2B5EF4-FFF2-40B4-BE49-F238E27FC236}">
+                <a16:creationId xmlns:a16="http://schemas.microsoft.com/office/drawing/2014/main" id="{7F13261A-11AF-4B4C-9BDF-2D768E1662A0}"/>
+              </a:ext>
+            </a:extLst>
+          </p:cNvPr>
+          <p:cNvSpPr txBox="1"/>
+          <p:nvPr/>
+        </p:nvSpPr>
+        <p:spPr>
+          <a:xfrm>
+            <a:off x="6758538" y="6431535"/>
+            <a:ext cx="189257" cy="178683"/>
+          </a:xfrm>
+          <a:prstGeom prst="rect">
+            <a:avLst/>
+          </a:prstGeom>
+          <a:noFill/>
+        </p:spPr>
+        <p:txBody>
+          <a:bodyPr wrap="square" lIns="0" tIns="0" rIns="0" bIns="0" rtlCol="0">
+            <a:noAutofit/>
+          </a:bodyPr>
+          <a:lstStyle/>
+          <a:p>
+            <a:pPr algn="ctr"/>
+            <a:r>
+              <a:rPr lang="en-US" sz="1100" dirty="0">
+                <a:solidFill>
+                  <a:srgbClr val="7030A0"/>
+                </a:solidFill>
+              </a:rPr>
+              <a:t>*</a:t>
+            </a:r>
+            <a:endParaRPr lang="en-SG" sz="1100" dirty="0">
+              <a:solidFill>
+                <a:srgbClr val="7030A0"/>
+              </a:solidFill>
+            </a:endParaRPr>
+          </a:p>
+        </p:txBody>
+      </p:sp>
+      <p:cxnSp>
+        <p:nvCxnSpPr>
+          <p:cNvPr id="142" name="Elbow Connector 29">
+            <a:extLst>
+              <a:ext uri="{FF2B5EF4-FFF2-40B4-BE49-F238E27FC236}">
+                <a16:creationId xmlns:a16="http://schemas.microsoft.com/office/drawing/2014/main" id="{3DCEEBCD-984E-42AA-BC38-EF56AF2A2C79}"/>
+              </a:ext>
+            </a:extLst>
+          </p:cNvPr>
+          <p:cNvCxnSpPr>
+            <a:cxnSpLocks/>
+            <a:stCxn id="51" idx="2"/>
+            <a:endCxn id="96" idx="1"/>
+          </p:cNvCxnSpPr>
+          <p:nvPr/>
+        </p:nvCxnSpPr>
+        <p:spPr>
+          <a:xfrm rot="16200000" flipH="1">
+            <a:off x="3299555" y="4546360"/>
+            <a:ext cx="3240098" cy="410908"/>
+          </a:xfrm>
+          <a:prstGeom prst="bentConnector2">
+            <a:avLst/>
+          </a:prstGeom>
+          <a:ln w="19050">
+            <a:solidFill>
+              <a:srgbClr val="7030A0"/>
+            </a:solidFill>
+            <a:headEnd type="none" w="med" len="med"/>
+            <a:tailEnd type="arrow" w="med" len="med"/>
+          </a:ln>
+          <a:effectLst/>
+        </p:spPr>
+        <p:style>
+          <a:lnRef idx="1">
+            <a:schemeClr val="accent2"/>
+          </a:lnRef>
+          <a:fillRef idx="2">
+            <a:schemeClr val="accent2"/>
+          </a:fillRef>
+          <a:effectRef idx="1">
+            <a:schemeClr val="accent2"/>
+          </a:effectRef>
+          <a:fontRef idx="minor">
+            <a:schemeClr val="dk1"/>
+          </a:fontRef>
+        </p:style>
+      </p:cxnSp>
+      <p:sp>
+        <p:nvSpPr>
+          <p:cNvPr id="143" name="TextBox 142">
+            <a:extLst>
+              <a:ext uri="{FF2B5EF4-FFF2-40B4-BE49-F238E27FC236}">
+                <a16:creationId xmlns:a16="http://schemas.microsoft.com/office/drawing/2014/main" id="{35093599-B338-4435-8827-F6D2BED28501}"/>
+              </a:ext>
+            </a:extLst>
+          </p:cNvPr>
+          <p:cNvSpPr txBox="1"/>
+          <p:nvPr/>
+        </p:nvSpPr>
+        <p:spPr>
+          <a:xfrm>
+            <a:off x="4845694" y="6096000"/>
+            <a:ext cx="189257" cy="178683"/>
+          </a:xfrm>
+          <a:prstGeom prst="rect">
+            <a:avLst/>
+          </a:prstGeom>
+          <a:noFill/>
+        </p:spPr>
+        <p:txBody>
+          <a:bodyPr wrap="square" lIns="0" tIns="0" rIns="0" bIns="0" rtlCol="0">
+            <a:noAutofit/>
+          </a:bodyPr>
+          <a:lstStyle/>
+          <a:p>
+            <a:pPr algn="ctr"/>
+            <a:r>
+              <a:rPr lang="en-US" sz="1100" dirty="0">
+                <a:solidFill>
+                  <a:srgbClr val="7030A0"/>
+                </a:solidFill>
+              </a:rPr>
+              <a:t>1</a:t>
+            </a:r>
+            <a:endParaRPr lang="en-SG" sz="1100" dirty="0">
+              <a:solidFill>
+                <a:srgbClr val="7030A0"/>
+              </a:solidFill>
+            </a:endParaRPr>
+          </a:p>
+        </p:txBody>
+      </p:sp>
+      <p:sp>
+        <p:nvSpPr>
+          <p:cNvPr id="144" name="Rectangle 8">
+            <a:extLst>
+              <a:ext uri="{FF2B5EF4-FFF2-40B4-BE49-F238E27FC236}">
+                <a16:creationId xmlns:a16="http://schemas.microsoft.com/office/drawing/2014/main" id="{2BFDA812-F9FB-4BBC-9933-498C3AF44660}"/>
+              </a:ext>
+            </a:extLst>
+          </p:cNvPr>
+          <p:cNvSpPr/>
+          <p:nvPr/>
+        </p:nvSpPr>
+        <p:spPr>
+          <a:xfrm>
+            <a:off x="7005725" y="6187511"/>
+            <a:ext cx="850913" cy="346760"/>
+          </a:xfrm>
+          <a:prstGeom prst="rect">
+            <a:avLst/>
+          </a:prstGeom>
+          <a:ln w="19050">
+            <a:solidFill>
+              <a:srgbClr val="7030A0"/>
+            </a:solidFill>
+          </a:ln>
+          <a:effectLst/>
+        </p:spPr>
+        <p:style>
+          <a:lnRef idx="1">
+            <a:schemeClr val="accent4"/>
+          </a:lnRef>
+          <a:fillRef idx="2">
+            <a:schemeClr val="accent4"/>
+          </a:fillRef>
+          <a:effectRef idx="1">
+            <a:schemeClr val="accent4"/>
+          </a:effectRef>
+          <a:fontRef idx="minor">
+            <a:schemeClr val="dk1"/>
+          </a:fontRef>
+        </p:style>
+        <p:txBody>
+          <a:bodyPr rtlCol="0" anchor="ctr"/>
+          <a:lstStyle/>
+          <a:p>
+            <a:pPr algn="ctr"/>
+            <a:r>
+              <a:rPr lang="en-US" sz="1050" dirty="0" err="1">
+                <a:solidFill>
+                  <a:srgbClr val="7030A0"/>
+                </a:solidFill>
+              </a:rPr>
+              <a:t>SalesRecord</a:t>
+            </a:r>
+            <a:endParaRPr lang="en-SG" sz="1050" dirty="0">
+              <a:solidFill>
+                <a:srgbClr val="7030A0"/>
+              </a:solidFill>
+            </a:endParaRPr>
+          </a:p>
+        </p:txBody>
+      </p:sp>
+      <p:sp>
+        <p:nvSpPr>
+          <p:cNvPr id="145" name="Rectangle 8">
+            <a:extLst>
+              <a:ext uri="{FF2B5EF4-FFF2-40B4-BE49-F238E27FC236}">
+                <a16:creationId xmlns:a16="http://schemas.microsoft.com/office/drawing/2014/main" id="{EAE1E66E-3676-4A05-9B43-117FC0026EE0}"/>
+              </a:ext>
+            </a:extLst>
+          </p:cNvPr>
+          <p:cNvSpPr/>
+          <p:nvPr/>
+        </p:nvSpPr>
+        <p:spPr>
+          <a:xfrm>
+            <a:off x="8604471" y="6013521"/>
+            <a:ext cx="891955" cy="285783"/>
+          </a:xfrm>
+          <a:prstGeom prst="rect">
+            <a:avLst/>
+          </a:prstGeom>
+          <a:ln w="19050">
+            <a:solidFill>
+              <a:srgbClr val="7030A0"/>
+            </a:solidFill>
+          </a:ln>
+          <a:effectLst/>
+        </p:spPr>
+        <p:style>
+          <a:lnRef idx="1">
+            <a:schemeClr val="accent4"/>
+          </a:lnRef>
+          <a:fillRef idx="2">
+            <a:schemeClr val="accent4"/>
+          </a:fillRef>
+          <a:effectRef idx="1">
+            <a:schemeClr val="accent4"/>
+          </a:effectRef>
+          <a:fontRef idx="minor">
+            <a:schemeClr val="dk1"/>
+          </a:fontRef>
+        </p:style>
+        <p:txBody>
+          <a:bodyPr rtlCol="0" anchor="ctr"/>
+          <a:lstStyle/>
+          <a:p>
+            <a:pPr algn="ctr"/>
+            <a:r>
+              <a:rPr lang="en-US" sz="1050" dirty="0">
+                <a:solidFill>
+                  <a:srgbClr val="7030A0"/>
+                </a:solidFill>
+              </a:rPr>
+              <a:t>Date</a:t>
+            </a:r>
+            <a:endParaRPr lang="en-SG" sz="1050" dirty="0">
+              <a:solidFill>
+                <a:srgbClr val="7030A0"/>
+              </a:solidFill>
+            </a:endParaRPr>
+          </a:p>
+        </p:txBody>
+      </p:sp>
+      <p:cxnSp>
+        <p:nvCxnSpPr>
+          <p:cNvPr id="146" name="Elbow Connector 78">
+            <a:extLst>
+              <a:ext uri="{FF2B5EF4-FFF2-40B4-BE49-F238E27FC236}">
+                <a16:creationId xmlns:a16="http://schemas.microsoft.com/office/drawing/2014/main" id="{C1B07096-F38D-429B-85A0-960EC0B7DD86}"/>
+              </a:ext>
+            </a:extLst>
+          </p:cNvPr>
+          <p:cNvCxnSpPr>
+            <a:cxnSpLocks/>
+            <a:stCxn id="152" idx="3"/>
+            <a:endCxn id="145" idx="1"/>
+          </p:cNvCxnSpPr>
+          <p:nvPr/>
+        </p:nvCxnSpPr>
+        <p:spPr>
+          <a:xfrm flipV="1">
+            <a:off x="8106185" y="6156413"/>
+            <a:ext cx="498286" cy="215892"/>
+          </a:xfrm>
+          <a:prstGeom prst="bentConnector3">
+            <a:avLst>
+              <a:gd name="adj1" fmla="val 50000"/>
+            </a:avLst>
+          </a:prstGeom>
+          <a:ln w="19050">
+            <a:solidFill>
+              <a:srgbClr val="7030A0"/>
+            </a:solidFill>
+            <a:headEnd type="none" w="med" len="med"/>
+            <a:tailEnd type="arrow" w="med" len="med"/>
+          </a:ln>
+          <a:effectLst/>
+        </p:spPr>
+        <p:style>
+          <a:lnRef idx="1">
+            <a:schemeClr val="accent2"/>
+          </a:lnRef>
+          <a:fillRef idx="2">
+            <a:schemeClr val="accent2"/>
+          </a:fillRef>
+          <a:effectRef idx="1">
+            <a:schemeClr val="accent2"/>
+          </a:effectRef>
+          <a:fontRef idx="minor">
+            <a:schemeClr val="dk1"/>
+          </a:fontRef>
+        </p:style>
+      </p:cxnSp>
+      <p:sp>
+        <p:nvSpPr>
+          <p:cNvPr id="147" name="Rectangle 8">
+            <a:extLst>
+              <a:ext uri="{FF2B5EF4-FFF2-40B4-BE49-F238E27FC236}">
+                <a16:creationId xmlns:a16="http://schemas.microsoft.com/office/drawing/2014/main" id="{44552C90-5C43-420C-8AE0-1063DDBF2DB4}"/>
+              </a:ext>
+            </a:extLst>
+          </p:cNvPr>
+          <p:cNvSpPr/>
+          <p:nvPr/>
+        </p:nvSpPr>
+        <p:spPr>
+          <a:xfrm>
+            <a:off x="8604471" y="6381182"/>
+            <a:ext cx="891955" cy="285783"/>
+          </a:xfrm>
+          <a:prstGeom prst="rect">
+            <a:avLst/>
+          </a:prstGeom>
+          <a:ln w="19050">
+            <a:solidFill>
+              <a:srgbClr val="7030A0"/>
+            </a:solidFill>
+          </a:ln>
+          <a:effectLst/>
+        </p:spPr>
+        <p:style>
+          <a:lnRef idx="1">
+            <a:schemeClr val="accent4"/>
+          </a:lnRef>
+          <a:fillRef idx="2">
+            <a:schemeClr val="accent4"/>
+          </a:fillRef>
+          <a:effectRef idx="1">
+            <a:schemeClr val="accent4"/>
+          </a:effectRef>
+          <a:fontRef idx="minor">
+            <a:schemeClr val="dk1"/>
+          </a:fontRef>
+        </p:style>
+        <p:txBody>
+          <a:bodyPr rtlCol="0" anchor="ctr"/>
+          <a:lstStyle/>
+          <a:p>
+            <a:pPr algn="ctr"/>
+            <a:r>
+              <a:rPr lang="en-US" sz="1050" dirty="0" err="1">
+                <a:solidFill>
+                  <a:srgbClr val="7030A0"/>
+                </a:solidFill>
+              </a:rPr>
+              <a:t>ItemName</a:t>
+            </a:r>
+            <a:endParaRPr lang="en-SG" sz="1050" dirty="0">
+              <a:solidFill>
+                <a:srgbClr val="7030A0"/>
+              </a:solidFill>
+            </a:endParaRPr>
+          </a:p>
+        </p:txBody>
+      </p:sp>
+      <p:sp>
+        <p:nvSpPr>
+          <p:cNvPr id="148" name="Rectangle 8">
+            <a:extLst>
+              <a:ext uri="{FF2B5EF4-FFF2-40B4-BE49-F238E27FC236}">
+                <a16:creationId xmlns:a16="http://schemas.microsoft.com/office/drawing/2014/main" id="{A5877C28-05FE-459B-9F8F-571E5B956837}"/>
+              </a:ext>
+            </a:extLst>
+          </p:cNvPr>
+          <p:cNvSpPr/>
+          <p:nvPr/>
+        </p:nvSpPr>
+        <p:spPr>
+          <a:xfrm>
+            <a:off x="8604470" y="6735336"/>
+            <a:ext cx="891955" cy="285783"/>
+          </a:xfrm>
+          <a:prstGeom prst="rect">
+            <a:avLst/>
+          </a:prstGeom>
+          <a:ln w="19050">
+            <a:solidFill>
+              <a:srgbClr val="7030A0"/>
+            </a:solidFill>
+          </a:ln>
+          <a:effectLst/>
+        </p:spPr>
+        <p:style>
+          <a:lnRef idx="1">
+            <a:schemeClr val="accent4"/>
+          </a:lnRef>
+          <a:fillRef idx="2">
+            <a:schemeClr val="accent4"/>
+          </a:fillRef>
+          <a:effectRef idx="1">
+            <a:schemeClr val="accent4"/>
+          </a:effectRef>
+          <a:fontRef idx="minor">
+            <a:schemeClr val="dk1"/>
+          </a:fontRef>
+        </p:style>
+        <p:txBody>
+          <a:bodyPr rtlCol="0" anchor="ctr"/>
+          <a:lstStyle/>
+          <a:p>
+            <a:pPr algn="ctr"/>
+            <a:r>
+              <a:rPr lang="en-US" sz="1050" dirty="0" err="1">
+                <a:solidFill>
+                  <a:srgbClr val="7030A0"/>
+                </a:solidFill>
+              </a:rPr>
+              <a:t>QuantitySold</a:t>
+            </a:r>
+            <a:endParaRPr lang="en-SG" sz="1050" dirty="0">
+              <a:solidFill>
+                <a:srgbClr val="7030A0"/>
+              </a:solidFill>
+            </a:endParaRPr>
+          </a:p>
+        </p:txBody>
+      </p:sp>
+      <p:sp>
+        <p:nvSpPr>
+          <p:cNvPr id="149" name="Rectangle 8">
+            <a:extLst>
+              <a:ext uri="{FF2B5EF4-FFF2-40B4-BE49-F238E27FC236}">
+                <a16:creationId xmlns:a16="http://schemas.microsoft.com/office/drawing/2014/main" id="{DB88D535-E00D-4CF4-BBCE-50D3FBEDE167}"/>
+              </a:ext>
+            </a:extLst>
+          </p:cNvPr>
+          <p:cNvSpPr/>
+          <p:nvPr/>
+        </p:nvSpPr>
+        <p:spPr>
+          <a:xfrm>
+            <a:off x="8604470" y="7105617"/>
+            <a:ext cx="891955" cy="285783"/>
+          </a:xfrm>
+          <a:prstGeom prst="rect">
+            <a:avLst/>
+          </a:prstGeom>
+          <a:ln w="19050">
+            <a:solidFill>
+              <a:srgbClr val="7030A0"/>
+            </a:solidFill>
+          </a:ln>
+          <a:effectLst/>
+        </p:spPr>
+        <p:style>
+          <a:lnRef idx="1">
+            <a:schemeClr val="accent4"/>
+          </a:lnRef>
+          <a:fillRef idx="2">
+            <a:schemeClr val="accent4"/>
+          </a:fillRef>
+          <a:effectRef idx="1">
+            <a:schemeClr val="accent4"/>
+          </a:effectRef>
+          <a:fontRef idx="minor">
+            <a:schemeClr val="dk1"/>
+          </a:fontRef>
+        </p:style>
+        <p:txBody>
+          <a:bodyPr rtlCol="0" anchor="ctr"/>
+          <a:lstStyle/>
+          <a:p>
+            <a:pPr algn="ctr"/>
+            <a:r>
+              <a:rPr lang="en-US" sz="1050" dirty="0">
+                <a:solidFill>
+                  <a:srgbClr val="7030A0"/>
+                </a:solidFill>
+              </a:rPr>
+              <a:t>Price</a:t>
+            </a:r>
+            <a:endParaRPr lang="en-SG" sz="1050" dirty="0">
+              <a:solidFill>
+                <a:srgbClr val="7030A0"/>
+              </a:solidFill>
+            </a:endParaRPr>
+          </a:p>
+        </p:txBody>
+      </p:sp>
+      <p:cxnSp>
+        <p:nvCxnSpPr>
+          <p:cNvPr id="150" name="Elbow Connector 78">
+            <a:extLst>
+              <a:ext uri="{FF2B5EF4-FFF2-40B4-BE49-F238E27FC236}">
+                <a16:creationId xmlns:a16="http://schemas.microsoft.com/office/drawing/2014/main" id="{DC56F46F-C820-4CDF-9B25-B84AE6948A72}"/>
+              </a:ext>
+            </a:extLst>
+          </p:cNvPr>
+          <p:cNvCxnSpPr>
+            <a:cxnSpLocks/>
+            <a:stCxn id="152" idx="3"/>
+            <a:endCxn id="149" idx="1"/>
+          </p:cNvCxnSpPr>
+          <p:nvPr/>
+        </p:nvCxnSpPr>
+        <p:spPr>
+          <a:xfrm>
+            <a:off x="8106185" y="6372305"/>
+            <a:ext cx="498285" cy="876204"/>
+          </a:xfrm>
+          <a:prstGeom prst="bentConnector3">
+            <a:avLst>
+              <a:gd name="adj1" fmla="val 50000"/>
+            </a:avLst>
+          </a:prstGeom>
+          <a:ln w="19050">
+            <a:solidFill>
+              <a:srgbClr val="7030A0"/>
+            </a:solidFill>
+            <a:headEnd type="none" w="med" len="med"/>
+            <a:tailEnd type="arrow" w="med" len="med"/>
+          </a:ln>
+          <a:effectLst/>
+        </p:spPr>
+        <p:style>
+          <a:lnRef idx="1">
+            <a:schemeClr val="accent2"/>
+          </a:lnRef>
+          <a:fillRef idx="2">
+            <a:schemeClr val="accent2"/>
+          </a:fillRef>
+          <a:effectRef idx="1">
+            <a:schemeClr val="accent2"/>
+          </a:effectRef>
+          <a:fontRef idx="minor">
+            <a:schemeClr val="dk1"/>
+          </a:fontRef>
+        </p:style>
+      </p:cxnSp>
+      <p:sp>
+        <p:nvSpPr>
+          <p:cNvPr id="152" name="Flowchart: Decision 96">
+            <a:extLst>
+              <a:ext uri="{FF2B5EF4-FFF2-40B4-BE49-F238E27FC236}">
+                <a16:creationId xmlns:a16="http://schemas.microsoft.com/office/drawing/2014/main" id="{DD0CF0B3-6715-4241-AFAC-D1601EE75E84}"/>
+              </a:ext>
+            </a:extLst>
+          </p:cNvPr>
+          <p:cNvSpPr/>
+          <p:nvPr/>
+        </p:nvSpPr>
+        <p:spPr>
+          <a:xfrm>
+            <a:off x="7870137" y="6285615"/>
+            <a:ext cx="236048" cy="173380"/>
+          </a:xfrm>
+          <a:prstGeom prst="flowChartDecision">
+            <a:avLst/>
+          </a:prstGeom>
+          <a:solidFill>
+            <a:srgbClr val="7030A0"/>
+          </a:solidFill>
+          <a:ln w="19050">
+            <a:solidFill>
+              <a:srgbClr val="7030A0"/>
+            </a:solidFill>
+          </a:ln>
+          <a:effectLst/>
+        </p:spPr>
+        <p:style>
+          <a:lnRef idx="1">
+            <a:schemeClr val="accent6"/>
+          </a:lnRef>
+          <a:fillRef idx="2">
+            <a:schemeClr val="accent6"/>
+          </a:fillRef>
+          <a:effectRef idx="1">
+            <a:schemeClr val="accent6"/>
+          </a:effectRef>
+          <a:fontRef idx="minor">
+            <a:schemeClr val="dk1"/>
+          </a:fontRef>
+        </p:style>
+        <p:txBody>
+          <a:bodyPr rtlCol="0" anchor="ctr"/>
+          <a:lstStyle/>
+          <a:p>
+            <a:pPr algn="ctr"/>
+            <a:endParaRPr lang="en-US" sz="1050"/>
+          </a:p>
+        </p:txBody>
+      </p:sp>
+      <p:cxnSp>
+        <p:nvCxnSpPr>
+          <p:cNvPr id="153" name="Elbow Connector 78">
+            <a:extLst>
+              <a:ext uri="{FF2B5EF4-FFF2-40B4-BE49-F238E27FC236}">
+                <a16:creationId xmlns:a16="http://schemas.microsoft.com/office/drawing/2014/main" id="{0FAF2DC7-CE96-4585-BEFE-A1B691A02235}"/>
+              </a:ext>
+            </a:extLst>
+          </p:cNvPr>
+          <p:cNvCxnSpPr>
+            <a:cxnSpLocks/>
+            <a:stCxn id="152" idx="3"/>
+            <a:endCxn id="148" idx="1"/>
+          </p:cNvCxnSpPr>
+          <p:nvPr/>
+        </p:nvCxnSpPr>
+        <p:spPr>
+          <a:xfrm>
+            <a:off x="8106185" y="6372305"/>
+            <a:ext cx="498285" cy="505923"/>
+          </a:xfrm>
+          <a:prstGeom prst="bentConnector3">
+            <a:avLst>
+              <a:gd name="adj1" fmla="val 50000"/>
+            </a:avLst>
+          </a:prstGeom>
+          <a:ln w="19050">
+            <a:solidFill>
+              <a:srgbClr val="7030A0"/>
+            </a:solidFill>
+            <a:headEnd type="none" w="med" len="med"/>
+            <a:tailEnd type="arrow" w="med" len="med"/>
+          </a:ln>
+          <a:effectLst/>
+        </p:spPr>
+        <p:style>
+          <a:lnRef idx="1">
+            <a:schemeClr val="accent2"/>
+          </a:lnRef>
+          <a:fillRef idx="2">
+            <a:schemeClr val="accent2"/>
+          </a:fillRef>
+          <a:effectRef idx="1">
+            <a:schemeClr val="accent2"/>
+          </a:effectRef>
+          <a:fontRef idx="minor">
+            <a:schemeClr val="dk1"/>
+          </a:fontRef>
+        </p:style>
+      </p:cxnSp>
+      <p:cxnSp>
+        <p:nvCxnSpPr>
+          <p:cNvPr id="154" name="Elbow Connector 78">
+            <a:extLst>
+              <a:ext uri="{FF2B5EF4-FFF2-40B4-BE49-F238E27FC236}">
+                <a16:creationId xmlns:a16="http://schemas.microsoft.com/office/drawing/2014/main" id="{3130E058-182E-4F1D-8905-72A00FD67897}"/>
+              </a:ext>
+            </a:extLst>
+          </p:cNvPr>
+          <p:cNvCxnSpPr>
+            <a:cxnSpLocks/>
+            <a:stCxn id="152" idx="3"/>
+            <a:endCxn id="147" idx="1"/>
+          </p:cNvCxnSpPr>
+          <p:nvPr/>
+        </p:nvCxnSpPr>
+        <p:spPr>
+          <a:xfrm>
+            <a:off x="8106185" y="6372305"/>
+            <a:ext cx="498286" cy="151769"/>
+          </a:xfrm>
+          <a:prstGeom prst="bentConnector3">
+            <a:avLst>
+              <a:gd name="adj1" fmla="val 50000"/>
+            </a:avLst>
+          </a:prstGeom>
+          <a:ln w="19050">
+            <a:solidFill>
+              <a:srgbClr val="7030A0"/>
+            </a:solidFill>
+            <a:headEnd type="none" w="med" len="med"/>
+            <a:tailEnd type="arrow" w="med" len="med"/>
+          </a:ln>
+          <a:effectLst/>
+        </p:spPr>
+        <p:style>
+          <a:lnRef idx="1">
+            <a:schemeClr val="accent2"/>
+          </a:lnRef>
+          <a:fillRef idx="2">
+            <a:schemeClr val="accent2"/>
+          </a:fillRef>
+          <a:effectRef idx="1">
+            <a:schemeClr val="accent2"/>
+          </a:effectRef>
+          <a:fontRef idx="minor">
+            <a:schemeClr val="dk1"/>
+          </a:fontRef>
+        </p:style>
+      </p:cxnSp>
+      <p:cxnSp>
+        <p:nvCxnSpPr>
+          <p:cNvPr id="155" name="Elbow Connector 106">
+            <a:extLst>
+              <a:ext uri="{FF2B5EF4-FFF2-40B4-BE49-F238E27FC236}">
+                <a16:creationId xmlns:a16="http://schemas.microsoft.com/office/drawing/2014/main" id="{82A471C0-6DD3-409A-8F29-DC8A4B873547}"/>
+              </a:ext>
+            </a:extLst>
+          </p:cNvPr>
+          <p:cNvCxnSpPr>
+            <a:cxnSpLocks/>
+            <a:stCxn id="9" idx="1"/>
+            <a:endCxn id="144" idx="2"/>
+          </p:cNvCxnSpPr>
+          <p:nvPr/>
+        </p:nvCxnSpPr>
+        <p:spPr>
+          <a:xfrm rot="16200000" flipH="1">
+            <a:off x="3461613" y="2564701"/>
+            <a:ext cx="2716323" cy="5222816"/>
+          </a:xfrm>
+          <a:prstGeom prst="bentConnector3">
+            <a:avLst>
+              <a:gd name="adj1" fmla="val 108416"/>
+            </a:avLst>
+          </a:prstGeom>
+          <a:ln w="19050">
+            <a:solidFill>
+              <a:srgbClr val="7030A0"/>
+            </a:solidFill>
+            <a:prstDash val="solid"/>
+            <a:headEnd type="none" w="med" len="med"/>
+            <a:tailEnd type="arrow" w="med" len="med"/>
+          </a:ln>
+          <a:effectLst/>
+        </p:spPr>
+        <p:style>
+          <a:lnRef idx="1">
+            <a:schemeClr val="accent2"/>
+          </a:lnRef>
+          <a:fillRef idx="2">
+            <a:schemeClr val="accent2"/>
+          </a:fillRef>
+          <a:effectRef idx="1">
+            <a:schemeClr val="accent2"/>
+          </a:effectRef>
+          <a:fontRef idx="minor">
+            <a:schemeClr val="dk1"/>
+          </a:fontRef>
+        </p:style>
+      </p:cxnSp>
+      <p:sp>
+        <p:nvSpPr>
+          <p:cNvPr id="151" name="Rectangle 8">
+            <a:extLst>
+              <a:ext uri="{FF2B5EF4-FFF2-40B4-BE49-F238E27FC236}">
+                <a16:creationId xmlns:a16="http://schemas.microsoft.com/office/drawing/2014/main" id="{35472827-4C8A-4816-9ABF-A18EF51D9791}"/>
+              </a:ext>
+            </a:extLst>
+          </p:cNvPr>
+          <p:cNvSpPr/>
+          <p:nvPr/>
+        </p:nvSpPr>
+        <p:spPr>
+          <a:xfrm>
+            <a:off x="5145638" y="7370516"/>
+            <a:ext cx="1383888" cy="346760"/>
+          </a:xfrm>
+          <a:prstGeom prst="rect">
+            <a:avLst/>
+          </a:prstGeom>
+          <a:ln w="19050">
+            <a:solidFill>
+              <a:srgbClr val="7030A0"/>
+            </a:solidFill>
+          </a:ln>
+          <a:effectLst/>
+        </p:spPr>
+        <p:style>
+          <a:lnRef idx="1">
+            <a:schemeClr val="accent4"/>
+          </a:lnRef>
+          <a:fillRef idx="2">
+            <a:schemeClr val="accent4"/>
+          </a:fillRef>
+          <a:effectRef idx="1">
+            <a:schemeClr val="accent4"/>
+          </a:effectRef>
+          <a:fontRef idx="minor">
+            <a:schemeClr val="dk1"/>
+          </a:fontRef>
+        </p:style>
+        <p:txBody>
+          <a:bodyPr rtlCol="0" anchor="ctr"/>
+          <a:lstStyle/>
+          <a:p>
+            <a:pPr algn="ctr"/>
+            <a:r>
+              <a:rPr lang="en-US" sz="1050" dirty="0" err="1">
+                <a:solidFill>
+                  <a:srgbClr val="7030A0"/>
+                </a:solidFill>
+              </a:rPr>
+              <a:t>UniqueIngredientList</a:t>
+            </a:r>
+            <a:endParaRPr lang="en-SG" sz="1050" dirty="0">
+              <a:solidFill>
+                <a:srgbClr val="7030A0"/>
+              </a:solidFill>
+            </a:endParaRPr>
+          </a:p>
+        </p:txBody>
+      </p:sp>
+      <p:cxnSp>
+        <p:nvCxnSpPr>
+          <p:cNvPr id="158" name="Elbow Connector 63">
+            <a:extLst>
+              <a:ext uri="{FF2B5EF4-FFF2-40B4-BE49-F238E27FC236}">
+                <a16:creationId xmlns:a16="http://schemas.microsoft.com/office/drawing/2014/main" id="{093F66E2-FBC6-4004-A74D-3FAB2EA91C49}"/>
+              </a:ext>
+            </a:extLst>
+          </p:cNvPr>
+          <p:cNvCxnSpPr>
+            <a:cxnSpLocks/>
+            <a:stCxn id="164" idx="3"/>
+            <a:endCxn id="165" idx="1"/>
+          </p:cNvCxnSpPr>
+          <p:nvPr/>
+        </p:nvCxnSpPr>
+        <p:spPr>
+          <a:xfrm>
+            <a:off x="6777790" y="7546111"/>
+            <a:ext cx="273945" cy="255"/>
+          </a:xfrm>
+          <a:prstGeom prst="bentConnector3">
+            <a:avLst/>
+          </a:prstGeom>
+          <a:ln w="19050">
+            <a:solidFill>
+              <a:srgbClr val="7030A0"/>
+            </a:solidFill>
+            <a:headEnd type="none" w="med" len="med"/>
+            <a:tailEnd type="arrow" w="med" len="med"/>
+          </a:ln>
+          <a:effectLst/>
+        </p:spPr>
+        <p:style>
+          <a:lnRef idx="1">
+            <a:schemeClr val="accent2"/>
+          </a:lnRef>
+          <a:fillRef idx="2">
+            <a:schemeClr val="accent2"/>
+          </a:fillRef>
+          <a:effectRef idx="1">
+            <a:schemeClr val="accent2"/>
+          </a:effectRef>
+          <a:fontRef idx="minor">
+            <a:schemeClr val="dk1"/>
+          </a:fontRef>
+        </p:style>
+      </p:cxnSp>
+      <p:sp>
+        <p:nvSpPr>
+          <p:cNvPr id="159" name="TextBox 158">
+            <a:extLst>
+              <a:ext uri="{FF2B5EF4-FFF2-40B4-BE49-F238E27FC236}">
+                <a16:creationId xmlns:a16="http://schemas.microsoft.com/office/drawing/2014/main" id="{5956C1F6-AA49-4A0E-BD83-03E79F2D849B}"/>
+              </a:ext>
+            </a:extLst>
+          </p:cNvPr>
+          <p:cNvSpPr txBox="1"/>
+          <p:nvPr/>
+        </p:nvSpPr>
+        <p:spPr>
+          <a:xfrm>
+            <a:off x="6753225" y="7604626"/>
+            <a:ext cx="189257" cy="137844"/>
+          </a:xfrm>
+          <a:prstGeom prst="rect">
+            <a:avLst/>
+          </a:prstGeom>
+          <a:noFill/>
+        </p:spPr>
+        <p:txBody>
+          <a:bodyPr wrap="square" lIns="0" tIns="0" rIns="0" bIns="0" rtlCol="0">
+            <a:noAutofit/>
+          </a:bodyPr>
+          <a:lstStyle/>
+          <a:p>
+            <a:pPr algn="ctr"/>
+            <a:r>
+              <a:rPr lang="en-US" sz="1100" dirty="0">
+                <a:solidFill>
+                  <a:srgbClr val="7030A0"/>
+                </a:solidFill>
+              </a:rPr>
+              <a:t>*</a:t>
+            </a:r>
+            <a:endParaRPr lang="en-SG" sz="1100" dirty="0">
+              <a:solidFill>
+                <a:srgbClr val="7030A0"/>
+              </a:solidFill>
+            </a:endParaRPr>
+          </a:p>
+        </p:txBody>
+      </p:sp>
+      <p:cxnSp>
+        <p:nvCxnSpPr>
+          <p:cNvPr id="161" name="Elbow Connector 29">
+            <a:extLst>
+              <a:ext uri="{FF2B5EF4-FFF2-40B4-BE49-F238E27FC236}">
+                <a16:creationId xmlns:a16="http://schemas.microsoft.com/office/drawing/2014/main" id="{96DE09B2-3A2A-451D-A741-D80807BD5254}"/>
+              </a:ext>
+            </a:extLst>
+          </p:cNvPr>
+          <p:cNvCxnSpPr>
+            <a:cxnSpLocks/>
+            <a:stCxn id="51" idx="2"/>
+            <a:endCxn id="151" idx="1"/>
+          </p:cNvCxnSpPr>
+          <p:nvPr/>
+        </p:nvCxnSpPr>
+        <p:spPr>
+          <a:xfrm rot="16200000" flipH="1">
+            <a:off x="2723829" y="5122086"/>
+            <a:ext cx="4412131" cy="431488"/>
+          </a:xfrm>
+          <a:prstGeom prst="bentConnector2">
+            <a:avLst/>
+          </a:prstGeom>
+          <a:ln w="19050">
+            <a:solidFill>
+              <a:srgbClr val="7030A0"/>
+            </a:solidFill>
+            <a:headEnd type="none" w="med" len="med"/>
+            <a:tailEnd type="arrow" w="med" len="med"/>
+          </a:ln>
+          <a:effectLst/>
+        </p:spPr>
+        <p:style>
+          <a:lnRef idx="1">
+            <a:schemeClr val="accent2"/>
+          </a:lnRef>
+          <a:fillRef idx="2">
+            <a:schemeClr val="accent2"/>
+          </a:fillRef>
+          <a:effectRef idx="1">
+            <a:schemeClr val="accent2"/>
+          </a:effectRef>
+          <a:fontRef idx="minor">
+            <a:schemeClr val="dk1"/>
+          </a:fontRef>
+        </p:style>
+      </p:cxnSp>
+      <p:sp>
+        <p:nvSpPr>
+          <p:cNvPr id="162" name="TextBox 161">
+            <a:extLst>
+              <a:ext uri="{FF2B5EF4-FFF2-40B4-BE49-F238E27FC236}">
+                <a16:creationId xmlns:a16="http://schemas.microsoft.com/office/drawing/2014/main" id="{4D3AD0AF-A08D-4B19-B0CA-4F42B7568466}"/>
+              </a:ext>
+            </a:extLst>
+          </p:cNvPr>
+          <p:cNvSpPr txBox="1"/>
+          <p:nvPr/>
+        </p:nvSpPr>
+        <p:spPr>
+          <a:xfrm>
+            <a:off x="4839943" y="7239000"/>
+            <a:ext cx="189257" cy="178683"/>
+          </a:xfrm>
+          <a:prstGeom prst="rect">
+            <a:avLst/>
+          </a:prstGeom>
+          <a:noFill/>
+        </p:spPr>
+        <p:txBody>
+          <a:bodyPr wrap="square" lIns="0" tIns="0" rIns="0" bIns="0" rtlCol="0">
+            <a:noAutofit/>
+          </a:bodyPr>
+          <a:lstStyle/>
+          <a:p>
+            <a:pPr algn="ctr"/>
+            <a:r>
+              <a:rPr lang="en-US" sz="1100" dirty="0">
+                <a:solidFill>
+                  <a:srgbClr val="7030A0"/>
+                </a:solidFill>
+              </a:rPr>
+              <a:t>1</a:t>
+            </a:r>
+            <a:endParaRPr lang="en-SG" sz="1100" dirty="0">
+              <a:solidFill>
+                <a:srgbClr val="7030A0"/>
+              </a:solidFill>
+            </a:endParaRPr>
+          </a:p>
+        </p:txBody>
+      </p:sp>
+      <p:sp>
+        <p:nvSpPr>
+          <p:cNvPr id="164" name="Flowchart: Decision 96">
+            <a:extLst>
+              <a:ext uri="{FF2B5EF4-FFF2-40B4-BE49-F238E27FC236}">
+                <a16:creationId xmlns:a16="http://schemas.microsoft.com/office/drawing/2014/main" id="{095B70B8-F43B-401A-A3F0-3F8480031F9E}"/>
+              </a:ext>
+            </a:extLst>
+          </p:cNvPr>
+          <p:cNvSpPr/>
+          <p:nvPr/>
+        </p:nvSpPr>
+        <p:spPr>
+          <a:xfrm>
+            <a:off x="6541742" y="7459421"/>
+            <a:ext cx="236048" cy="173380"/>
+          </a:xfrm>
+          <a:prstGeom prst="flowChartDecision">
+            <a:avLst/>
+          </a:prstGeom>
+          <a:noFill/>
+          <a:ln w="19050">
+            <a:solidFill>
+              <a:srgbClr val="7030A0"/>
+            </a:solidFill>
+          </a:ln>
+          <a:effectLst/>
+        </p:spPr>
+        <p:style>
+          <a:lnRef idx="1">
+            <a:schemeClr val="accent6"/>
+          </a:lnRef>
+          <a:fillRef idx="2">
+            <a:schemeClr val="accent6"/>
+          </a:fillRef>
+          <a:effectRef idx="1">
+            <a:schemeClr val="accent6"/>
+          </a:effectRef>
+          <a:fontRef idx="minor">
+            <a:schemeClr val="dk1"/>
+          </a:fontRef>
+        </p:style>
+        <p:txBody>
+          <a:bodyPr rtlCol="0" anchor="ctr"/>
+          <a:lstStyle/>
+          <a:p>
+            <a:pPr algn="ctr"/>
+            <a:endParaRPr lang="en-US" sz="1050"/>
+          </a:p>
+        </p:txBody>
+      </p:sp>
+      <p:sp>
+        <p:nvSpPr>
+          <p:cNvPr id="165" name="Rectangle 164">
+            <a:extLst>
+              <a:ext uri="{FF2B5EF4-FFF2-40B4-BE49-F238E27FC236}">
+                <a16:creationId xmlns:a16="http://schemas.microsoft.com/office/drawing/2014/main" id="{13E281E1-B707-405D-9DCF-EC66B14BA588}"/>
+              </a:ext>
+            </a:extLst>
+          </p:cNvPr>
+          <p:cNvSpPr/>
+          <p:nvPr/>
+        </p:nvSpPr>
+        <p:spPr>
+          <a:xfrm>
+            <a:off x="7051735" y="7372986"/>
+            <a:ext cx="813629" cy="346760"/>
+          </a:xfrm>
+          <a:prstGeom prst="rect">
+            <a:avLst/>
+          </a:prstGeom>
+          <a:ln w="19050">
+            <a:solidFill>
+              <a:srgbClr val="7030A0"/>
+            </a:solidFill>
+          </a:ln>
+          <a:effectLst/>
+        </p:spPr>
+        <p:style>
+          <a:lnRef idx="1">
+            <a:schemeClr val="accent4"/>
+          </a:lnRef>
+          <a:fillRef idx="2">
+            <a:schemeClr val="accent4"/>
+          </a:fillRef>
+          <a:effectRef idx="1">
+            <a:schemeClr val="accent4"/>
+          </a:effectRef>
+          <a:fontRef idx="minor">
+            <a:schemeClr val="dk1"/>
+          </a:fontRef>
+        </p:style>
+        <p:txBody>
+          <a:bodyPr rtlCol="0" anchor="ctr"/>
+          <a:lstStyle>
+            <a:defPPr>
+              <a:defRPr lang="en-US"/>
+            </a:defPPr>
+            <a:lvl1pPr marL="0" algn="l" defTabSz="914400" rtl="0" eaLnBrk="1" latinLnBrk="0" hangingPunct="1">
+              <a:defRPr sz="1800" kern="1200">
+                <a:solidFill>
+                  <a:schemeClr val="dk1"/>
+                </a:solidFill>
+                <a:latin typeface="+mn-lt"/>
+                <a:ea typeface="+mn-ea"/>
+                <a:cs typeface="+mn-cs"/>
+              </a:defRPr>
+            </a:lvl1pPr>
+            <a:lvl2pPr marL="457200" algn="l" defTabSz="914400" rtl="0" eaLnBrk="1" latinLnBrk="0" hangingPunct="1">
+              <a:defRPr sz="1800" kern="1200">
+                <a:solidFill>
+                  <a:schemeClr val="dk1"/>
+                </a:solidFill>
+                <a:latin typeface="+mn-lt"/>
+                <a:ea typeface="+mn-ea"/>
+                <a:cs typeface="+mn-cs"/>
+              </a:defRPr>
+            </a:lvl2pPr>
+            <a:lvl3pPr marL="914400" algn="l" defTabSz="914400" rtl="0" eaLnBrk="1" latinLnBrk="0" hangingPunct="1">
+              <a:defRPr sz="1800" kern="1200">
+                <a:solidFill>
+                  <a:schemeClr val="dk1"/>
+                </a:solidFill>
+                <a:latin typeface="+mn-lt"/>
+                <a:ea typeface="+mn-ea"/>
+                <a:cs typeface="+mn-cs"/>
+              </a:defRPr>
+            </a:lvl3pPr>
+            <a:lvl4pPr marL="1371600" algn="l" defTabSz="914400" rtl="0" eaLnBrk="1" latinLnBrk="0" hangingPunct="1">
+              <a:defRPr sz="1800" kern="1200">
+                <a:solidFill>
+                  <a:schemeClr val="dk1"/>
+                </a:solidFill>
+                <a:latin typeface="+mn-lt"/>
+                <a:ea typeface="+mn-ea"/>
+                <a:cs typeface="+mn-cs"/>
+              </a:defRPr>
+            </a:lvl4pPr>
+            <a:lvl5pPr marL="1828800" algn="l" defTabSz="914400" rtl="0" eaLnBrk="1" latinLnBrk="0" hangingPunct="1">
+              <a:defRPr sz="1800" kern="1200">
+                <a:solidFill>
+                  <a:schemeClr val="dk1"/>
+                </a:solidFill>
+                <a:latin typeface="+mn-lt"/>
+                <a:ea typeface="+mn-ea"/>
+                <a:cs typeface="+mn-cs"/>
+              </a:defRPr>
+            </a:lvl5pPr>
+            <a:lvl6pPr marL="2286000" algn="l" defTabSz="914400" rtl="0" eaLnBrk="1" latinLnBrk="0" hangingPunct="1">
+              <a:defRPr sz="1800" kern="1200">
+                <a:solidFill>
+                  <a:schemeClr val="dk1"/>
+                </a:solidFill>
+                <a:latin typeface="+mn-lt"/>
+                <a:ea typeface="+mn-ea"/>
+                <a:cs typeface="+mn-cs"/>
+              </a:defRPr>
+            </a:lvl6pPr>
+            <a:lvl7pPr marL="2743200" algn="l" defTabSz="914400" rtl="0" eaLnBrk="1" latinLnBrk="0" hangingPunct="1">
+              <a:defRPr sz="1800" kern="1200">
+                <a:solidFill>
+                  <a:schemeClr val="dk1"/>
+                </a:solidFill>
+                <a:latin typeface="+mn-lt"/>
+                <a:ea typeface="+mn-ea"/>
+                <a:cs typeface="+mn-cs"/>
+              </a:defRPr>
+            </a:lvl7pPr>
+            <a:lvl8pPr marL="3200400" algn="l" defTabSz="914400" rtl="0" eaLnBrk="1" latinLnBrk="0" hangingPunct="1">
+              <a:defRPr sz="1800" kern="1200">
+                <a:solidFill>
+                  <a:schemeClr val="dk1"/>
+                </a:solidFill>
+                <a:latin typeface="+mn-lt"/>
+                <a:ea typeface="+mn-ea"/>
+                <a:cs typeface="+mn-cs"/>
+              </a:defRPr>
+            </a:lvl8pPr>
+            <a:lvl9pPr marL="3657600" algn="l" defTabSz="914400" rtl="0" eaLnBrk="1" latinLnBrk="0" hangingPunct="1">
+              <a:defRPr sz="1800" kern="1200">
+                <a:solidFill>
+                  <a:schemeClr val="dk1"/>
+                </a:solidFill>
+                <a:latin typeface="+mn-lt"/>
+                <a:ea typeface="+mn-ea"/>
+                <a:cs typeface="+mn-cs"/>
+              </a:defRPr>
+            </a:lvl9pPr>
+          </a:lstStyle>
+          <a:p>
+            <a:pPr algn="ctr"/>
+            <a:r>
+              <a:rPr lang="en-US" sz="1050" dirty="0">
+                <a:solidFill>
+                  <a:srgbClr val="7030A0"/>
+                </a:solidFill>
+              </a:rPr>
+              <a:t>Ingredient</a:t>
+            </a:r>
+            <a:endParaRPr lang="en-SG" sz="1050" dirty="0">
+              <a:solidFill>
+                <a:srgbClr val="7030A0"/>
+              </a:solidFill>
+            </a:endParaRPr>
+          </a:p>
+        </p:txBody>
+      </p:sp>
+      <p:cxnSp>
+        <p:nvCxnSpPr>
+          <p:cNvPr id="167" name="Elbow Connector 106">
+            <a:extLst>
+              <a:ext uri="{FF2B5EF4-FFF2-40B4-BE49-F238E27FC236}">
+                <a16:creationId xmlns:a16="http://schemas.microsoft.com/office/drawing/2014/main" id="{9BF1EA0D-46D8-416A-A52F-E6680D945A3F}"/>
+              </a:ext>
+            </a:extLst>
+          </p:cNvPr>
+          <p:cNvCxnSpPr>
+            <a:cxnSpLocks/>
+            <a:stCxn id="9" idx="1"/>
+            <a:endCxn id="165" idx="2"/>
+          </p:cNvCxnSpPr>
+          <p:nvPr/>
+        </p:nvCxnSpPr>
+        <p:spPr>
+          <a:xfrm rot="16200000" flipH="1">
+            <a:off x="2882559" y="3143755"/>
+            <a:ext cx="3901798" cy="5250184"/>
+          </a:xfrm>
+          <a:prstGeom prst="bentConnector3">
+            <a:avLst>
+              <a:gd name="adj1" fmla="val 105859"/>
+            </a:avLst>
+          </a:prstGeom>
+          <a:ln w="19050">
+            <a:solidFill>
+              <a:srgbClr val="7030A0"/>
+            </a:solidFill>
+            <a:prstDash val="solid"/>
+            <a:headEnd type="none" w="med" len="med"/>
+            <a:tailEnd type="arrow" w="med" len="med"/>
+          </a:ln>
+          <a:effectLst/>
+        </p:spPr>
+        <p:style>
+          <a:lnRef idx="1">
+            <a:schemeClr val="accent2"/>
+          </a:lnRef>
+          <a:fillRef idx="2">
+            <a:schemeClr val="accent2"/>
+          </a:fillRef>
+          <a:effectRef idx="1">
+            <a:schemeClr val="accent2"/>
+          </a:effectRef>
+          <a:fontRef idx="minor">
+            <a:schemeClr val="dk1"/>
+          </a:fontRef>
+        </p:style>
+      </p:cxnSp>
+      <p:sp>
+        <p:nvSpPr>
+          <p:cNvPr id="169" name="Diamond 168">
+            <a:extLst>
+              <a:ext uri="{FF2B5EF4-FFF2-40B4-BE49-F238E27FC236}">
+                <a16:creationId xmlns:a16="http://schemas.microsoft.com/office/drawing/2014/main" id="{05B93298-A7DC-41A0-92B5-77321BC90F89}"/>
+              </a:ext>
+            </a:extLst>
+          </p:cNvPr>
+          <p:cNvSpPr/>
+          <p:nvPr/>
+        </p:nvSpPr>
+        <p:spPr>
+          <a:xfrm>
+            <a:off x="7871714" y="7449513"/>
+            <a:ext cx="261604" cy="191457"/>
+          </a:xfrm>
+          <a:prstGeom prst="diamond">
+            <a:avLst/>
+          </a:prstGeom>
+          <a:solidFill>
+            <a:srgbClr val="7030A0"/>
+          </a:solidFill>
+          <a:ln w="12700">
+            <a:solidFill>
+              <a:schemeClr val="accent4">
+                <a:lumMod val="75000"/>
+              </a:schemeClr>
+            </a:solidFill>
+          </a:ln>
+        </p:spPr>
+        <p:style>
+          <a:lnRef idx="2">
+            <a:schemeClr val="accent1">
+              <a:shade val="50000"/>
+            </a:schemeClr>
+          </a:lnRef>
+          <a:fillRef idx="1">
+            <a:schemeClr val="accent1"/>
+          </a:fillRef>
+          <a:effectRef idx="0">
+            <a:schemeClr val="accent1"/>
+          </a:effectRef>
+          <a:fontRef idx="minor">
+            <a:schemeClr val="lt1"/>
+          </a:fontRef>
+        </p:style>
+        <p:txBody>
+          <a:bodyPr rtlCol="0" anchor="ctr"/>
+          <a:lstStyle/>
+          <a:p>
+            <a:pPr algn="ctr"/>
+            <a:endParaRPr lang="en-GB"/>
+          </a:p>
+        </p:txBody>
+      </p:sp>
+      <p:sp>
+        <p:nvSpPr>
+          <p:cNvPr id="171" name="Rectangle 8">
+            <a:extLst>
+              <a:ext uri="{FF2B5EF4-FFF2-40B4-BE49-F238E27FC236}">
+                <a16:creationId xmlns:a16="http://schemas.microsoft.com/office/drawing/2014/main" id="{A0A1AB92-13A9-463C-90F1-AEDE593930DF}"/>
+              </a:ext>
+            </a:extLst>
+          </p:cNvPr>
+          <p:cNvSpPr/>
+          <p:nvPr/>
+        </p:nvSpPr>
+        <p:spPr>
+          <a:xfrm>
+            <a:off x="8667747" y="7604238"/>
+            <a:ext cx="1163750" cy="346760"/>
+          </a:xfrm>
+          <a:prstGeom prst="rect">
+            <a:avLst/>
+          </a:prstGeom>
+          <a:ln w="19050">
+            <a:solidFill>
+              <a:srgbClr val="7030A0"/>
+            </a:solidFill>
+          </a:ln>
+          <a:effectLst/>
+        </p:spPr>
+        <p:style>
+          <a:lnRef idx="1">
+            <a:schemeClr val="accent4"/>
+          </a:lnRef>
+          <a:fillRef idx="2">
+            <a:schemeClr val="accent4"/>
+          </a:fillRef>
+          <a:effectRef idx="1">
+            <a:schemeClr val="accent4"/>
+          </a:effectRef>
+          <a:fontRef idx="minor">
+            <a:schemeClr val="dk1"/>
+          </a:fontRef>
+        </p:style>
+        <p:txBody>
+          <a:bodyPr rtlCol="0" anchor="ctr"/>
+          <a:lstStyle/>
+          <a:p>
+            <a:pPr algn="ctr"/>
+            <a:r>
+              <a:rPr lang="en-US" sz="1050" dirty="0" err="1">
+                <a:solidFill>
+                  <a:srgbClr val="7030A0"/>
+                </a:solidFill>
+              </a:rPr>
+              <a:t>IngredientName</a:t>
+            </a:r>
+            <a:endParaRPr lang="en-SG" sz="1050" dirty="0">
+              <a:solidFill>
+                <a:srgbClr val="7030A0"/>
+              </a:solidFill>
+            </a:endParaRPr>
+          </a:p>
+        </p:txBody>
+      </p:sp>
+      <p:sp>
+        <p:nvSpPr>
+          <p:cNvPr id="173" name="Rectangle 8">
+            <a:extLst>
+              <a:ext uri="{FF2B5EF4-FFF2-40B4-BE49-F238E27FC236}">
+                <a16:creationId xmlns:a16="http://schemas.microsoft.com/office/drawing/2014/main" id="{38B6449B-34A2-4CA1-A338-BA41B8E40916}"/>
+              </a:ext>
+            </a:extLst>
+          </p:cNvPr>
+          <p:cNvSpPr/>
+          <p:nvPr/>
+        </p:nvSpPr>
+        <p:spPr>
+          <a:xfrm>
+            <a:off x="8670109" y="8036181"/>
+            <a:ext cx="1163750" cy="346760"/>
+          </a:xfrm>
+          <a:prstGeom prst="rect">
+            <a:avLst/>
+          </a:prstGeom>
+          <a:ln w="19050">
+            <a:solidFill>
+              <a:srgbClr val="7030A0"/>
+            </a:solidFill>
+          </a:ln>
+          <a:effectLst/>
+        </p:spPr>
+        <p:style>
+          <a:lnRef idx="1">
+            <a:schemeClr val="accent4"/>
+          </a:lnRef>
+          <a:fillRef idx="2">
+            <a:schemeClr val="accent4"/>
+          </a:fillRef>
+          <a:effectRef idx="1">
+            <a:schemeClr val="accent4"/>
+          </a:effectRef>
+          <a:fontRef idx="minor">
+            <a:schemeClr val="dk1"/>
+          </a:fontRef>
+        </p:style>
+        <p:txBody>
+          <a:bodyPr rtlCol="0" anchor="ctr"/>
+          <a:lstStyle/>
+          <a:p>
+            <a:pPr algn="ctr"/>
+            <a:r>
+              <a:rPr lang="en-US" sz="1050" dirty="0" err="1">
+                <a:solidFill>
+                  <a:srgbClr val="7030A0"/>
+                </a:solidFill>
+              </a:rPr>
+              <a:t>IngredientUnit</a:t>
+            </a:r>
+            <a:endParaRPr lang="en-SG" sz="1050" dirty="0">
+              <a:solidFill>
+                <a:srgbClr val="7030A0"/>
+              </a:solidFill>
+            </a:endParaRPr>
+          </a:p>
+        </p:txBody>
+      </p:sp>
+      <p:sp>
+        <p:nvSpPr>
+          <p:cNvPr id="175" name="Rectangle 8">
+            <a:extLst>
+              <a:ext uri="{FF2B5EF4-FFF2-40B4-BE49-F238E27FC236}">
+                <a16:creationId xmlns:a16="http://schemas.microsoft.com/office/drawing/2014/main" id="{BDB1EDA6-9BC3-4F21-B6E1-30DC26A4153F}"/>
+              </a:ext>
+            </a:extLst>
+          </p:cNvPr>
+          <p:cNvSpPr/>
+          <p:nvPr/>
+        </p:nvSpPr>
+        <p:spPr>
+          <a:xfrm>
+            <a:off x="8670109" y="8468124"/>
+            <a:ext cx="1163750" cy="346760"/>
+          </a:xfrm>
+          <a:prstGeom prst="rect">
+            <a:avLst/>
+          </a:prstGeom>
+          <a:ln w="19050">
+            <a:solidFill>
+              <a:srgbClr val="7030A0"/>
+            </a:solidFill>
+          </a:ln>
+          <a:effectLst/>
+        </p:spPr>
+        <p:style>
+          <a:lnRef idx="1">
+            <a:schemeClr val="accent4"/>
+          </a:lnRef>
+          <a:fillRef idx="2">
+            <a:schemeClr val="accent4"/>
+          </a:fillRef>
+          <a:effectRef idx="1">
+            <a:schemeClr val="accent4"/>
+          </a:effectRef>
+          <a:fontRef idx="minor">
+            <a:schemeClr val="dk1"/>
+          </a:fontRef>
+        </p:style>
+        <p:txBody>
+          <a:bodyPr rtlCol="0" anchor="ctr"/>
+          <a:lstStyle/>
+          <a:p>
+            <a:pPr algn="ctr"/>
+            <a:r>
+              <a:rPr lang="en-US" sz="1050" dirty="0" err="1">
+                <a:solidFill>
+                  <a:srgbClr val="7030A0"/>
+                </a:solidFill>
+              </a:rPr>
+              <a:t>IngredientPrice</a:t>
+            </a:r>
+            <a:endParaRPr lang="en-SG" sz="1050" dirty="0">
+              <a:solidFill>
+                <a:srgbClr val="7030A0"/>
+              </a:solidFill>
+            </a:endParaRPr>
+          </a:p>
+        </p:txBody>
+      </p:sp>
+      <p:sp>
+        <p:nvSpPr>
+          <p:cNvPr id="176" name="Rectangle 8">
+            <a:extLst>
+              <a:ext uri="{FF2B5EF4-FFF2-40B4-BE49-F238E27FC236}">
+                <a16:creationId xmlns:a16="http://schemas.microsoft.com/office/drawing/2014/main" id="{0FB4F07D-411E-4287-9DF3-2C3ADAC41DBC}"/>
+              </a:ext>
+            </a:extLst>
+          </p:cNvPr>
+          <p:cNvSpPr/>
+          <p:nvPr/>
+        </p:nvSpPr>
+        <p:spPr>
+          <a:xfrm>
+            <a:off x="8670109" y="8899382"/>
+            <a:ext cx="1163750" cy="346760"/>
+          </a:xfrm>
+          <a:prstGeom prst="rect">
+            <a:avLst/>
+          </a:prstGeom>
+          <a:ln w="19050">
+            <a:solidFill>
+              <a:srgbClr val="7030A0"/>
+            </a:solidFill>
+          </a:ln>
+          <a:effectLst/>
+        </p:spPr>
+        <p:style>
+          <a:lnRef idx="1">
+            <a:schemeClr val="accent4"/>
+          </a:lnRef>
+          <a:fillRef idx="2">
+            <a:schemeClr val="accent4"/>
+          </a:fillRef>
+          <a:effectRef idx="1">
+            <a:schemeClr val="accent4"/>
+          </a:effectRef>
+          <a:fontRef idx="minor">
+            <a:schemeClr val="dk1"/>
+          </a:fontRef>
+        </p:style>
+        <p:txBody>
+          <a:bodyPr rtlCol="0" anchor="ctr"/>
+          <a:lstStyle/>
+          <a:p>
+            <a:pPr algn="ctr"/>
+            <a:r>
+              <a:rPr lang="en-SG" sz="1050" dirty="0" err="1">
+                <a:solidFill>
+                  <a:srgbClr val="7030A0"/>
+                </a:solidFill>
+              </a:rPr>
+              <a:t>MinimumUnit</a:t>
+            </a:r>
+            <a:endParaRPr lang="en-SG" sz="1050" dirty="0">
+              <a:solidFill>
+                <a:srgbClr val="7030A0"/>
+              </a:solidFill>
+            </a:endParaRPr>
+          </a:p>
+        </p:txBody>
+      </p:sp>
+      <p:sp>
+        <p:nvSpPr>
+          <p:cNvPr id="177" name="Rectangle 8">
+            <a:extLst>
+              <a:ext uri="{FF2B5EF4-FFF2-40B4-BE49-F238E27FC236}">
+                <a16:creationId xmlns:a16="http://schemas.microsoft.com/office/drawing/2014/main" id="{67DD527A-DF0B-4337-8DC1-C81128F25DF3}"/>
+              </a:ext>
+            </a:extLst>
+          </p:cNvPr>
+          <p:cNvSpPr/>
+          <p:nvPr/>
+        </p:nvSpPr>
+        <p:spPr>
+          <a:xfrm>
+            <a:off x="8666050" y="9330640"/>
+            <a:ext cx="1163750" cy="346760"/>
+          </a:xfrm>
+          <a:prstGeom prst="rect">
+            <a:avLst/>
+          </a:prstGeom>
+          <a:ln w="19050">
+            <a:solidFill>
+              <a:srgbClr val="7030A0"/>
+            </a:solidFill>
+          </a:ln>
+          <a:effectLst/>
+        </p:spPr>
+        <p:style>
+          <a:lnRef idx="1">
+            <a:schemeClr val="accent4"/>
+          </a:lnRef>
+          <a:fillRef idx="2">
+            <a:schemeClr val="accent4"/>
+          </a:fillRef>
+          <a:effectRef idx="1">
+            <a:schemeClr val="accent4"/>
+          </a:effectRef>
+          <a:fontRef idx="minor">
+            <a:schemeClr val="dk1"/>
+          </a:fontRef>
+        </p:style>
+        <p:txBody>
+          <a:bodyPr rtlCol="0" anchor="ctr"/>
+          <a:lstStyle/>
+          <a:p>
+            <a:pPr algn="ctr"/>
+            <a:r>
+              <a:rPr lang="en-SG" sz="1050" dirty="0" err="1">
+                <a:solidFill>
+                  <a:srgbClr val="7030A0"/>
+                </a:solidFill>
+              </a:rPr>
+              <a:t>NumUnits</a:t>
+            </a:r>
+            <a:endParaRPr lang="en-SG" sz="1050" dirty="0">
+              <a:solidFill>
+                <a:srgbClr val="7030A0"/>
+              </a:solidFill>
+            </a:endParaRPr>
+          </a:p>
+        </p:txBody>
+      </p:sp>
+      <p:cxnSp>
+        <p:nvCxnSpPr>
+          <p:cNvPr id="181" name="Elbow Connector 78">
+            <a:extLst>
+              <a:ext uri="{FF2B5EF4-FFF2-40B4-BE49-F238E27FC236}">
+                <a16:creationId xmlns:a16="http://schemas.microsoft.com/office/drawing/2014/main" id="{4981FBA7-E3A3-4BAA-B1D7-7FDC0443BFAF}"/>
+              </a:ext>
+            </a:extLst>
+          </p:cNvPr>
+          <p:cNvCxnSpPr>
+            <a:cxnSpLocks/>
+            <a:stCxn id="169" idx="2"/>
+            <a:endCxn id="171" idx="1"/>
+          </p:cNvCxnSpPr>
+          <p:nvPr/>
+        </p:nvCxnSpPr>
+        <p:spPr>
+          <a:xfrm rot="16200000" flipH="1">
+            <a:off x="8266807" y="7376678"/>
+            <a:ext cx="136648" cy="665231"/>
+          </a:xfrm>
+          <a:prstGeom prst="bentConnector2">
+            <a:avLst/>
+          </a:prstGeom>
+          <a:ln w="19050">
+            <a:solidFill>
+              <a:srgbClr val="7030A0"/>
+            </a:solidFill>
+            <a:headEnd type="none" w="med" len="med"/>
+            <a:tailEnd type="arrow" w="med" len="med"/>
+          </a:ln>
+          <a:effectLst/>
+        </p:spPr>
+        <p:style>
+          <a:lnRef idx="1">
+            <a:schemeClr val="accent2"/>
+          </a:lnRef>
+          <a:fillRef idx="2">
+            <a:schemeClr val="accent2"/>
+          </a:fillRef>
+          <a:effectRef idx="1">
+            <a:schemeClr val="accent2"/>
+          </a:effectRef>
+          <a:fontRef idx="minor">
+            <a:schemeClr val="dk1"/>
+          </a:fontRef>
+        </p:style>
+      </p:cxnSp>
+      <p:cxnSp>
+        <p:nvCxnSpPr>
+          <p:cNvPr id="182" name="Elbow Connector 78">
+            <a:extLst>
+              <a:ext uri="{FF2B5EF4-FFF2-40B4-BE49-F238E27FC236}">
+                <a16:creationId xmlns:a16="http://schemas.microsoft.com/office/drawing/2014/main" id="{3995783C-06D7-4971-8179-0C34E1108395}"/>
+              </a:ext>
+            </a:extLst>
+          </p:cNvPr>
+          <p:cNvCxnSpPr>
+            <a:cxnSpLocks/>
+            <a:stCxn id="169" idx="2"/>
+            <a:endCxn id="173" idx="1"/>
+          </p:cNvCxnSpPr>
+          <p:nvPr/>
+        </p:nvCxnSpPr>
+        <p:spPr>
+          <a:xfrm rot="16200000" flipH="1">
+            <a:off x="8052017" y="7591468"/>
+            <a:ext cx="568591" cy="667593"/>
+          </a:xfrm>
+          <a:prstGeom prst="bentConnector2">
+            <a:avLst/>
+          </a:prstGeom>
+          <a:ln w="19050">
+            <a:solidFill>
+              <a:srgbClr val="7030A0"/>
+            </a:solidFill>
+            <a:headEnd type="none" w="med" len="med"/>
+            <a:tailEnd type="arrow" w="med" len="med"/>
+          </a:ln>
+          <a:effectLst/>
+        </p:spPr>
+        <p:style>
+          <a:lnRef idx="1">
+            <a:schemeClr val="accent2"/>
+          </a:lnRef>
+          <a:fillRef idx="2">
+            <a:schemeClr val="accent2"/>
+          </a:fillRef>
+          <a:effectRef idx="1">
+            <a:schemeClr val="accent2"/>
+          </a:effectRef>
+          <a:fontRef idx="minor">
+            <a:schemeClr val="dk1"/>
+          </a:fontRef>
+        </p:style>
+      </p:cxnSp>
+      <p:cxnSp>
+        <p:nvCxnSpPr>
+          <p:cNvPr id="183" name="Elbow Connector 78">
+            <a:extLst>
+              <a:ext uri="{FF2B5EF4-FFF2-40B4-BE49-F238E27FC236}">
+                <a16:creationId xmlns:a16="http://schemas.microsoft.com/office/drawing/2014/main" id="{D17D567C-095E-4145-8054-CD3B4744358A}"/>
+              </a:ext>
+            </a:extLst>
+          </p:cNvPr>
+          <p:cNvCxnSpPr>
+            <a:cxnSpLocks/>
+            <a:stCxn id="169" idx="2"/>
+            <a:endCxn id="175" idx="1"/>
+          </p:cNvCxnSpPr>
+          <p:nvPr/>
+        </p:nvCxnSpPr>
+        <p:spPr>
+          <a:xfrm rot="16200000" flipH="1">
+            <a:off x="7836045" y="7807440"/>
+            <a:ext cx="1000534" cy="667593"/>
+          </a:xfrm>
+          <a:prstGeom prst="bentConnector2">
+            <a:avLst/>
+          </a:prstGeom>
+          <a:ln w="19050">
+            <a:solidFill>
+              <a:srgbClr val="7030A0"/>
+            </a:solidFill>
+            <a:headEnd type="none" w="med" len="med"/>
+            <a:tailEnd type="arrow" w="med" len="med"/>
+          </a:ln>
+          <a:effectLst/>
+        </p:spPr>
+        <p:style>
+          <a:lnRef idx="1">
+            <a:schemeClr val="accent2"/>
+          </a:lnRef>
+          <a:fillRef idx="2">
+            <a:schemeClr val="accent2"/>
+          </a:fillRef>
+          <a:effectRef idx="1">
+            <a:schemeClr val="accent2"/>
+          </a:effectRef>
+          <a:fontRef idx="minor">
+            <a:schemeClr val="dk1"/>
+          </a:fontRef>
+        </p:style>
+      </p:cxnSp>
+      <p:cxnSp>
+        <p:nvCxnSpPr>
+          <p:cNvPr id="184" name="Elbow Connector 78">
+            <a:extLst>
+              <a:ext uri="{FF2B5EF4-FFF2-40B4-BE49-F238E27FC236}">
+                <a16:creationId xmlns:a16="http://schemas.microsoft.com/office/drawing/2014/main" id="{B9A7E1AA-A0ED-4F45-BAAB-2F8F16A42734}"/>
+              </a:ext>
+            </a:extLst>
+          </p:cNvPr>
+          <p:cNvCxnSpPr>
+            <a:cxnSpLocks/>
+            <a:stCxn id="169" idx="2"/>
+            <a:endCxn id="176" idx="1"/>
+          </p:cNvCxnSpPr>
+          <p:nvPr/>
+        </p:nvCxnSpPr>
+        <p:spPr>
+          <a:xfrm rot="16200000" flipH="1">
+            <a:off x="7620416" y="8023069"/>
+            <a:ext cx="1431792" cy="667593"/>
+          </a:xfrm>
+          <a:prstGeom prst="bentConnector2">
+            <a:avLst/>
+          </a:prstGeom>
+          <a:ln w="19050">
+            <a:solidFill>
+              <a:srgbClr val="7030A0"/>
+            </a:solidFill>
+            <a:headEnd type="none" w="med" len="med"/>
+            <a:tailEnd type="arrow" w="med" len="med"/>
+          </a:ln>
+          <a:effectLst/>
+        </p:spPr>
+        <p:style>
+          <a:lnRef idx="1">
+            <a:schemeClr val="accent2"/>
+          </a:lnRef>
+          <a:fillRef idx="2">
+            <a:schemeClr val="accent2"/>
+          </a:fillRef>
+          <a:effectRef idx="1">
+            <a:schemeClr val="accent2"/>
+          </a:effectRef>
+          <a:fontRef idx="minor">
+            <a:schemeClr val="dk1"/>
+          </a:fontRef>
+        </p:style>
+      </p:cxnSp>
+      <p:cxnSp>
+        <p:nvCxnSpPr>
+          <p:cNvPr id="185" name="Elbow Connector 78">
+            <a:extLst>
+              <a:ext uri="{FF2B5EF4-FFF2-40B4-BE49-F238E27FC236}">
+                <a16:creationId xmlns:a16="http://schemas.microsoft.com/office/drawing/2014/main" id="{71AB26A9-AE48-4C64-ADFF-B62174BAE79C}"/>
+              </a:ext>
+            </a:extLst>
+          </p:cNvPr>
+          <p:cNvCxnSpPr>
+            <a:cxnSpLocks/>
+            <a:stCxn id="169" idx="2"/>
+            <a:endCxn id="177" idx="1"/>
+          </p:cNvCxnSpPr>
+          <p:nvPr/>
+        </p:nvCxnSpPr>
+        <p:spPr>
+          <a:xfrm rot="16200000" flipH="1">
+            <a:off x="7402758" y="8240728"/>
+            <a:ext cx="1863050" cy="663534"/>
+          </a:xfrm>
+          <a:prstGeom prst="bentConnector2">
+            <a:avLst/>
+          </a:prstGeom>
+          <a:ln w="19050">
+            <a:solidFill>
+              <a:srgbClr val="7030A0"/>
+            </a:solidFill>
+            <a:headEnd type="none" w="med" len="med"/>
+            <a:tailEnd type="arrow" w="med" len="med"/>
+          </a:ln>
+          <a:effectLst/>
+        </p:spPr>
+        <p:style>
+          <a:lnRef idx="1">
+            <a:schemeClr val="accent2"/>
+          </a:lnRef>
+          <a:fillRef idx="2">
+            <a:schemeClr val="accent2"/>
+          </a:fillRef>
+          <a:effectRef idx="1">
+            <a:schemeClr val="accent2"/>
+          </a:effectRef>
+          <a:fontRef idx="minor">
+            <a:schemeClr val="dk1"/>
+          </a:fontRef>
+        </p:style>
+      </p:cxnSp>
+      <p:sp>
+        <p:nvSpPr>
+          <p:cNvPr id="197" name="TextBox 196">
+            <a:extLst>
+              <a:ext uri="{FF2B5EF4-FFF2-40B4-BE49-F238E27FC236}">
+                <a16:creationId xmlns:a16="http://schemas.microsoft.com/office/drawing/2014/main" id="{CC050B93-BF17-4CDC-B9B8-748E3EE3848D}"/>
+              </a:ext>
+            </a:extLst>
+          </p:cNvPr>
+          <p:cNvSpPr txBox="1"/>
+          <p:nvPr/>
+        </p:nvSpPr>
+        <p:spPr>
+          <a:xfrm rot="16200000">
+            <a:off x="1595832" y="5752341"/>
+            <a:ext cx="803467" cy="261610"/>
+          </a:xfrm>
+          <a:prstGeom prst="rect">
+            <a:avLst/>
+          </a:prstGeom>
+          <a:noFill/>
+        </p:spPr>
+        <p:txBody>
+          <a:bodyPr wrap="square" rtlCol="0">
+            <a:spAutoFit/>
+          </a:bodyPr>
+          <a:lstStyle/>
+          <a:p>
+            <a:pPr algn="r"/>
+            <a:r>
+              <a:rPr lang="en-US" sz="1100" dirty="0">
+                <a:solidFill>
+                  <a:srgbClr val="7030A0"/>
+                </a:solidFill>
+              </a:rPr>
+              <a:t>filtered list</a:t>
+            </a:r>
+            <a:endParaRPr lang="en-SG" sz="1100" dirty="0">
+              <a:solidFill>
+                <a:srgbClr val="7030A0"/>
+              </a:solidFill>
+            </a:endParaRPr>
+          </a:p>
+        </p:txBody>
+      </p:sp>
     </p:spTree>
     <p:extLst>
       <p:ext uri="{BB962C8B-B14F-4D97-AF65-F5344CB8AC3E}">

</xml_diff>